<commit_message>
rewrite of speech, made it more concise
</commit_message>
<xml_diff>
--- a/docs/Презентация ВКР.pptx
+++ b/docs/Презентация ВКР.pptx
@@ -5,25 +5,23 @@
     <p:sldMasterId id="2147483842" r:id="rId1"/>
   </p:sldMasterIdLst>
   <p:notesMasterIdLst>
-    <p:notesMasterId r:id="rId18"/>
+    <p:notesMasterId r:id="rId16"/>
   </p:notesMasterIdLst>
   <p:sldIdLst>
     <p:sldId id="256" r:id="rId2"/>
     <p:sldId id="260" r:id="rId3"/>
     <p:sldId id="258" r:id="rId4"/>
-    <p:sldId id="280" r:id="rId5"/>
-    <p:sldId id="261" r:id="rId6"/>
-    <p:sldId id="262" r:id="rId7"/>
-    <p:sldId id="266" r:id="rId8"/>
-    <p:sldId id="275" r:id="rId9"/>
-    <p:sldId id="268" r:id="rId10"/>
-    <p:sldId id="276" r:id="rId11"/>
-    <p:sldId id="269" r:id="rId12"/>
-    <p:sldId id="278" r:id="rId13"/>
-    <p:sldId id="273" r:id="rId14"/>
-    <p:sldId id="272" r:id="rId15"/>
-    <p:sldId id="277" r:id="rId16"/>
-    <p:sldId id="279" r:id="rId17"/>
+    <p:sldId id="261" r:id="rId5"/>
+    <p:sldId id="262" r:id="rId6"/>
+    <p:sldId id="275" r:id="rId7"/>
+    <p:sldId id="268" r:id="rId8"/>
+    <p:sldId id="276" r:id="rId9"/>
+    <p:sldId id="269" r:id="rId10"/>
+    <p:sldId id="278" r:id="rId11"/>
+    <p:sldId id="273" r:id="rId12"/>
+    <p:sldId id="272" r:id="rId13"/>
+    <p:sldId id="277" r:id="rId14"/>
+    <p:sldId id="279" r:id="rId15"/>
   </p:sldIdLst>
   <p:sldSz cx="12192000" cy="6858000"/>
   <p:notesSz cx="6858000" cy="9144000"/>
@@ -144,20 +142,6 @@
 
 <file path=ppt/comments/comment1.xml><?xml version="1.0" encoding="utf-8"?>
 <p:cmLst xmlns:a="http://schemas.openxmlformats.org/drawingml/2006/main" xmlns:r="http://schemas.openxmlformats.org/officeDocument/2006/relationships" xmlns:p="http://schemas.openxmlformats.org/presentationml/2006/main">
-  <p:cm authorId="1" dt="2020-06-17T20:58:16.241" idx="1">
-    <p:pos x="2065" y="278"/>
-    <p:text>Может выпилить?</p:text>
-    <p:extLst>
-      <p:ext uri="{C676402C-5697-4E1C-873F-D02D1690AC5C}">
-        <p15:threadingInfo xmlns:p15="http://schemas.microsoft.com/office/powerpoint/2012/main" timeZoneBias="-180"/>
-      </p:ext>
-    </p:extLst>
-  </p:cm>
-</p:cmLst>
-</file>
-
-<file path=ppt/comments/comment2.xml><?xml version="1.0" encoding="utf-8"?>
-<p:cmLst xmlns:a="http://schemas.openxmlformats.org/drawingml/2006/main" xmlns:r="http://schemas.openxmlformats.org/officeDocument/2006/relationships" xmlns:p="http://schemas.openxmlformats.org/presentationml/2006/main">
   <p:cm authorId="1" dt="2020-06-17T21:02:00.419" idx="3">
     <p:pos x="10" y="10"/>
     <p:text>Может как-то сократить?</p:text>
@@ -1800,20 +1784,20 @@
         <a:p>
           <a:pPr algn="l"/>
           <a:r>
-            <a:rPr lang="ru-RU" sz="1000" dirty="0" smtClean="0">
+            <a:rPr lang="ru-RU" sz="1100" dirty="0" smtClean="0">
               <a:latin typeface="Courier New" panose="02070309020205020404" pitchFamily="49" charset="0"/>
               <a:cs typeface="Courier New" panose="02070309020205020404" pitchFamily="49" charset="0"/>
             </a:rPr>
-            <a:t>Исходный код</a:t>
+            <a:t>Исходный </a:t>
           </a:r>
-          <a:endParaRPr lang="en-US" sz="1000" dirty="0" smtClean="0">
-            <a:latin typeface="Courier New" panose="02070309020205020404" pitchFamily="49" charset="0"/>
-            <a:cs typeface="Courier New" panose="02070309020205020404" pitchFamily="49" charset="0"/>
-          </a:endParaRPr>
-        </a:p>
-        <a:p>
-          <a:pPr algn="l"/>
-          <a:endParaRPr lang="ru-RU" sz="1000" dirty="0" smtClean="0">
+          <a:r>
+            <a:rPr lang="ru-RU" sz="1100" dirty="0" smtClean="0">
+              <a:latin typeface="Courier New" panose="02070309020205020404" pitchFamily="49" charset="0"/>
+              <a:cs typeface="Courier New" panose="02070309020205020404" pitchFamily="49" charset="0"/>
+            </a:rPr>
+            <a:t>код</a:t>
+          </a:r>
+          <a:endParaRPr lang="ru-RU" sz="1100" dirty="0" smtClean="0">
             <a:latin typeface="Courier New" panose="02070309020205020404" pitchFamily="49" charset="0"/>
             <a:cs typeface="Courier New" panose="02070309020205020404" pitchFamily="49" charset="0"/>
           </a:endParaRPr>
@@ -1821,7 +1805,7 @@
         <a:p>
           <a:pPr algn="l"/>
           <a:r>
-            <a:rPr lang="en-US" sz="900" dirty="0" smtClean="0">
+            <a:rPr lang="en-US" sz="1100" dirty="0" smtClean="0">
               <a:solidFill>
                 <a:schemeClr val="accent2"/>
               </a:solidFill>
@@ -1831,14 +1815,14 @@
             <a:t>int</a:t>
           </a:r>
           <a:r>
-            <a:rPr lang="en-US" sz="900" dirty="0" smtClean="0">
+            <a:rPr lang="en-US" sz="1100" dirty="0" smtClean="0">
               <a:latin typeface="Courier New" panose="02070309020205020404" pitchFamily="49" charset="0"/>
               <a:cs typeface="Courier New" panose="02070309020205020404" pitchFamily="49" charset="0"/>
             </a:rPr>
             <a:t> </a:t>
           </a:r>
           <a:r>
-            <a:rPr lang="en-US" sz="900" dirty="0" smtClean="0">
+            <a:rPr lang="en-US" sz="1100" dirty="0" smtClean="0">
               <a:solidFill>
                 <a:schemeClr val="accent1"/>
               </a:solidFill>
@@ -1848,14 +1832,14 @@
             <a:t>main</a:t>
           </a:r>
           <a:r>
-            <a:rPr lang="en-US" sz="900" dirty="0" smtClean="0">
+            <a:rPr lang="en-US" sz="1100" dirty="0" smtClean="0">
               <a:latin typeface="Courier New" panose="02070309020205020404" pitchFamily="49" charset="0"/>
               <a:cs typeface="Courier New" panose="02070309020205020404" pitchFamily="49" charset="0"/>
             </a:rPr>
             <a:t>(</a:t>
           </a:r>
           <a:r>
-            <a:rPr lang="en-US" sz="900" dirty="0" smtClean="0">
+            <a:rPr lang="en-US" sz="1100" dirty="0" smtClean="0">
               <a:solidFill>
                 <a:schemeClr val="accent2"/>
               </a:solidFill>
@@ -1865,14 +1849,14 @@
             <a:t>int</a:t>
           </a:r>
           <a:r>
-            <a:rPr lang="en-US" sz="900" dirty="0" smtClean="0">
+            <a:rPr lang="en-US" sz="1100" dirty="0" smtClean="0">
               <a:latin typeface="Courier New" panose="02070309020205020404" pitchFamily="49" charset="0"/>
               <a:cs typeface="Courier New" panose="02070309020205020404" pitchFamily="49" charset="0"/>
             </a:rPr>
             <a:t> argc, </a:t>
           </a:r>
           <a:r>
-            <a:rPr lang="en-US" sz="900" dirty="0" smtClean="0">
+            <a:rPr lang="en-US" sz="1100" dirty="0" smtClean="0">
               <a:solidFill>
                 <a:schemeClr val="accent2">
                   <a:lumMod val="50000"/>
@@ -1884,7 +1868,7 @@
             <a:t>char** </a:t>
           </a:r>
           <a:r>
-            <a:rPr lang="en-US" sz="900" dirty="0" smtClean="0">
+            <a:rPr lang="en-US" sz="1100" dirty="0" smtClean="0">
               <a:latin typeface="Courier New" panose="02070309020205020404" pitchFamily="49" charset="0"/>
               <a:cs typeface="Courier New" panose="02070309020205020404" pitchFamily="49" charset="0"/>
             </a:rPr>
@@ -1894,14 +1878,14 @@
         <a:p>
           <a:pPr algn="l"/>
           <a:r>
-            <a:rPr lang="en-US" sz="900" dirty="0" smtClean="0">
+            <a:rPr lang="en-US" sz="1100" dirty="0" smtClean="0">
               <a:latin typeface="Courier New" panose="02070309020205020404" pitchFamily="49" charset="0"/>
               <a:cs typeface="Courier New" panose="02070309020205020404" pitchFamily="49" charset="0"/>
             </a:rPr>
             <a:t>    </a:t>
           </a:r>
           <a:r>
-            <a:rPr lang="en-US" sz="900" dirty="0" smtClean="0">
+            <a:rPr lang="en-US" sz="1100" dirty="0" smtClean="0">
               <a:solidFill>
                 <a:schemeClr val="accent1"/>
               </a:solidFill>
@@ -1911,14 +1895,14 @@
             <a:t>printf</a:t>
           </a:r>
           <a:r>
-            <a:rPr lang="en-US" sz="900" dirty="0" smtClean="0">
+            <a:rPr lang="en-US" sz="1100" dirty="0" smtClean="0">
               <a:latin typeface="Courier New" panose="02070309020205020404" pitchFamily="49" charset="0"/>
               <a:cs typeface="Courier New" panose="02070309020205020404" pitchFamily="49" charset="0"/>
             </a:rPr>
             <a:t>(</a:t>
           </a:r>
           <a:r>
-            <a:rPr lang="en-US" sz="900" dirty="0" smtClean="0">
+            <a:rPr lang="en-US" sz="1100" dirty="0" smtClean="0">
               <a:solidFill>
                 <a:schemeClr val="accent6"/>
               </a:solidFill>
@@ -1928,7 +1912,7 @@
             <a:t>“Hello world”</a:t>
           </a:r>
           <a:r>
-            <a:rPr lang="en-US" sz="900" dirty="0" smtClean="0">
+            <a:rPr lang="en-US" sz="1100" dirty="0" smtClean="0">
               <a:latin typeface="Courier New" panose="02070309020205020404" pitchFamily="49" charset="0"/>
               <a:cs typeface="Courier New" panose="02070309020205020404" pitchFamily="49" charset="0"/>
             </a:rPr>
@@ -1998,7 +1982,7 @@
         <a:p>
           <a:pPr algn="l"/>
           <a:r>
-            <a:rPr lang="ru-RU" sz="1000" dirty="0" smtClean="0">
+            <a:rPr lang="ru-RU" sz="1100" dirty="0" smtClean="0">
               <a:latin typeface="Courier New" panose="02070309020205020404" pitchFamily="49" charset="0"/>
               <a:cs typeface="Courier New" panose="02070309020205020404" pitchFamily="49" charset="0"/>
             </a:rPr>
@@ -2007,7 +1991,7 @@
         </a:p>
         <a:p>
           <a:pPr algn="l"/>
-          <a:endParaRPr lang="ru-RU" sz="1000" dirty="0" smtClean="0">
+          <a:endParaRPr lang="ru-RU" sz="1100" dirty="0" smtClean="0">
             <a:solidFill>
               <a:srgbClr val="7030A0"/>
             </a:solidFill>
@@ -2018,7 +2002,7 @@
         <a:p>
           <a:pPr algn="l"/>
           <a:r>
-            <a:rPr lang="ru-RU" sz="1000" dirty="0" smtClean="0">
+            <a:rPr lang="ru-RU" sz="1100" dirty="0" smtClean="0">
               <a:solidFill>
                 <a:srgbClr val="7030A0"/>
               </a:solidFill>
@@ -2028,7 +2012,7 @@
             <a:t>101000010100010011110101101001011010101010111110</a:t>
           </a:r>
           <a:r>
-            <a:rPr lang="en-US" sz="1000" dirty="0" smtClean="0">
+            <a:rPr lang="en-US" sz="1100" dirty="0" smtClean="0">
               <a:solidFill>
                 <a:srgbClr val="7030A0"/>
               </a:solidFill>
@@ -2037,7 +2021,7 @@
             </a:rPr>
             <a:t>11111000000101101010011100</a:t>
           </a:r>
-          <a:endParaRPr lang="ru-RU" sz="1000" dirty="0">
+          <a:endParaRPr lang="ru-RU" sz="1100" dirty="0">
             <a:solidFill>
               <a:srgbClr val="7030A0"/>
             </a:solidFill>
@@ -2177,20 +2161,20 @@
         <a:p>
           <a:pPr algn="l"/>
           <a:r>
-            <a:rPr lang="ru-RU" sz="1000" dirty="0" smtClean="0">
+            <a:rPr lang="ru-RU" sz="1200" dirty="0" smtClean="0">
               <a:latin typeface="Courier New" panose="02070309020205020404" pitchFamily="49" charset="0"/>
               <a:cs typeface="Courier New" panose="02070309020205020404" pitchFamily="49" charset="0"/>
             </a:rPr>
-            <a:t>Исходный код</a:t>
+            <a:t>Исходный </a:t>
           </a:r>
-          <a:endParaRPr lang="en-US" sz="1000" dirty="0" smtClean="0">
-            <a:latin typeface="Courier New" panose="02070309020205020404" pitchFamily="49" charset="0"/>
-            <a:cs typeface="Courier New" panose="02070309020205020404" pitchFamily="49" charset="0"/>
-          </a:endParaRPr>
-        </a:p>
-        <a:p>
-          <a:pPr algn="l"/>
-          <a:endParaRPr lang="ru-RU" sz="1000" dirty="0" smtClean="0">
+          <a:r>
+            <a:rPr lang="ru-RU" sz="1200" dirty="0" smtClean="0">
+              <a:latin typeface="Courier New" panose="02070309020205020404" pitchFamily="49" charset="0"/>
+              <a:cs typeface="Courier New" panose="02070309020205020404" pitchFamily="49" charset="0"/>
+            </a:rPr>
+            <a:t>код</a:t>
+          </a:r>
+          <a:endParaRPr lang="ru-RU" sz="1200" dirty="0" smtClean="0">
             <a:latin typeface="Courier New" panose="02070309020205020404" pitchFamily="49" charset="0"/>
             <a:cs typeface="Courier New" panose="02070309020205020404" pitchFamily="49" charset="0"/>
           </a:endParaRPr>
@@ -2198,7 +2182,7 @@
         <a:p>
           <a:pPr algn="l"/>
           <a:r>
-            <a:rPr lang="en-US" sz="1000" dirty="0" smtClean="0">
+            <a:rPr lang="en-US" sz="1200" dirty="0" smtClean="0">
               <a:solidFill>
                 <a:srgbClr val="C00000"/>
               </a:solidFill>
@@ -2208,7 +2192,7 @@
             <a:t>import </a:t>
           </a:r>
           <a:r>
-            <a:rPr lang="en-US" sz="1000" dirty="0" smtClean="0">
+            <a:rPr lang="en-US" sz="1200" dirty="0" smtClean="0">
               <a:solidFill>
                 <a:schemeClr val="accent6">
                   <a:lumMod val="75000"/>
@@ -2223,7 +2207,7 @@
         <a:p>
           <a:pPr algn="l"/>
           <a:r>
-            <a:rPr lang="en-US" sz="1000" dirty="0" smtClean="0">
+            <a:rPr lang="en-US" sz="1200" dirty="0" smtClean="0">
               <a:solidFill>
                 <a:schemeClr val="accent1">
                   <a:lumMod val="75000"/>
@@ -2235,7 +2219,7 @@
             <a:t>print</a:t>
           </a:r>
           <a:r>
-            <a:rPr lang="en-US" sz="1000" dirty="0" smtClean="0">
+            <a:rPr lang="en-US" sz="1200" dirty="0" smtClean="0">
               <a:latin typeface="Courier New" panose="02070309020205020404" pitchFamily="49" charset="0"/>
               <a:cs typeface="Courier New" panose="02070309020205020404" pitchFamily="49" charset="0"/>
             </a:rPr>
@@ -2279,7 +2263,7 @@
         <a:p>
           <a:pPr algn="l"/>
           <a:r>
-            <a:rPr lang="ru-RU" sz="1000" dirty="0" smtClean="0">
+            <a:rPr lang="ru-RU" sz="1200" dirty="0" smtClean="0">
               <a:latin typeface="Courier New" panose="02070309020205020404" pitchFamily="49" charset="0"/>
               <a:cs typeface="Courier New" panose="02070309020205020404" pitchFamily="49" charset="0"/>
             </a:rPr>
@@ -2289,14 +2273,14 @@
         <a:p>
           <a:pPr algn="l"/>
           <a:r>
-            <a:rPr lang="ru-RU" sz="1000" dirty="0" smtClean="0">
+            <a:rPr lang="ru-RU" sz="1200" dirty="0" smtClean="0">
               <a:latin typeface="Courier New" panose="02070309020205020404" pitchFamily="49" charset="0"/>
               <a:cs typeface="Courier New" panose="02070309020205020404" pitchFamily="49" charset="0"/>
             </a:rPr>
             <a:t>0 </a:t>
           </a:r>
           <a:r>
-            <a:rPr lang="en-US" sz="1000" dirty="0" smtClean="0">
+            <a:rPr lang="en-US" sz="1200" dirty="0" smtClean="0">
               <a:solidFill>
                 <a:schemeClr val="accent1">
                   <a:lumMod val="75000"/>
@@ -2308,14 +2292,14 @@
             <a:t>LOAD_NAME</a:t>
           </a:r>
           <a:r>
-            <a:rPr lang="en-US" sz="1000" dirty="0" smtClean="0">
+            <a:rPr lang="en-US" sz="1200" dirty="0" smtClean="0">
               <a:latin typeface="Courier New" panose="02070309020205020404" pitchFamily="49" charset="0"/>
               <a:cs typeface="Courier New" panose="02070309020205020404" pitchFamily="49" charset="0"/>
             </a:rPr>
             <a:t> 0 (</a:t>
           </a:r>
           <a:r>
-            <a:rPr lang="en-US" sz="1000" dirty="0" smtClean="0">
+            <a:rPr lang="en-US" sz="1200" dirty="0" smtClean="0">
               <a:solidFill>
                 <a:schemeClr val="accent6">
                   <a:lumMod val="50000"/>
@@ -2327,7 +2311,7 @@
             <a:t>print</a:t>
           </a:r>
           <a:r>
-            <a:rPr lang="en-US" sz="1000" dirty="0" smtClean="0">
+            <a:rPr lang="en-US" sz="1200" dirty="0" smtClean="0">
               <a:latin typeface="Courier New" panose="02070309020205020404" pitchFamily="49" charset="0"/>
               <a:cs typeface="Courier New" panose="02070309020205020404" pitchFamily="49" charset="0"/>
             </a:rPr>
@@ -2337,14 +2321,14 @@
         <a:p>
           <a:pPr algn="l"/>
           <a:r>
-            <a:rPr lang="en-US" sz="1000" dirty="0" smtClean="0">
+            <a:rPr lang="en-US" sz="1200" dirty="0" smtClean="0">
               <a:latin typeface="Courier New" panose="02070309020205020404" pitchFamily="49" charset="0"/>
               <a:cs typeface="Courier New" panose="02070309020205020404" pitchFamily="49" charset="0"/>
             </a:rPr>
             <a:t>1 </a:t>
           </a:r>
           <a:r>
-            <a:rPr lang="en-US" sz="1000" dirty="0" smtClean="0">
+            <a:rPr lang="en-US" sz="1200" dirty="0" smtClean="0">
               <a:solidFill>
                 <a:schemeClr val="accent1">
                   <a:lumMod val="75000"/>
@@ -2356,14 +2340,14 @@
             <a:t>LOAD_CONSTANT</a:t>
           </a:r>
           <a:r>
-            <a:rPr lang="en-US" sz="1000" dirty="0" smtClean="0">
+            <a:rPr lang="en-US" sz="1200" dirty="0" smtClean="0">
               <a:latin typeface="Courier New" panose="02070309020205020404" pitchFamily="49" charset="0"/>
               <a:cs typeface="Courier New" panose="02070309020205020404" pitchFamily="49" charset="0"/>
             </a:rPr>
             <a:t> 0 (</a:t>
           </a:r>
           <a:r>
-            <a:rPr lang="en-US" sz="1000" dirty="0" smtClean="0">
+            <a:rPr lang="en-US" sz="1200" dirty="0" smtClean="0">
               <a:solidFill>
                 <a:schemeClr val="accent6">
                   <a:lumMod val="50000"/>
@@ -2375,13 +2359,13 @@
             <a:t>time</a:t>
           </a:r>
           <a:r>
-            <a:rPr lang="en-US" sz="1000" dirty="0" smtClean="0">
+            <a:rPr lang="en-US" sz="1200" dirty="0" smtClean="0">
               <a:latin typeface="Courier New" panose="02070309020205020404" pitchFamily="49" charset="0"/>
               <a:cs typeface="Courier New" panose="02070309020205020404" pitchFamily="49" charset="0"/>
             </a:rPr>
             <a:t>)</a:t>
           </a:r>
-          <a:endParaRPr lang="ru-RU" sz="1000" dirty="0">
+          <a:endParaRPr lang="ru-RU" sz="1200" dirty="0">
             <a:latin typeface="Courier New" panose="02070309020205020404" pitchFamily="49" charset="0"/>
             <a:cs typeface="Courier New" panose="02070309020205020404" pitchFamily="49" charset="0"/>
           </a:endParaRPr>
@@ -2419,16 +2403,20 @@
         <a:p>
           <a:pPr algn="l"/>
           <a:r>
-            <a:rPr lang="ru-RU" sz="1000" dirty="0" smtClean="0">
+            <a:rPr lang="ru-RU" sz="1100" dirty="0" smtClean="0">
               <a:latin typeface="Courier New" panose="02070309020205020404" pitchFamily="49" charset="0"/>
               <a:cs typeface="Courier New" panose="02070309020205020404" pitchFamily="49" charset="0"/>
             </a:rPr>
-            <a:t>Машинный код</a:t>
+            <a:t>Машинный </a:t>
           </a:r>
-        </a:p>
-        <a:p>
-          <a:pPr algn="l"/>
-          <a:endParaRPr lang="ru-RU" sz="1000" dirty="0" smtClean="0">
+          <a:r>
+            <a:rPr lang="ru-RU" sz="1100" dirty="0" smtClean="0">
+              <a:latin typeface="Courier New" panose="02070309020205020404" pitchFamily="49" charset="0"/>
+              <a:cs typeface="Courier New" panose="02070309020205020404" pitchFamily="49" charset="0"/>
+            </a:rPr>
+            <a:t>код</a:t>
+          </a:r>
+          <a:endParaRPr lang="ru-RU" sz="1100" dirty="0" smtClean="0">
             <a:solidFill>
               <a:srgbClr val="7030A0"/>
             </a:solidFill>
@@ -2439,7 +2427,7 @@
         <a:p>
           <a:pPr algn="l"/>
           <a:r>
-            <a:rPr lang="ru-RU" sz="1000" dirty="0" smtClean="0">
+            <a:rPr lang="ru-RU" sz="1100" dirty="0" smtClean="0">
               <a:solidFill>
                 <a:srgbClr val="7030A0"/>
               </a:solidFill>
@@ -2449,7 +2437,7 @@
             <a:t>1010000101000100111101011010010110101</a:t>
           </a:r>
           <a:r>
-            <a:rPr lang="en-US" sz="1000" dirty="0" smtClean="0">
+            <a:rPr lang="en-US" sz="1100" dirty="0" smtClean="0">
               <a:solidFill>
                 <a:srgbClr val="7030A0"/>
               </a:solidFill>
@@ -2458,7 +2446,7 @@
             </a:rPr>
             <a:t>001</a:t>
           </a:r>
-          <a:endParaRPr lang="ru-RU" sz="1000" dirty="0"/>
+          <a:endParaRPr lang="ru-RU" sz="1100" dirty="0"/>
         </a:p>
       </dgm:t>
     </dgm:pt>
@@ -2507,11 +2495,11 @@
       <dgm:spPr/>
     </dgm:pt>
     <dgm:pt modelId="{92AA7814-392E-4CEF-88B8-62DA007AA05F}" type="pres">
-      <dgm:prSet presAssocID="{47308C15-BB5E-4FAE-88A7-842E9B55661B}" presName="bentUpArrow1" presStyleLbl="alignImgPlace1" presStyleIdx="0" presStyleCnt="2" custScaleX="220467" custScaleY="71980" custLinFactX="-96059" custLinFactNeighborX="-100000" custLinFactNeighborY="19189"/>
+      <dgm:prSet presAssocID="{47308C15-BB5E-4FAE-88A7-842E9B55661B}" presName="bentUpArrow1" presStyleLbl="alignImgPlace1" presStyleIdx="0" presStyleCnt="2" custScaleX="220467" custScaleY="71980" custLinFactX="-92177" custLinFactNeighborX="-100000" custLinFactNeighborY="14500"/>
       <dgm:spPr/>
     </dgm:pt>
     <dgm:pt modelId="{4B334BE6-ACF8-4FAB-8082-B17AC276E167}" type="pres">
-      <dgm:prSet presAssocID="{47308C15-BB5E-4FAE-88A7-842E9B55661B}" presName="ParentText" presStyleLbl="node1" presStyleIdx="0" presStyleCnt="3" custScaleX="213913" custScaleY="125319" custLinFactX="-86119" custLinFactNeighborX="-100000" custLinFactNeighborY="14738">
+      <dgm:prSet presAssocID="{47308C15-BB5E-4FAE-88A7-842E9B55661B}" presName="ParentText" presStyleLbl="node1" presStyleIdx="0" presStyleCnt="3" custScaleX="150445" custScaleY="97921" custLinFactX="-91295" custLinFactNeighborX="-100000" custLinFactNeighborY="17474">
         <dgm:presLayoutVars>
           <dgm:chMax val="1"/>
           <dgm:chPref val="1"/>
@@ -2553,11 +2541,11 @@
       <dgm:spPr/>
     </dgm:pt>
     <dgm:pt modelId="{7339C448-4F32-4FB7-A5C6-572D5FB2BAA3}" type="pres">
-      <dgm:prSet presAssocID="{28E0CA74-4406-4E0A-B138-A97164140C6A}" presName="bentUpArrow1" presStyleLbl="alignImgPlace1" presStyleIdx="1" presStyleCnt="2" custScaleX="240737" custScaleY="67142" custLinFactNeighborX="19422" custLinFactNeighborY="85"/>
+      <dgm:prSet presAssocID="{28E0CA74-4406-4E0A-B138-A97164140C6A}" presName="bentUpArrow1" presStyleLbl="alignImgPlace1" presStyleIdx="1" presStyleCnt="2" custScaleX="240737" custScaleY="67142" custLinFactNeighborX="11143" custLinFactNeighborY="-3668"/>
       <dgm:spPr/>
     </dgm:pt>
     <dgm:pt modelId="{7A3DC7ED-13A1-4E50-84AA-A8F3BFFC528E}" type="pres">
-      <dgm:prSet presAssocID="{28E0CA74-4406-4E0A-B138-A97164140C6A}" presName="ParentText" presStyleLbl="node1" presStyleIdx="1" presStyleCnt="3" custScaleX="212993" custLinFactNeighborX="-63579" custLinFactNeighborY="13196">
+      <dgm:prSet presAssocID="{28E0CA74-4406-4E0A-B138-A97164140C6A}" presName="ParentText" presStyleLbl="node1" presStyleIdx="1" presStyleCnt="3" custScaleX="212993" custLinFactNeighborX="-62811" custLinFactNeighborY="4246">
         <dgm:presLayoutVars>
           <dgm:chMax val="1"/>
           <dgm:chPref val="1"/>
@@ -2599,7 +2587,7 @@
       <dgm:spPr/>
     </dgm:pt>
     <dgm:pt modelId="{215F8DC2-0B97-4F81-9541-179194B83308}" type="pres">
-      <dgm:prSet presAssocID="{A8F932AA-A515-4A3C-83CC-293F6EB04442}" presName="ParentText" presStyleLbl="node1" presStyleIdx="2" presStyleCnt="3" custScaleX="145116" custLinFactNeighborX="87662" custLinFactNeighborY="-10468">
+      <dgm:prSet presAssocID="{A8F932AA-A515-4A3C-83CC-293F6EB04442}" presName="ParentText" presStyleLbl="node1" presStyleIdx="2" presStyleCnt="3" custScaleX="151621" custLinFactX="7314" custLinFactNeighborX="100000" custLinFactNeighborY="-4607">
         <dgm:presLayoutVars>
           <dgm:chMax val="1"/>
           <dgm:chPref val="1"/>
@@ -2708,12 +2696,12 @@
         </a:fontRef>
       </dsp:style>
       <dsp:txBody>
-        <a:bodyPr spcFirstLastPara="0" vert="horz" wrap="square" lIns="38100" tIns="38100" rIns="38100" bIns="38100" numCol="1" spcCol="1270" anchor="ctr" anchorCtr="0">
+        <a:bodyPr spcFirstLastPara="0" vert="horz" wrap="square" lIns="41910" tIns="41910" rIns="41910" bIns="41910" numCol="1" spcCol="1270" anchor="ctr" anchorCtr="0">
           <a:noAutofit/>
         </a:bodyPr>
         <a:lstStyle/>
         <a:p>
-          <a:pPr lvl="0" algn="l" defTabSz="444500">
+          <a:pPr lvl="0" algn="l" defTabSz="488950">
             <a:lnSpc>
               <a:spcPct val="90000"/>
             </a:lnSpc>
@@ -2725,36 +2713,26 @@
             </a:spcAft>
           </a:pPr>
           <a:r>
-            <a:rPr lang="ru-RU" sz="1000" kern="1200" dirty="0" smtClean="0">
+            <a:rPr lang="ru-RU" sz="1100" kern="1200" dirty="0" smtClean="0">
               <a:latin typeface="Courier New" panose="02070309020205020404" pitchFamily="49" charset="0"/>
               <a:cs typeface="Courier New" panose="02070309020205020404" pitchFamily="49" charset="0"/>
             </a:rPr>
-            <a:t>Исходный код</a:t>
+            <a:t>Исходный </a:t>
           </a:r>
-          <a:endParaRPr lang="en-US" sz="1000" kern="1200" dirty="0" smtClean="0">
+          <a:r>
+            <a:rPr lang="ru-RU" sz="1100" kern="1200" dirty="0" smtClean="0">
+              <a:latin typeface="Courier New" panose="02070309020205020404" pitchFamily="49" charset="0"/>
+              <a:cs typeface="Courier New" panose="02070309020205020404" pitchFamily="49" charset="0"/>
+            </a:rPr>
+            <a:t>код</a:t>
+          </a:r>
+          <a:endParaRPr lang="ru-RU" sz="1100" kern="1200" dirty="0" smtClean="0">
             <a:latin typeface="Courier New" panose="02070309020205020404" pitchFamily="49" charset="0"/>
             <a:cs typeface="Courier New" panose="02070309020205020404" pitchFamily="49" charset="0"/>
           </a:endParaRPr>
         </a:p>
         <a:p>
-          <a:pPr lvl="0" algn="l" defTabSz="444500">
-            <a:lnSpc>
-              <a:spcPct val="90000"/>
-            </a:lnSpc>
-            <a:spcBef>
-              <a:spcPct val="0"/>
-            </a:spcBef>
-            <a:spcAft>
-              <a:spcPct val="35000"/>
-            </a:spcAft>
-          </a:pPr>
-          <a:endParaRPr lang="ru-RU" sz="1000" kern="1200" dirty="0" smtClean="0">
-            <a:latin typeface="Courier New" panose="02070309020205020404" pitchFamily="49" charset="0"/>
-            <a:cs typeface="Courier New" panose="02070309020205020404" pitchFamily="49" charset="0"/>
-          </a:endParaRPr>
-        </a:p>
-        <a:p>
-          <a:pPr lvl="0" algn="l" defTabSz="444500">
+          <a:pPr lvl="0" algn="l" defTabSz="488950">
             <a:lnSpc>
               <a:spcPct val="90000"/>
             </a:lnSpc>
@@ -2766,7 +2744,7 @@
             </a:spcAft>
           </a:pPr>
           <a:r>
-            <a:rPr lang="en-US" sz="900" kern="1200" dirty="0" smtClean="0">
+            <a:rPr lang="en-US" sz="1100" kern="1200" dirty="0" smtClean="0">
               <a:solidFill>
                 <a:schemeClr val="accent2"/>
               </a:solidFill>
@@ -2776,14 +2754,14 @@
             <a:t>int</a:t>
           </a:r>
           <a:r>
-            <a:rPr lang="en-US" sz="900" kern="1200" dirty="0" smtClean="0">
+            <a:rPr lang="en-US" sz="1100" kern="1200" dirty="0" smtClean="0">
               <a:latin typeface="Courier New" panose="02070309020205020404" pitchFamily="49" charset="0"/>
               <a:cs typeface="Courier New" panose="02070309020205020404" pitchFamily="49" charset="0"/>
             </a:rPr>
             <a:t> </a:t>
           </a:r>
           <a:r>
-            <a:rPr lang="en-US" sz="900" kern="1200" dirty="0" smtClean="0">
+            <a:rPr lang="en-US" sz="1100" kern="1200" dirty="0" smtClean="0">
               <a:solidFill>
                 <a:schemeClr val="accent1"/>
               </a:solidFill>
@@ -2793,14 +2771,14 @@
             <a:t>main</a:t>
           </a:r>
           <a:r>
-            <a:rPr lang="en-US" sz="900" kern="1200" dirty="0" smtClean="0">
+            <a:rPr lang="en-US" sz="1100" kern="1200" dirty="0" smtClean="0">
               <a:latin typeface="Courier New" panose="02070309020205020404" pitchFamily="49" charset="0"/>
               <a:cs typeface="Courier New" panose="02070309020205020404" pitchFamily="49" charset="0"/>
             </a:rPr>
             <a:t>(</a:t>
           </a:r>
           <a:r>
-            <a:rPr lang="en-US" sz="900" kern="1200" dirty="0" smtClean="0">
+            <a:rPr lang="en-US" sz="1100" kern="1200" dirty="0" smtClean="0">
               <a:solidFill>
                 <a:schemeClr val="accent2"/>
               </a:solidFill>
@@ -2810,14 +2788,14 @@
             <a:t>int</a:t>
           </a:r>
           <a:r>
-            <a:rPr lang="en-US" sz="900" kern="1200" dirty="0" smtClean="0">
+            <a:rPr lang="en-US" sz="1100" kern="1200" dirty="0" smtClean="0">
               <a:latin typeface="Courier New" panose="02070309020205020404" pitchFamily="49" charset="0"/>
               <a:cs typeface="Courier New" panose="02070309020205020404" pitchFamily="49" charset="0"/>
             </a:rPr>
             <a:t> argc, </a:t>
           </a:r>
           <a:r>
-            <a:rPr lang="en-US" sz="900" kern="1200" dirty="0" smtClean="0">
+            <a:rPr lang="en-US" sz="1100" kern="1200" dirty="0" smtClean="0">
               <a:solidFill>
                 <a:schemeClr val="accent2">
                   <a:lumMod val="50000"/>
@@ -2829,7 +2807,7 @@
             <a:t>char** </a:t>
           </a:r>
           <a:r>
-            <a:rPr lang="en-US" sz="900" kern="1200" dirty="0" smtClean="0">
+            <a:rPr lang="en-US" sz="1100" kern="1200" dirty="0" smtClean="0">
               <a:latin typeface="Courier New" panose="02070309020205020404" pitchFamily="49" charset="0"/>
               <a:cs typeface="Courier New" panose="02070309020205020404" pitchFamily="49" charset="0"/>
             </a:rPr>
@@ -2837,7 +2815,7 @@
           </a:r>
         </a:p>
         <a:p>
-          <a:pPr lvl="0" algn="l" defTabSz="444500">
+          <a:pPr lvl="0" algn="l" defTabSz="488950">
             <a:lnSpc>
               <a:spcPct val="90000"/>
             </a:lnSpc>
@@ -2849,14 +2827,14 @@
             </a:spcAft>
           </a:pPr>
           <a:r>
-            <a:rPr lang="en-US" sz="900" kern="1200" dirty="0" smtClean="0">
+            <a:rPr lang="en-US" sz="1100" kern="1200" dirty="0" smtClean="0">
               <a:latin typeface="Courier New" panose="02070309020205020404" pitchFamily="49" charset="0"/>
               <a:cs typeface="Courier New" panose="02070309020205020404" pitchFamily="49" charset="0"/>
             </a:rPr>
             <a:t>    </a:t>
           </a:r>
           <a:r>
-            <a:rPr lang="en-US" sz="900" kern="1200" dirty="0" smtClean="0">
+            <a:rPr lang="en-US" sz="1100" kern="1200" dirty="0" smtClean="0">
               <a:solidFill>
                 <a:schemeClr val="accent1"/>
               </a:solidFill>
@@ -2866,14 +2844,14 @@
             <a:t>printf</a:t>
           </a:r>
           <a:r>
-            <a:rPr lang="en-US" sz="900" kern="1200" dirty="0" smtClean="0">
+            <a:rPr lang="en-US" sz="1100" kern="1200" dirty="0" smtClean="0">
               <a:latin typeface="Courier New" panose="02070309020205020404" pitchFamily="49" charset="0"/>
               <a:cs typeface="Courier New" panose="02070309020205020404" pitchFamily="49" charset="0"/>
             </a:rPr>
             <a:t>(</a:t>
           </a:r>
           <a:r>
-            <a:rPr lang="en-US" sz="900" kern="1200" dirty="0" smtClean="0">
+            <a:rPr lang="en-US" sz="1100" kern="1200" dirty="0" smtClean="0">
               <a:solidFill>
                 <a:schemeClr val="accent6"/>
               </a:solidFill>
@@ -2883,7 +2861,7 @@
             <a:t>“Hello world”</a:t>
           </a:r>
           <a:r>
-            <a:rPr lang="en-US" sz="900" kern="1200" dirty="0" smtClean="0">
+            <a:rPr lang="en-US" sz="1100" kern="1200" dirty="0" smtClean="0">
               <a:latin typeface="Courier New" panose="02070309020205020404" pitchFamily="49" charset="0"/>
               <a:cs typeface="Courier New" panose="02070309020205020404" pitchFamily="49" charset="0"/>
             </a:rPr>
@@ -2891,7 +2869,7 @@
           </a:r>
         </a:p>
         <a:p>
-          <a:pPr lvl="0" algn="l" defTabSz="444500">
+          <a:pPr lvl="0" algn="l" defTabSz="488950">
             <a:lnSpc>
               <a:spcPct val="90000"/>
             </a:lnSpc>
@@ -3045,12 +3023,12 @@
         </a:fontRef>
       </dsp:style>
       <dsp:txBody>
-        <a:bodyPr spcFirstLastPara="0" vert="horz" wrap="square" lIns="38100" tIns="38100" rIns="38100" bIns="38100" numCol="1" spcCol="1270" anchor="ctr" anchorCtr="0">
+        <a:bodyPr spcFirstLastPara="0" vert="horz" wrap="square" lIns="41910" tIns="41910" rIns="41910" bIns="41910" numCol="1" spcCol="1270" anchor="ctr" anchorCtr="0">
           <a:noAutofit/>
         </a:bodyPr>
         <a:lstStyle/>
         <a:p>
-          <a:pPr lvl="0" algn="l" defTabSz="444500">
+          <a:pPr lvl="0" algn="l" defTabSz="488950">
             <a:lnSpc>
               <a:spcPct val="90000"/>
             </a:lnSpc>
@@ -3062,7 +3040,7 @@
             </a:spcAft>
           </a:pPr>
           <a:r>
-            <a:rPr lang="ru-RU" sz="1000" kern="1200" dirty="0" smtClean="0">
+            <a:rPr lang="ru-RU" sz="1100" kern="1200" dirty="0" smtClean="0">
               <a:latin typeface="Courier New" panose="02070309020205020404" pitchFamily="49" charset="0"/>
               <a:cs typeface="Courier New" panose="02070309020205020404" pitchFamily="49" charset="0"/>
             </a:rPr>
@@ -3070,7 +3048,7 @@
           </a:r>
         </a:p>
         <a:p>
-          <a:pPr lvl="0" algn="l" defTabSz="444500">
+          <a:pPr lvl="0" algn="l" defTabSz="488950">
             <a:lnSpc>
               <a:spcPct val="90000"/>
             </a:lnSpc>
@@ -3081,7 +3059,7 @@
               <a:spcPct val="35000"/>
             </a:spcAft>
           </a:pPr>
-          <a:endParaRPr lang="ru-RU" sz="1000" kern="1200" dirty="0" smtClean="0">
+          <a:endParaRPr lang="ru-RU" sz="1100" kern="1200" dirty="0" smtClean="0">
             <a:solidFill>
               <a:srgbClr val="7030A0"/>
             </a:solidFill>
@@ -3090,7 +3068,7 @@
           </a:endParaRPr>
         </a:p>
         <a:p>
-          <a:pPr lvl="0" algn="l" defTabSz="444500">
+          <a:pPr lvl="0" algn="l" defTabSz="488950">
             <a:lnSpc>
               <a:spcPct val="90000"/>
             </a:lnSpc>
@@ -3102,7 +3080,7 @@
             </a:spcAft>
           </a:pPr>
           <a:r>
-            <a:rPr lang="ru-RU" sz="1000" kern="1200" dirty="0" smtClean="0">
+            <a:rPr lang="ru-RU" sz="1100" kern="1200" dirty="0" smtClean="0">
               <a:solidFill>
                 <a:srgbClr val="7030A0"/>
               </a:solidFill>
@@ -3112,7 +3090,7 @@
             <a:t>101000010100010011110101101001011010101010111110</a:t>
           </a:r>
           <a:r>
-            <a:rPr lang="en-US" sz="1000" kern="1200" dirty="0" smtClean="0">
+            <a:rPr lang="en-US" sz="1100" kern="1200" dirty="0" smtClean="0">
               <a:solidFill>
                 <a:srgbClr val="7030A0"/>
               </a:solidFill>
@@ -3121,7 +3099,7 @@
             </a:rPr>
             <a:t>11111000000101101010011100</a:t>
           </a:r>
-          <a:endParaRPr lang="ru-RU" sz="1000" kern="1200" dirty="0">
+          <a:endParaRPr lang="ru-RU" sz="1100" kern="1200" dirty="0">
             <a:solidFill>
               <a:srgbClr val="7030A0"/>
             </a:solidFill>
@@ -3154,8 +3132,8 @@
       </dsp:nvSpPr>
       <dsp:spPr>
         <a:xfrm rot="5400000">
-          <a:off x="1948607" y="563179"/>
-          <a:ext cx="516992" cy="1802750"/>
+          <a:off x="1628196" y="432209"/>
+          <a:ext cx="540599" cy="1885068"/>
         </a:xfrm>
         <a:prstGeom prst="bentUpArrow">
           <a:avLst>
@@ -3208,8 +3186,8 @@
       </dsp:nvSpPr>
       <dsp:spPr>
         <a:xfrm>
-          <a:off x="321827" y="139285"/>
-          <a:ext cx="2586425" cy="1060614"/>
+          <a:off x="229718" y="169621"/>
+          <a:ext cx="1902093" cy="866578"/>
         </a:xfrm>
         <a:prstGeom prst="roundRect">
           <a:avLst>
@@ -3254,12 +3232,12 @@
         </a:fontRef>
       </dsp:style>
       <dsp:txBody>
-        <a:bodyPr spcFirstLastPara="0" vert="horz" wrap="square" lIns="38100" tIns="38100" rIns="38100" bIns="38100" numCol="1" spcCol="1270" anchor="ctr" anchorCtr="0">
+        <a:bodyPr spcFirstLastPara="0" vert="horz" wrap="square" lIns="45720" tIns="45720" rIns="45720" bIns="45720" numCol="1" spcCol="1270" anchor="ctr" anchorCtr="0">
           <a:noAutofit/>
         </a:bodyPr>
         <a:lstStyle/>
         <a:p>
-          <a:pPr lvl="0" algn="l" defTabSz="444500">
+          <a:pPr lvl="0" algn="l" defTabSz="533400">
             <a:lnSpc>
               <a:spcPct val="90000"/>
             </a:lnSpc>
@@ -3271,36 +3249,26 @@
             </a:spcAft>
           </a:pPr>
           <a:r>
-            <a:rPr lang="ru-RU" sz="1000" kern="1200" dirty="0" smtClean="0">
+            <a:rPr lang="ru-RU" sz="1200" kern="1200" dirty="0" smtClean="0">
               <a:latin typeface="Courier New" panose="02070309020205020404" pitchFamily="49" charset="0"/>
               <a:cs typeface="Courier New" panose="02070309020205020404" pitchFamily="49" charset="0"/>
             </a:rPr>
-            <a:t>Исходный код</a:t>
+            <a:t>Исходный </a:t>
           </a:r>
-          <a:endParaRPr lang="en-US" sz="1000" kern="1200" dirty="0" smtClean="0">
+          <a:r>
+            <a:rPr lang="ru-RU" sz="1200" kern="1200" dirty="0" smtClean="0">
+              <a:latin typeface="Courier New" panose="02070309020205020404" pitchFamily="49" charset="0"/>
+              <a:cs typeface="Courier New" panose="02070309020205020404" pitchFamily="49" charset="0"/>
+            </a:rPr>
+            <a:t>код</a:t>
+          </a:r>
+          <a:endParaRPr lang="ru-RU" sz="1200" kern="1200" dirty="0" smtClean="0">
             <a:latin typeface="Courier New" panose="02070309020205020404" pitchFamily="49" charset="0"/>
             <a:cs typeface="Courier New" panose="02070309020205020404" pitchFamily="49" charset="0"/>
           </a:endParaRPr>
         </a:p>
         <a:p>
-          <a:pPr lvl="0" algn="l" defTabSz="444500">
-            <a:lnSpc>
-              <a:spcPct val="90000"/>
-            </a:lnSpc>
-            <a:spcBef>
-              <a:spcPct val="0"/>
-            </a:spcBef>
-            <a:spcAft>
-              <a:spcPct val="35000"/>
-            </a:spcAft>
-          </a:pPr>
-          <a:endParaRPr lang="ru-RU" sz="1000" kern="1200" dirty="0" smtClean="0">
-            <a:latin typeface="Courier New" panose="02070309020205020404" pitchFamily="49" charset="0"/>
-            <a:cs typeface="Courier New" panose="02070309020205020404" pitchFamily="49" charset="0"/>
-          </a:endParaRPr>
-        </a:p>
-        <a:p>
-          <a:pPr lvl="0" algn="l" defTabSz="444500">
+          <a:pPr lvl="0" algn="l" defTabSz="533400">
             <a:lnSpc>
               <a:spcPct val="90000"/>
             </a:lnSpc>
@@ -3312,7 +3280,7 @@
             </a:spcAft>
           </a:pPr>
           <a:r>
-            <a:rPr lang="en-US" sz="1000" kern="1200" dirty="0" smtClean="0">
+            <a:rPr lang="en-US" sz="1200" kern="1200" dirty="0" smtClean="0">
               <a:solidFill>
                 <a:srgbClr val="C00000"/>
               </a:solidFill>
@@ -3322,7 +3290,7 @@
             <a:t>import </a:t>
           </a:r>
           <a:r>
-            <a:rPr lang="en-US" sz="1000" kern="1200" dirty="0" smtClean="0">
+            <a:rPr lang="en-US" sz="1200" kern="1200" dirty="0" smtClean="0">
               <a:solidFill>
                 <a:schemeClr val="accent6">
                   <a:lumMod val="75000"/>
@@ -3335,7 +3303,7 @@
           </a:r>
         </a:p>
         <a:p>
-          <a:pPr lvl="0" algn="l" defTabSz="444500">
+          <a:pPr lvl="0" algn="l" defTabSz="533400">
             <a:lnSpc>
               <a:spcPct val="90000"/>
             </a:lnSpc>
@@ -3347,7 +3315,7 @@
             </a:spcAft>
           </a:pPr>
           <a:r>
-            <a:rPr lang="en-US" sz="1000" kern="1200" dirty="0" smtClean="0">
+            <a:rPr lang="en-US" sz="1200" kern="1200" dirty="0" smtClean="0">
               <a:solidFill>
                 <a:schemeClr val="accent1">
                   <a:lumMod val="75000"/>
@@ -3359,7 +3327,7 @@
             <a:t>print</a:t>
           </a:r>
           <a:r>
-            <a:rPr lang="en-US" sz="1000" kern="1200" dirty="0" smtClean="0">
+            <a:rPr lang="en-US" sz="1200" kern="1200" dirty="0" smtClean="0">
               <a:latin typeface="Courier New" panose="02070309020205020404" pitchFamily="49" charset="0"/>
               <a:cs typeface="Courier New" panose="02070309020205020404" pitchFamily="49" charset="0"/>
             </a:rPr>
@@ -3367,7 +3335,7 @@
           </a:r>
         </a:p>
         <a:p>
-          <a:pPr lvl="0" algn="l" defTabSz="444500">
+          <a:pPr lvl="0" algn="l" defTabSz="533400">
             <a:lnSpc>
               <a:spcPct val="90000"/>
             </a:lnSpc>
@@ -3382,8 +3350,8 @@
         </a:p>
       </dsp:txBody>
       <dsp:txXfrm>
-        <a:off x="373611" y="191069"/>
-        <a:ext cx="2482857" cy="957046"/>
+        <a:off x="272028" y="211931"/>
+        <a:ext cx="1817473" cy="781958"/>
       </dsp:txXfrm>
     </dsp:sp>
     <dsp:sp modelId="{28A97473-3973-4CCA-8A5D-307CD9A5C11E}">
@@ -3393,8 +3361,8 @@
       </dsp:nvSpPr>
       <dsp:spPr>
         <a:xfrm>
-          <a:off x="4469959" y="202411"/>
-          <a:ext cx="879385" cy="684042"/>
+          <a:off x="4231486" y="90183"/>
+          <a:ext cx="919539" cy="715277"/>
         </a:xfrm>
         <a:prstGeom prst="rect">
           <a:avLst/>
@@ -3425,8 +3393,8 @@
       </dsp:nvSpPr>
       <dsp:spPr>
         <a:xfrm rot="5400000">
-          <a:off x="5055431" y="1193176"/>
-          <a:ext cx="482243" cy="1968497"/>
+          <a:off x="4955983" y="1098003"/>
+          <a:ext cx="504264" cy="2058383"/>
         </a:xfrm>
         <a:prstGeom prst="bentUpArrow">
           <a:avLst>
@@ -3479,8 +3447,8 @@
       </dsp:nvSpPr>
       <dsp:spPr>
         <a:xfrm>
-          <a:off x="3136492" y="1083459"/>
-          <a:ext cx="2575301" cy="846331"/>
+          <a:off x="3029919" y="932257"/>
+          <a:ext cx="2692895" cy="884977"/>
         </a:xfrm>
         <a:prstGeom prst="roundRect">
           <a:avLst>
@@ -3525,12 +3493,12 @@
         </a:fontRef>
       </dsp:style>
       <dsp:txBody>
-        <a:bodyPr spcFirstLastPara="0" vert="horz" wrap="square" lIns="38100" tIns="38100" rIns="38100" bIns="38100" numCol="1" spcCol="1270" anchor="ctr" anchorCtr="0">
+        <a:bodyPr spcFirstLastPara="0" vert="horz" wrap="square" lIns="45720" tIns="45720" rIns="45720" bIns="45720" numCol="1" spcCol="1270" anchor="ctr" anchorCtr="0">
           <a:noAutofit/>
         </a:bodyPr>
         <a:lstStyle/>
         <a:p>
-          <a:pPr lvl="0" algn="l" defTabSz="444500">
+          <a:pPr lvl="0" algn="l" defTabSz="533400">
             <a:lnSpc>
               <a:spcPct val="90000"/>
             </a:lnSpc>
@@ -3542,7 +3510,7 @@
             </a:spcAft>
           </a:pPr>
           <a:r>
-            <a:rPr lang="ru-RU" sz="1000" kern="1200" dirty="0" smtClean="0">
+            <a:rPr lang="ru-RU" sz="1200" kern="1200" dirty="0" smtClean="0">
               <a:latin typeface="Courier New" panose="02070309020205020404" pitchFamily="49" charset="0"/>
               <a:cs typeface="Courier New" panose="02070309020205020404" pitchFamily="49" charset="0"/>
             </a:rPr>
@@ -3550,7 +3518,7 @@
           </a:r>
         </a:p>
         <a:p>
-          <a:pPr lvl="0" algn="l" defTabSz="444500">
+          <a:pPr lvl="0" algn="l" defTabSz="533400">
             <a:lnSpc>
               <a:spcPct val="90000"/>
             </a:lnSpc>
@@ -3562,14 +3530,14 @@
             </a:spcAft>
           </a:pPr>
           <a:r>
-            <a:rPr lang="ru-RU" sz="1000" kern="1200" dirty="0" smtClean="0">
+            <a:rPr lang="ru-RU" sz="1200" kern="1200" dirty="0" smtClean="0">
               <a:latin typeface="Courier New" panose="02070309020205020404" pitchFamily="49" charset="0"/>
               <a:cs typeface="Courier New" panose="02070309020205020404" pitchFamily="49" charset="0"/>
             </a:rPr>
             <a:t>0 </a:t>
           </a:r>
           <a:r>
-            <a:rPr lang="en-US" sz="1000" kern="1200" dirty="0" smtClean="0">
+            <a:rPr lang="en-US" sz="1200" kern="1200" dirty="0" smtClean="0">
               <a:solidFill>
                 <a:schemeClr val="accent1">
                   <a:lumMod val="75000"/>
@@ -3581,14 +3549,14 @@
             <a:t>LOAD_NAME</a:t>
           </a:r>
           <a:r>
-            <a:rPr lang="en-US" sz="1000" kern="1200" dirty="0" smtClean="0">
+            <a:rPr lang="en-US" sz="1200" kern="1200" dirty="0" smtClean="0">
               <a:latin typeface="Courier New" panose="02070309020205020404" pitchFamily="49" charset="0"/>
               <a:cs typeface="Courier New" panose="02070309020205020404" pitchFamily="49" charset="0"/>
             </a:rPr>
             <a:t> 0 (</a:t>
           </a:r>
           <a:r>
-            <a:rPr lang="en-US" sz="1000" kern="1200" dirty="0" smtClean="0">
+            <a:rPr lang="en-US" sz="1200" kern="1200" dirty="0" smtClean="0">
               <a:solidFill>
                 <a:schemeClr val="accent6">
                   <a:lumMod val="50000"/>
@@ -3600,7 +3568,7 @@
             <a:t>print</a:t>
           </a:r>
           <a:r>
-            <a:rPr lang="en-US" sz="1000" kern="1200" dirty="0" smtClean="0">
+            <a:rPr lang="en-US" sz="1200" kern="1200" dirty="0" smtClean="0">
               <a:latin typeface="Courier New" panose="02070309020205020404" pitchFamily="49" charset="0"/>
               <a:cs typeface="Courier New" panose="02070309020205020404" pitchFamily="49" charset="0"/>
             </a:rPr>
@@ -3608,7 +3576,7 @@
           </a:r>
         </a:p>
         <a:p>
-          <a:pPr lvl="0" algn="l" defTabSz="444500">
+          <a:pPr lvl="0" algn="l" defTabSz="533400">
             <a:lnSpc>
               <a:spcPct val="90000"/>
             </a:lnSpc>
@@ -3620,14 +3588,14 @@
             </a:spcAft>
           </a:pPr>
           <a:r>
-            <a:rPr lang="en-US" sz="1000" kern="1200" dirty="0" smtClean="0">
+            <a:rPr lang="en-US" sz="1200" kern="1200" dirty="0" smtClean="0">
               <a:latin typeface="Courier New" panose="02070309020205020404" pitchFamily="49" charset="0"/>
               <a:cs typeface="Courier New" panose="02070309020205020404" pitchFamily="49" charset="0"/>
             </a:rPr>
             <a:t>1 </a:t>
           </a:r>
           <a:r>
-            <a:rPr lang="en-US" sz="1000" kern="1200" dirty="0" smtClean="0">
+            <a:rPr lang="en-US" sz="1200" kern="1200" dirty="0" smtClean="0">
               <a:solidFill>
                 <a:schemeClr val="accent1">
                   <a:lumMod val="75000"/>
@@ -3639,14 +3607,14 @@
             <a:t>LOAD_CONSTANT</a:t>
           </a:r>
           <a:r>
-            <a:rPr lang="en-US" sz="1000" kern="1200" dirty="0" smtClean="0">
+            <a:rPr lang="en-US" sz="1200" kern="1200" dirty="0" smtClean="0">
               <a:latin typeface="Courier New" panose="02070309020205020404" pitchFamily="49" charset="0"/>
               <a:cs typeface="Courier New" panose="02070309020205020404" pitchFamily="49" charset="0"/>
             </a:rPr>
             <a:t> 0 (</a:t>
           </a:r>
           <a:r>
-            <a:rPr lang="en-US" sz="1000" kern="1200" dirty="0" smtClean="0">
+            <a:rPr lang="en-US" sz="1200" kern="1200" dirty="0" smtClean="0">
               <a:solidFill>
                 <a:schemeClr val="accent6">
                   <a:lumMod val="50000"/>
@@ -3658,21 +3626,21 @@
             <a:t>time</a:t>
           </a:r>
           <a:r>
-            <a:rPr lang="en-US" sz="1000" kern="1200" dirty="0" smtClean="0">
+            <a:rPr lang="en-US" sz="1200" kern="1200" dirty="0" smtClean="0">
               <a:latin typeface="Courier New" panose="02070309020205020404" pitchFamily="49" charset="0"/>
               <a:cs typeface="Courier New" panose="02070309020205020404" pitchFamily="49" charset="0"/>
             </a:rPr>
             <a:t>)</a:t>
           </a:r>
-          <a:endParaRPr lang="ru-RU" sz="1000" kern="1200" dirty="0">
+          <a:endParaRPr lang="ru-RU" sz="1200" kern="1200" dirty="0">
             <a:latin typeface="Courier New" panose="02070309020205020404" pitchFamily="49" charset="0"/>
             <a:cs typeface="Courier New" panose="02070309020205020404" pitchFamily="49" charset="0"/>
           </a:endParaRPr>
         </a:p>
       </dsp:txBody>
       <dsp:txXfrm>
-        <a:off x="3177814" y="1124781"/>
-        <a:ext cx="2492657" cy="763687"/>
+        <a:off x="3073128" y="975466"/>
+        <a:ext cx="2606477" cy="798559"/>
       </dsp:txXfrm>
     </dsp:sp>
     <dsp:sp modelId="{A40B288B-1641-4B7D-AE8C-CF35F9D5C5DD}">
@@ -3682,8 +3650,8 @@
       </dsp:nvSpPr>
       <dsp:spPr>
         <a:xfrm>
-          <a:off x="5797428" y="1052494"/>
-          <a:ext cx="879385" cy="684042"/>
+          <a:off x="5802649" y="979084"/>
+          <a:ext cx="919539" cy="715277"/>
         </a:xfrm>
         <a:prstGeom prst="rect">
           <a:avLst/>
@@ -3714,8 +3682,8 @@
       </dsp:nvSpPr>
       <dsp:spPr>
         <a:xfrm>
-          <a:off x="6298181" y="1715893"/>
-          <a:ext cx="1754599" cy="846331"/>
+          <a:off x="6405733" y="1724643"/>
+          <a:ext cx="1916962" cy="884977"/>
         </a:xfrm>
         <a:prstGeom prst="roundRect">
           <a:avLst>
@@ -3760,12 +3728,12 @@
         </a:fontRef>
       </dsp:style>
       <dsp:txBody>
-        <a:bodyPr spcFirstLastPara="0" vert="horz" wrap="square" lIns="38100" tIns="38100" rIns="38100" bIns="38100" numCol="1" spcCol="1270" anchor="ctr" anchorCtr="0">
+        <a:bodyPr spcFirstLastPara="0" vert="horz" wrap="square" lIns="41910" tIns="41910" rIns="41910" bIns="41910" numCol="1" spcCol="1270" anchor="ctr" anchorCtr="0">
           <a:noAutofit/>
         </a:bodyPr>
         <a:lstStyle/>
         <a:p>
-          <a:pPr lvl="0" algn="l" defTabSz="444500">
+          <a:pPr lvl="0" algn="l" defTabSz="488950">
             <a:lnSpc>
               <a:spcPct val="90000"/>
             </a:lnSpc>
@@ -3777,26 +3745,20 @@
             </a:spcAft>
           </a:pPr>
           <a:r>
-            <a:rPr lang="ru-RU" sz="1000" kern="1200" dirty="0" smtClean="0">
+            <a:rPr lang="ru-RU" sz="1100" kern="1200" dirty="0" smtClean="0">
               <a:latin typeface="Courier New" panose="02070309020205020404" pitchFamily="49" charset="0"/>
               <a:cs typeface="Courier New" panose="02070309020205020404" pitchFamily="49" charset="0"/>
             </a:rPr>
-            <a:t>Машинный код</a:t>
+            <a:t>Машинный </a:t>
           </a:r>
-        </a:p>
-        <a:p>
-          <a:pPr lvl="0" algn="l" defTabSz="444500">
-            <a:lnSpc>
-              <a:spcPct val="90000"/>
-            </a:lnSpc>
-            <a:spcBef>
-              <a:spcPct val="0"/>
-            </a:spcBef>
-            <a:spcAft>
-              <a:spcPct val="35000"/>
-            </a:spcAft>
-          </a:pPr>
-          <a:endParaRPr lang="ru-RU" sz="1000" kern="1200" dirty="0" smtClean="0">
+          <a:r>
+            <a:rPr lang="ru-RU" sz="1100" kern="1200" dirty="0" smtClean="0">
+              <a:latin typeface="Courier New" panose="02070309020205020404" pitchFamily="49" charset="0"/>
+              <a:cs typeface="Courier New" panose="02070309020205020404" pitchFamily="49" charset="0"/>
+            </a:rPr>
+            <a:t>код</a:t>
+          </a:r>
+          <a:endParaRPr lang="ru-RU" sz="1100" kern="1200" dirty="0" smtClean="0">
             <a:solidFill>
               <a:srgbClr val="7030A0"/>
             </a:solidFill>
@@ -3805,7 +3767,7 @@
           </a:endParaRPr>
         </a:p>
         <a:p>
-          <a:pPr lvl="0" algn="l" defTabSz="444500">
+          <a:pPr lvl="0" algn="l" defTabSz="488950">
             <a:lnSpc>
               <a:spcPct val="90000"/>
             </a:lnSpc>
@@ -3817,7 +3779,7 @@
             </a:spcAft>
           </a:pPr>
           <a:r>
-            <a:rPr lang="ru-RU" sz="1000" kern="1200" dirty="0" smtClean="0">
+            <a:rPr lang="ru-RU" sz="1100" kern="1200" dirty="0" smtClean="0">
               <a:solidFill>
                 <a:srgbClr val="7030A0"/>
               </a:solidFill>
@@ -3827,7 +3789,7 @@
             <a:t>1010000101000100111101011010010110101</a:t>
           </a:r>
           <a:r>
-            <a:rPr lang="en-US" sz="1000" kern="1200" dirty="0" smtClean="0">
+            <a:rPr lang="en-US" sz="1100" kern="1200" dirty="0" smtClean="0">
               <a:solidFill>
                 <a:srgbClr val="7030A0"/>
               </a:solidFill>
@@ -3836,12 +3798,12 @@
             </a:rPr>
             <a:t>001</a:t>
           </a:r>
-          <a:endParaRPr lang="ru-RU" sz="1000" kern="1200" dirty="0"/>
+          <a:endParaRPr lang="ru-RU" sz="1100" kern="1200" dirty="0"/>
         </a:p>
       </dsp:txBody>
       <dsp:txXfrm>
-        <a:off x="6339503" y="1757215"/>
-        <a:ext cx="1671955" cy="763687"/>
+        <a:off x="6448942" y="1767852"/>
+        <a:ext cx="1830544" cy="798559"/>
       </dsp:txXfrm>
     </dsp:sp>
   </dsp:spTree>
@@ -10200,446 +10162,6 @@
       </p:grpSpPr>
       <p:sp>
         <p:nvSpPr>
-          <p:cNvPr id="3" name="TextBox 2"/>
-          <p:cNvSpPr txBox="1"/>
-          <p:nvPr/>
-        </p:nvSpPr>
-        <p:spPr>
-          <a:xfrm>
-            <a:off x="1630837" y="209084"/>
-            <a:ext cx="8386741" cy="646331"/>
-          </a:xfrm>
-          <a:prstGeom prst="rect">
-            <a:avLst/>
-          </a:prstGeom>
-          <a:noFill/>
-        </p:spPr>
-        <p:txBody>
-          <a:bodyPr wrap="square" rtlCol="0">
-            <a:spAutoFit/>
-          </a:bodyPr>
-          <a:lstStyle/>
-          <a:p>
-            <a:r>
-              <a:rPr lang="ru-RU" sz="3600" b="1" dirty="0" smtClean="0">
-                <a:latin typeface="Courier New" panose="02070309020205020404" pitchFamily="49" charset="0"/>
-                <a:cs typeface="Courier New" panose="02070309020205020404" pitchFamily="49" charset="0"/>
-              </a:rPr>
-              <a:t>Модель работы веб-сервиса</a:t>
-            </a:r>
-            <a:endParaRPr lang="en-US" sz="3600" b="1" dirty="0">
-              <a:latin typeface="Courier New" panose="02070309020205020404" pitchFamily="49" charset="0"/>
-              <a:cs typeface="Courier New" panose="02070309020205020404" pitchFamily="49" charset="0"/>
-            </a:endParaRPr>
-          </a:p>
-        </p:txBody>
-      </p:sp>
-      <p:pic>
-        <p:nvPicPr>
-          <p:cNvPr id="4" name="Рисунок 3"/>
-          <p:cNvPicPr>
-            <a:picLocks noChangeAspect="1"/>
-          </p:cNvPicPr>
-          <p:nvPr/>
-        </p:nvPicPr>
-        <p:blipFill>
-          <a:blip r:embed="rId2">
-            <a:extLst>
-              <a:ext uri="{28A0092B-C50C-407E-A947-70E740481C1C}">
-                <a14:useLocalDpi xmlns:a14="http://schemas.microsoft.com/office/drawing/2010/main" val="0"/>
-              </a:ext>
-            </a:extLst>
-          </a:blip>
-          <a:stretch>
-            <a:fillRect/>
-          </a:stretch>
-        </p:blipFill>
-        <p:spPr>
-          <a:xfrm>
-            <a:off x="1630837" y="1034525"/>
-            <a:ext cx="7908174" cy="5206020"/>
-          </a:xfrm>
-          <a:prstGeom prst="rect">
-            <a:avLst/>
-          </a:prstGeom>
-          <a:ln>
-            <a:solidFill>
-              <a:schemeClr val="tx1"/>
-            </a:solidFill>
-          </a:ln>
-        </p:spPr>
-      </p:pic>
-    </p:spTree>
-    <p:extLst>
-      <p:ext uri="{BB962C8B-B14F-4D97-AF65-F5344CB8AC3E}">
-        <p14:creationId xmlns:p14="http://schemas.microsoft.com/office/powerpoint/2010/main" val="279697673"/>
-      </p:ext>
-    </p:extLst>
-  </p:cSld>
-  <p:clrMapOvr>
-    <a:masterClrMapping/>
-  </p:clrMapOvr>
-</p:sld>
-</file>
-
-<file path=ppt/slides/slide11.xml><?xml version="1.0" encoding="utf-8"?>
-<p:sld xmlns:a="http://schemas.openxmlformats.org/drawingml/2006/main" xmlns:r="http://schemas.openxmlformats.org/officeDocument/2006/relationships" xmlns:p="http://schemas.openxmlformats.org/presentationml/2006/main">
-  <p:cSld>
-    <p:bg>
-      <p:bgPr>
-        <a:pattFill prst="pct10">
-          <a:fgClr>
-            <a:schemeClr val="accent1">
-              <a:lumMod val="60000"/>
-              <a:lumOff val="40000"/>
-            </a:schemeClr>
-          </a:fgClr>
-          <a:bgClr>
-            <a:schemeClr val="bg1"/>
-          </a:bgClr>
-        </a:pattFill>
-        <a:effectLst/>
-      </p:bgPr>
-    </p:bg>
-    <p:spTree>
-      <p:nvGrpSpPr>
-        <p:cNvPr id="1" name=""/>
-        <p:cNvGrpSpPr/>
-        <p:nvPr/>
-      </p:nvGrpSpPr>
-      <p:grpSpPr>
-        <a:xfrm>
-          <a:off x="0" y="0"/>
-          <a:ext cx="0" cy="0"/>
-          <a:chOff x="0" y="0"/>
-          <a:chExt cx="0" cy="0"/>
-        </a:xfrm>
-      </p:grpSpPr>
-      <p:sp>
-        <p:nvSpPr>
-          <p:cNvPr id="4" name="TextBox 3"/>
-          <p:cNvSpPr txBox="1"/>
-          <p:nvPr/>
-        </p:nvSpPr>
-        <p:spPr>
-          <a:xfrm>
-            <a:off x="1053190" y="310243"/>
-            <a:ext cx="9794423" cy="646331"/>
-          </a:xfrm>
-          <a:prstGeom prst="rect">
-            <a:avLst/>
-          </a:prstGeom>
-          <a:noFill/>
-        </p:spPr>
-        <p:txBody>
-          <a:bodyPr wrap="square" rtlCol="0">
-            <a:spAutoFit/>
-          </a:bodyPr>
-          <a:lstStyle/>
-          <a:p>
-            <a:r>
-              <a:rPr lang="ru-RU" sz="3600" b="1" dirty="0" smtClean="0">
-                <a:latin typeface="Courier New" panose="02070309020205020404" pitchFamily="49" charset="0"/>
-                <a:cs typeface="Courier New" panose="02070309020205020404" pitchFamily="49" charset="0"/>
-              </a:rPr>
-              <a:t>Выбранные инструменты разработки</a:t>
-            </a:r>
-            <a:endParaRPr lang="en-US" sz="3600" dirty="0"/>
-          </a:p>
-        </p:txBody>
-      </p:sp>
-      <p:sp>
-        <p:nvSpPr>
-          <p:cNvPr id="5" name="TextBox 4"/>
-          <p:cNvSpPr txBox="1"/>
-          <p:nvPr/>
-        </p:nvSpPr>
-        <p:spPr>
-          <a:xfrm>
-            <a:off x="1053191" y="1126671"/>
-            <a:ext cx="10197194" cy="5170646"/>
-          </a:xfrm>
-          <a:prstGeom prst="rect">
-            <a:avLst/>
-          </a:prstGeom>
-          <a:noFill/>
-        </p:spPr>
-        <p:txBody>
-          <a:bodyPr wrap="square" rtlCol="0">
-            <a:spAutoFit/>
-          </a:bodyPr>
-          <a:lstStyle/>
-          <a:p>
-            <a:pPr>
-              <a:lnSpc>
-                <a:spcPct val="150000"/>
-              </a:lnSpc>
-            </a:pPr>
-            <a:r>
-              <a:rPr lang="ru-RU" sz="2400" b="1" dirty="0">
-                <a:latin typeface="Courier New" panose="02070309020205020404" pitchFamily="49" charset="0"/>
-                <a:cs typeface="Courier New" panose="02070309020205020404" pitchFamily="49" charset="0"/>
-              </a:rPr>
-              <a:t>Серверная часть:</a:t>
-            </a:r>
-          </a:p>
-          <a:p>
-            <a:pPr marL="800100" lvl="1" indent="-342900">
-              <a:lnSpc>
-                <a:spcPct val="150000"/>
-              </a:lnSpc>
-              <a:buFont typeface="Arial" panose="020B0604020202020204" pitchFamily="34" charset="0"/>
-              <a:buChar char="•"/>
-            </a:pPr>
-            <a:r>
-              <a:rPr lang="ru-RU" sz="2400" dirty="0">
-                <a:latin typeface="Courier New" panose="02070309020205020404" pitchFamily="49" charset="0"/>
-                <a:cs typeface="Courier New" panose="02070309020205020404" pitchFamily="49" charset="0"/>
-              </a:rPr>
-              <a:t>Язык программирования</a:t>
-            </a:r>
-            <a:r>
-              <a:rPr lang="en-US" sz="2400" dirty="0">
-                <a:latin typeface="Courier New" panose="02070309020205020404" pitchFamily="49" charset="0"/>
-                <a:cs typeface="Courier New" panose="02070309020205020404" pitchFamily="49" charset="0"/>
-              </a:rPr>
-              <a:t> </a:t>
-            </a:r>
-            <a:r>
-              <a:rPr lang="en-US" sz="2400" b="1" dirty="0">
-                <a:latin typeface="Courier New" panose="02070309020205020404" pitchFamily="49" charset="0"/>
-                <a:cs typeface="Courier New" panose="02070309020205020404" pitchFamily="49" charset="0"/>
-              </a:rPr>
-              <a:t>Rust</a:t>
-            </a:r>
-          </a:p>
-          <a:p>
-            <a:pPr marL="800100" lvl="1" indent="-342900">
-              <a:lnSpc>
-                <a:spcPct val="150000"/>
-              </a:lnSpc>
-              <a:buFont typeface="Arial" panose="020B0604020202020204" pitchFamily="34" charset="0"/>
-              <a:buChar char="•"/>
-            </a:pPr>
-            <a:r>
-              <a:rPr lang="ru-RU" sz="2400" dirty="0">
-                <a:latin typeface="Courier New" panose="02070309020205020404" pitchFamily="49" charset="0"/>
-                <a:cs typeface="Courier New" panose="02070309020205020404" pitchFamily="49" charset="0"/>
-              </a:rPr>
-              <a:t>Библиотека асинхронного выполнения </a:t>
-            </a:r>
-            <a:r>
-              <a:rPr lang="en-US" sz="2400" b="1" dirty="0" err="1">
-                <a:latin typeface="Courier New" panose="02070309020205020404" pitchFamily="49" charset="0"/>
-                <a:cs typeface="Courier New" panose="02070309020205020404" pitchFamily="49" charset="0"/>
-              </a:rPr>
-              <a:t>tokio</a:t>
-            </a:r>
-            <a:endParaRPr lang="ru-RU" sz="2400" b="1" dirty="0">
-              <a:latin typeface="Courier New" panose="02070309020205020404" pitchFamily="49" charset="0"/>
-              <a:cs typeface="Courier New" panose="02070309020205020404" pitchFamily="49" charset="0"/>
-            </a:endParaRPr>
-          </a:p>
-          <a:p>
-            <a:pPr marL="800100" lvl="1" indent="-342900">
-              <a:lnSpc>
-                <a:spcPct val="150000"/>
-              </a:lnSpc>
-              <a:buFont typeface="Arial" panose="020B0604020202020204" pitchFamily="34" charset="0"/>
-              <a:buChar char="•"/>
-            </a:pPr>
-            <a:r>
-              <a:rPr lang="ru-RU" sz="2400" dirty="0">
-                <a:latin typeface="Courier New" panose="02070309020205020404" pitchFamily="49" charset="0"/>
-                <a:cs typeface="Courier New" panose="02070309020205020404" pitchFamily="49" charset="0"/>
-              </a:rPr>
-              <a:t>Библиотека шаблонизации </a:t>
-            </a:r>
-            <a:r>
-              <a:rPr lang="en-US" sz="2400" b="1" dirty="0" err="1">
-                <a:latin typeface="Courier New" panose="02070309020205020404" pitchFamily="49" charset="0"/>
-                <a:cs typeface="Courier New" panose="02070309020205020404" pitchFamily="49" charset="0"/>
-              </a:rPr>
-              <a:t>tera</a:t>
-            </a:r>
-            <a:endParaRPr lang="en-US" sz="2400" dirty="0">
-              <a:latin typeface="Courier New" panose="02070309020205020404" pitchFamily="49" charset="0"/>
-              <a:cs typeface="Courier New" panose="02070309020205020404" pitchFamily="49" charset="0"/>
-            </a:endParaRPr>
-          </a:p>
-          <a:p>
-            <a:pPr>
-              <a:lnSpc>
-                <a:spcPct val="150000"/>
-              </a:lnSpc>
-            </a:pPr>
-            <a:r>
-              <a:rPr lang="ru-RU" sz="2400" b="1" dirty="0">
-                <a:latin typeface="Courier New" panose="02070309020205020404" pitchFamily="49" charset="0"/>
-                <a:cs typeface="Courier New" panose="02070309020205020404" pitchFamily="49" charset="0"/>
-              </a:rPr>
-              <a:t>Клиентская часть:</a:t>
-            </a:r>
-          </a:p>
-          <a:p>
-            <a:pPr marL="800100" lvl="1" indent="-342900">
-              <a:lnSpc>
-                <a:spcPct val="150000"/>
-              </a:lnSpc>
-              <a:buFont typeface="Arial" panose="020B0604020202020204" pitchFamily="34" charset="0"/>
-              <a:buChar char="•"/>
-            </a:pPr>
-            <a:r>
-              <a:rPr lang="ru-RU" sz="2400" dirty="0">
-                <a:latin typeface="Courier New" panose="02070309020205020404" pitchFamily="49" charset="0"/>
-                <a:cs typeface="Courier New" panose="02070309020205020404" pitchFamily="49" charset="0"/>
-              </a:rPr>
-              <a:t>Любое приложение, способное совершать </a:t>
-            </a:r>
-            <a:r>
-              <a:rPr lang="en-US" sz="2400" dirty="0">
-                <a:latin typeface="Courier New" panose="02070309020205020404" pitchFamily="49" charset="0"/>
-                <a:cs typeface="Courier New" panose="02070309020205020404" pitchFamily="49" charset="0"/>
-              </a:rPr>
-              <a:t>http </a:t>
-            </a:r>
-            <a:r>
-              <a:rPr lang="ru-RU" sz="2400" dirty="0">
-                <a:latin typeface="Courier New" panose="02070309020205020404" pitchFamily="49" charset="0"/>
-                <a:cs typeface="Courier New" panose="02070309020205020404" pitchFamily="49" charset="0"/>
-              </a:rPr>
-              <a:t>запросы</a:t>
-            </a:r>
-          </a:p>
-          <a:p>
-            <a:pPr marL="800100" lvl="1" indent="-342900">
-              <a:lnSpc>
-                <a:spcPct val="150000"/>
-              </a:lnSpc>
-              <a:buFont typeface="Arial" panose="020B0604020202020204" pitchFamily="34" charset="0"/>
-              <a:buChar char="•"/>
-            </a:pPr>
-            <a:r>
-              <a:rPr lang="ru-RU" sz="2400" dirty="0">
-                <a:latin typeface="Courier New" panose="02070309020205020404" pitchFamily="49" charset="0"/>
-                <a:cs typeface="Courier New" panose="02070309020205020404" pitchFamily="49" charset="0"/>
-              </a:rPr>
-              <a:t>Графический пользовательский интерфейс:</a:t>
-            </a:r>
-          </a:p>
-          <a:p>
-            <a:pPr marL="1257300" lvl="2" indent="-342900">
-              <a:lnSpc>
-                <a:spcPct val="150000"/>
-              </a:lnSpc>
-              <a:buFont typeface="Wingdings" panose="05000000000000000000" pitchFamily="2" charset="2"/>
-              <a:buChar char="§"/>
-            </a:pPr>
-            <a:r>
-              <a:rPr lang="en-US" sz="2000" dirty="0">
-                <a:latin typeface="Courier New" panose="02070309020205020404" pitchFamily="49" charset="0"/>
-                <a:cs typeface="Courier New" panose="02070309020205020404" pitchFamily="49" charset="0"/>
-              </a:rPr>
-              <a:t>JavaScript framework </a:t>
-            </a:r>
-            <a:r>
-              <a:rPr lang="en-US" sz="2000" b="1" dirty="0">
-                <a:latin typeface="Courier New" panose="02070309020205020404" pitchFamily="49" charset="0"/>
-                <a:cs typeface="Courier New" panose="02070309020205020404" pitchFamily="49" charset="0"/>
-              </a:rPr>
-              <a:t>Vue.js</a:t>
-            </a:r>
-          </a:p>
-          <a:p>
-            <a:pPr marL="1257300" lvl="2" indent="-342900">
-              <a:lnSpc>
-                <a:spcPct val="150000"/>
-              </a:lnSpc>
-              <a:buFont typeface="Wingdings" panose="05000000000000000000" pitchFamily="2" charset="2"/>
-              <a:buChar char="§"/>
-            </a:pPr>
-            <a:r>
-              <a:rPr lang="en-US" sz="2000" dirty="0">
-                <a:latin typeface="Courier New" panose="02070309020205020404" pitchFamily="49" charset="0"/>
-                <a:cs typeface="Courier New" panose="02070309020205020404" pitchFamily="49" charset="0"/>
-              </a:rPr>
-              <a:t>HTML </a:t>
-            </a:r>
-            <a:r>
-              <a:rPr lang="ru-RU" sz="2000" dirty="0">
-                <a:latin typeface="Courier New" panose="02070309020205020404" pitchFamily="49" charset="0"/>
-                <a:cs typeface="Courier New" panose="02070309020205020404" pitchFamily="49" charset="0"/>
-              </a:rPr>
-              <a:t>и </a:t>
-            </a:r>
-            <a:r>
-              <a:rPr lang="en-US" sz="2000" dirty="0">
-                <a:latin typeface="Courier New" panose="02070309020205020404" pitchFamily="49" charset="0"/>
-                <a:cs typeface="Courier New" panose="02070309020205020404" pitchFamily="49" charset="0"/>
-              </a:rPr>
-              <a:t>CSS</a:t>
-            </a:r>
-          </a:p>
-          <a:p>
-            <a:endParaRPr lang="en-US" dirty="0"/>
-          </a:p>
-        </p:txBody>
-      </p:sp>
-    </p:spTree>
-    <p:extLst>
-      <p:ext uri="{BB962C8B-B14F-4D97-AF65-F5344CB8AC3E}">
-        <p14:creationId xmlns:p14="http://schemas.microsoft.com/office/powerpoint/2010/main" val="4053716737"/>
-      </p:ext>
-    </p:extLst>
-  </p:cSld>
-  <p:clrMapOvr>
-    <a:masterClrMapping/>
-  </p:clrMapOvr>
-  <p:timing>
-    <p:tnLst>
-      <p:par>
-        <p:cTn id="1" dur="indefinite" restart="never" nodeType="tmRoot"/>
-      </p:par>
-    </p:tnLst>
-  </p:timing>
-</p:sld>
-</file>
-
-<file path=ppt/slides/slide12.xml><?xml version="1.0" encoding="utf-8"?>
-<p:sld xmlns:a="http://schemas.openxmlformats.org/drawingml/2006/main" xmlns:r="http://schemas.openxmlformats.org/officeDocument/2006/relationships" xmlns:p="http://schemas.openxmlformats.org/presentationml/2006/main">
-  <p:cSld>
-    <p:bg>
-      <p:bgPr>
-        <a:pattFill prst="pct10">
-          <a:fgClr>
-            <a:schemeClr val="accent1">
-              <a:lumMod val="60000"/>
-              <a:lumOff val="40000"/>
-            </a:schemeClr>
-          </a:fgClr>
-          <a:bgClr>
-            <a:schemeClr val="bg1"/>
-          </a:bgClr>
-        </a:pattFill>
-        <a:effectLst/>
-      </p:bgPr>
-    </p:bg>
-    <p:spTree>
-      <p:nvGrpSpPr>
-        <p:cNvPr id="1" name=""/>
-        <p:cNvGrpSpPr/>
-        <p:nvPr/>
-      </p:nvGrpSpPr>
-      <p:grpSpPr>
-        <a:xfrm>
-          <a:off x="0" y="0"/>
-          <a:ext cx="0" cy="0"/>
-          <a:chOff x="0" y="0"/>
-          <a:chExt cx="0" cy="0"/>
-        </a:xfrm>
-      </p:grpSpPr>
-      <p:sp>
-        <p:nvSpPr>
           <p:cNvPr id="4" name="TextBox 3"/>
           <p:cNvSpPr txBox="1"/>
           <p:nvPr/>
@@ -10693,8 +10215,8 @@
         </p:blipFill>
         <p:spPr>
           <a:xfrm>
-            <a:off x="1371454" y="1214706"/>
-            <a:ext cx="9209988" cy="4360102"/>
+            <a:off x="1371453" y="983849"/>
+            <a:ext cx="9450875" cy="4898478"/>
           </a:xfrm>
           <a:prstGeom prst="rect">
             <a:avLst/>
@@ -10714,8 +10236,8 @@
         </p:nvSpPr>
         <p:spPr>
           <a:xfrm>
-            <a:off x="1371454" y="5882327"/>
-            <a:ext cx="9586279" cy="461665"/>
+            <a:off x="1371453" y="6228043"/>
+            <a:ext cx="9417963" cy="400110"/>
           </a:xfrm>
           <a:prstGeom prst="rect">
             <a:avLst/>
@@ -10729,21 +10251,28 @@
           <a:lstStyle/>
           <a:p>
             <a:r>
-              <a:rPr lang="ru-RU" sz="2400" b="1" dirty="0" smtClean="0">
+              <a:rPr lang="ru-RU" sz="2000" b="1" dirty="0" smtClean="0">
                 <a:latin typeface="Courier New" panose="02070309020205020404" pitchFamily="49" charset="0"/>
                 <a:cs typeface="Courier New" panose="02070309020205020404" pitchFamily="49" charset="0"/>
               </a:rPr>
-              <a:t>Ссылка для ознакомления </a:t>
-            </a:r>
-            <a:r>
-              <a:rPr lang="en-US" sz="2400" b="1" dirty="0" smtClean="0">
+              <a:t>Ссылка </a:t>
+            </a:r>
+            <a:r>
+              <a:rPr lang="ru-RU" sz="2000" b="1" dirty="0" smtClean="0">
+                <a:latin typeface="Courier New" panose="02070309020205020404" pitchFamily="49" charset="0"/>
+                <a:cs typeface="Courier New" panose="02070309020205020404" pitchFamily="49" charset="0"/>
+              </a:rPr>
+              <a:t>на демонстративную версию </a:t>
+            </a:r>
+            <a:r>
+              <a:rPr lang="en-US" sz="2000" b="1" dirty="0" smtClean="0">
                 <a:latin typeface="Courier New" panose="02070309020205020404" pitchFamily="49" charset="0"/>
                 <a:cs typeface="Courier New" panose="02070309020205020404" pitchFamily="49" charset="0"/>
               </a:rPr>
               <a:t>http</a:t>
             </a:r>
             <a:r>
-              <a:rPr lang="en-US" sz="2400" b="1" dirty="0">
+              <a:rPr lang="en-US" sz="2000" b="1" dirty="0">
                 <a:latin typeface="Courier New" panose="02070309020205020404" pitchFamily="49" charset="0"/>
                 <a:cs typeface="Courier New" panose="02070309020205020404" pitchFamily="49" charset="0"/>
               </a:rPr>
@@ -10772,7 +10301,7 @@
 </p:sld>
 </file>
 
-<file path=ppt/slides/slide13.xml><?xml version="1.0" encoding="utf-8"?>
+<file path=ppt/slides/slide11.xml><?xml version="1.0" encoding="utf-8"?>
 <p:sld xmlns:a="http://schemas.openxmlformats.org/drawingml/2006/main" xmlns:r="http://schemas.openxmlformats.org/officeDocument/2006/relationships" xmlns:p="http://schemas.openxmlformats.org/presentationml/2006/main">
   <p:cSld>
     <p:bg>
@@ -11001,7 +10530,7 @@
 </p:sld>
 </file>
 
-<file path=ppt/slides/slide14.xml><?xml version="1.0" encoding="utf-8"?>
+<file path=ppt/slides/slide12.xml><?xml version="1.0" encoding="utf-8"?>
 <p:sld xmlns:a="http://schemas.openxmlformats.org/drawingml/2006/main" xmlns:r="http://schemas.openxmlformats.org/officeDocument/2006/relationships" xmlns:p="http://schemas.openxmlformats.org/presentationml/2006/main">
   <p:cSld>
     <p:bg>
@@ -11184,7 +10713,7 @@
 </p:sld>
 </file>
 
-<file path=ppt/slides/slide15.xml><?xml version="1.0" encoding="utf-8"?>
+<file path=ppt/slides/slide13.xml><?xml version="1.0" encoding="utf-8"?>
 <p:sld xmlns:a="http://schemas.openxmlformats.org/drawingml/2006/main" xmlns:r="http://schemas.openxmlformats.org/officeDocument/2006/relationships" xmlns:p="http://schemas.openxmlformats.org/presentationml/2006/main">
   <p:cSld>
     <p:bg>
@@ -11334,7 +10863,7 @@
 </p:sld>
 </file>
 
-<file path=ppt/slides/slide16.xml><?xml version="1.0" encoding="utf-8"?>
+<file path=ppt/slides/slide14.xml><?xml version="1.0" encoding="utf-8"?>
 <p:sld xmlns:a="http://schemas.openxmlformats.org/drawingml/2006/main" xmlns:r="http://schemas.openxmlformats.org/officeDocument/2006/relationships" xmlns:p="http://schemas.openxmlformats.org/presentationml/2006/main">
   <p:cSld>
     <p:bg>
@@ -11660,8 +11189,8 @@
         </p:nvSpPr>
         <p:spPr>
           <a:xfrm>
-            <a:off x="1135431" y="1307387"/>
-            <a:ext cx="10115550" cy="4562788"/>
+            <a:off x="734785" y="1133767"/>
+            <a:ext cx="10758876" cy="5539978"/>
           </a:xfrm>
           <a:prstGeom prst="rect">
             <a:avLst/>
@@ -11674,20 +11203,15 @@
           </a:bodyPr>
           <a:lstStyle/>
           <a:p>
-            <a:pPr>
-              <a:lnSpc>
-                <a:spcPct val="150000"/>
-              </a:lnSpc>
-            </a:pPr>
-            <a:r>
-              <a:rPr lang="ru-RU" sz="2800" b="1" dirty="0">
+            <a:r>
+              <a:rPr lang="ru-RU" sz="2200" b="1" dirty="0">
                 <a:latin typeface="Courier New" panose="02070309020205020404" pitchFamily="49" charset="0"/>
                 <a:cs typeface="Courier New" panose="02070309020205020404" pitchFamily="49" charset="0"/>
               </a:rPr>
               <a:t>Цель исследования</a:t>
             </a:r>
             <a:r>
-              <a:rPr lang="ru-RU" sz="2800" b="1" dirty="0" smtClean="0">
+              <a:rPr lang="ru-RU" sz="2200" b="1" dirty="0" smtClean="0">
                 <a:latin typeface="Courier New" panose="02070309020205020404" pitchFamily="49" charset="0"/>
                 <a:cs typeface="Courier New" panose="02070309020205020404" pitchFamily="49" charset="0"/>
               </a:rPr>
@@ -11695,45 +11219,35 @@
             </a:r>
           </a:p>
           <a:p>
-            <a:pPr>
-              <a:lnSpc>
-                <a:spcPct val="150000"/>
-              </a:lnSpc>
-            </a:pPr>
-            <a:r>
-              <a:rPr lang="ru-RU" sz="2800" dirty="0" smtClean="0">
+            <a:r>
+              <a:rPr lang="ru-RU" sz="2200" dirty="0" smtClean="0">
                 <a:latin typeface="Courier New" panose="02070309020205020404" pitchFamily="49" charset="0"/>
                 <a:cs typeface="Courier New" panose="02070309020205020404" pitchFamily="49" charset="0"/>
               </a:rPr>
               <a:t>Поиск методов повышения производительности систем веб-шаблонов</a:t>
             </a:r>
-            <a:endParaRPr lang="ru-RU" sz="2800" dirty="0">
+            <a:endParaRPr lang="ru-RU" sz="2200" dirty="0">
               <a:latin typeface="Courier New" panose="02070309020205020404" pitchFamily="49" charset="0"/>
               <a:cs typeface="Courier New" panose="02070309020205020404" pitchFamily="49" charset="0"/>
             </a:endParaRPr>
           </a:p>
           <a:p>
-            <a:pPr>
-              <a:lnSpc>
-                <a:spcPct val="150000"/>
-              </a:lnSpc>
-            </a:pPr>
-            <a:r>
-              <a:rPr lang="ru-RU" sz="2800" b="1" dirty="0" smtClean="0">
+            <a:r>
+              <a:rPr lang="ru-RU" sz="2400" b="1" dirty="0" smtClean="0">
                 <a:latin typeface="Courier New" panose="02070309020205020404" pitchFamily="49" charset="0"/>
                 <a:cs typeface="Courier New" panose="02070309020205020404" pitchFamily="49" charset="0"/>
               </a:rPr>
               <a:t>Объект </a:t>
             </a:r>
             <a:r>
-              <a:rPr lang="ru-RU" sz="2800" b="1" dirty="0">
+              <a:rPr lang="ru-RU" sz="2400" b="1" dirty="0">
                 <a:latin typeface="Courier New" panose="02070309020205020404" pitchFamily="49" charset="0"/>
                 <a:cs typeface="Courier New" panose="02070309020205020404" pitchFamily="49" charset="0"/>
               </a:rPr>
               <a:t>исследования</a:t>
             </a:r>
             <a:r>
-              <a:rPr lang="ru-RU" sz="2800" b="1" dirty="0" smtClean="0">
+              <a:rPr lang="ru-RU" sz="2400" b="1" dirty="0" smtClean="0">
                 <a:latin typeface="Courier New" panose="02070309020205020404" pitchFamily="49" charset="0"/>
                 <a:cs typeface="Courier New" panose="02070309020205020404" pitchFamily="49" charset="0"/>
               </a:rPr>
@@ -11741,83 +11255,177 @@
             </a:r>
           </a:p>
           <a:p>
-            <a:pPr>
-              <a:lnSpc>
-                <a:spcPct val="150000"/>
-              </a:lnSpc>
-            </a:pPr>
-            <a:r>
-              <a:rPr lang="ru-RU" sz="2800" dirty="0" smtClean="0">
+            <a:r>
+              <a:rPr lang="ru-RU" sz="2400" dirty="0" smtClean="0">
                 <a:latin typeface="Courier New" panose="02070309020205020404" pitchFamily="49" charset="0"/>
                 <a:cs typeface="Courier New" panose="02070309020205020404" pitchFamily="49" charset="0"/>
               </a:rPr>
               <a:t>Система веб-шаблонов</a:t>
             </a:r>
             <a:r>
-              <a:rPr lang="ru-RU" sz="2800" b="1" dirty="0" smtClean="0">
+              <a:rPr lang="ru-RU" sz="2400" b="1" dirty="0" smtClean="0">
                 <a:latin typeface="Courier New" panose="02070309020205020404" pitchFamily="49" charset="0"/>
                 <a:cs typeface="Courier New" panose="02070309020205020404" pitchFamily="49" charset="0"/>
               </a:rPr>
               <a:t> </a:t>
             </a:r>
-            <a:endParaRPr lang="ru-RU" sz="2800" b="1" dirty="0">
+            <a:endParaRPr lang="ru-RU" sz="2400" b="1" dirty="0">
               <a:latin typeface="Courier New" panose="02070309020205020404" pitchFamily="49" charset="0"/>
               <a:cs typeface="Courier New" panose="02070309020205020404" pitchFamily="49" charset="0"/>
             </a:endParaRPr>
           </a:p>
           <a:p>
-            <a:pPr>
-              <a:lnSpc>
-                <a:spcPct val="150000"/>
-              </a:lnSpc>
-            </a:pPr>
-            <a:r>
-              <a:rPr lang="ru-RU" sz="2800" b="1" dirty="0" smtClean="0">
+            <a:r>
+              <a:rPr lang="ru-RU" sz="2400" b="1" dirty="0" smtClean="0">
                 <a:latin typeface="Courier New" panose="02070309020205020404" pitchFamily="49" charset="0"/>
                 <a:cs typeface="Courier New" panose="02070309020205020404" pitchFamily="49" charset="0"/>
               </a:rPr>
               <a:t>Предмет </a:t>
             </a:r>
             <a:r>
-              <a:rPr lang="ru-RU" sz="2800" b="1" dirty="0">
+              <a:rPr lang="ru-RU" sz="2400" b="1" dirty="0">
                 <a:latin typeface="Courier New" panose="02070309020205020404" pitchFamily="49" charset="0"/>
                 <a:cs typeface="Courier New" panose="02070309020205020404" pitchFamily="49" charset="0"/>
               </a:rPr>
               <a:t>исследования:  </a:t>
             </a:r>
-            <a:endParaRPr lang="ru-RU" sz="2800" b="1" dirty="0" smtClean="0">
+            <a:endParaRPr lang="ru-RU" sz="2400" b="1" dirty="0" smtClean="0">
               <a:latin typeface="Courier New" panose="02070309020205020404" pitchFamily="49" charset="0"/>
               <a:cs typeface="Courier New" panose="02070309020205020404" pitchFamily="49" charset="0"/>
             </a:endParaRPr>
           </a:p>
           <a:p>
-            <a:pPr>
-              <a:lnSpc>
-                <a:spcPct val="150000"/>
-              </a:lnSpc>
-            </a:pPr>
-            <a:r>
-              <a:rPr lang="ru-RU" sz="2800" dirty="0" smtClean="0">
+            <a:r>
+              <a:rPr lang="ru-RU" sz="2400" dirty="0" smtClean="0">
                 <a:latin typeface="Courier New" panose="02070309020205020404" pitchFamily="49" charset="0"/>
                 <a:cs typeface="Courier New" panose="02070309020205020404" pitchFamily="49" charset="0"/>
               </a:rPr>
               <a:t>Производительность </a:t>
             </a:r>
             <a:r>
-              <a:rPr lang="ru-RU" sz="2800" dirty="0">
+              <a:rPr lang="ru-RU" sz="2400" dirty="0">
                 <a:latin typeface="Courier New" panose="02070309020205020404" pitchFamily="49" charset="0"/>
                 <a:cs typeface="Courier New" panose="02070309020205020404" pitchFamily="49" charset="0"/>
               </a:rPr>
               <a:t>систем </a:t>
             </a:r>
             <a:r>
-              <a:rPr lang="ru-RU" sz="2800" dirty="0" smtClean="0">
+              <a:rPr lang="ru-RU" sz="2400" dirty="0" smtClean="0">
                 <a:latin typeface="Courier New" panose="02070309020205020404" pitchFamily="49" charset="0"/>
                 <a:cs typeface="Courier New" panose="02070309020205020404" pitchFamily="49" charset="0"/>
               </a:rPr>
               <a:t>веб-шаблонов</a:t>
             </a:r>
-            <a:endParaRPr lang="ru-RU" sz="2800" dirty="0">
+            <a:endParaRPr lang="en-US" sz="2400" dirty="0" smtClean="0">
+              <a:latin typeface="Courier New" panose="02070309020205020404" pitchFamily="49" charset="0"/>
+              <a:cs typeface="Courier New" panose="02070309020205020404" pitchFamily="49" charset="0"/>
+            </a:endParaRPr>
+          </a:p>
+          <a:p>
+            <a:r>
+              <a:rPr lang="ru-RU" sz="2400" b="1" dirty="0">
+                <a:latin typeface="Courier New" panose="02070309020205020404" pitchFamily="49" charset="0"/>
+                <a:cs typeface="Courier New" panose="02070309020205020404" pitchFamily="49" charset="0"/>
+              </a:rPr>
+              <a:t>Поставленные задачи:</a:t>
+            </a:r>
+          </a:p>
+          <a:p>
+            <a:pPr marL="342900" indent="-342900">
+              <a:buFont typeface="Arial" panose="020B0604020202020204" pitchFamily="34" charset="0"/>
+              <a:buChar char="•"/>
+            </a:pPr>
+            <a:r>
+              <a:rPr lang="ru-RU" sz="2400" dirty="0" smtClean="0">
+                <a:latin typeface="Courier New" panose="02070309020205020404" pitchFamily="49" charset="0"/>
+                <a:cs typeface="Courier New" panose="02070309020205020404" pitchFamily="49" charset="0"/>
+              </a:rPr>
+              <a:t>Проанализировать </a:t>
+            </a:r>
+            <a:r>
+              <a:rPr lang="ru-RU" sz="2400" dirty="0">
+                <a:latin typeface="Courier New" panose="02070309020205020404" pitchFamily="49" charset="0"/>
+                <a:cs typeface="Courier New" panose="02070309020205020404" pitchFamily="49" charset="0"/>
+              </a:rPr>
+              <a:t>существующие </a:t>
+            </a:r>
+            <a:r>
+              <a:rPr lang="ru-RU" sz="2400" dirty="0" smtClean="0">
+                <a:latin typeface="Courier New" panose="02070309020205020404" pitchFamily="49" charset="0"/>
+                <a:cs typeface="Courier New" panose="02070309020205020404" pitchFamily="49" charset="0"/>
+              </a:rPr>
+              <a:t>решения для выявления </a:t>
+            </a:r>
+            <a:r>
+              <a:rPr lang="ru-RU" sz="2400" dirty="0">
+                <a:latin typeface="Courier New" panose="02070309020205020404" pitchFamily="49" charset="0"/>
+                <a:cs typeface="Courier New" panose="02070309020205020404" pitchFamily="49" charset="0"/>
+              </a:rPr>
+              <a:t>наиболее распространённых проблем с производительностью.</a:t>
+            </a:r>
+          </a:p>
+          <a:p>
+            <a:pPr marL="342900" indent="-342900">
+              <a:buFont typeface="Arial" panose="020B0604020202020204" pitchFamily="34" charset="0"/>
+              <a:buChar char="•"/>
+            </a:pPr>
+            <a:r>
+              <a:rPr lang="ru-RU" sz="2400" dirty="0">
+                <a:latin typeface="Courier New" panose="02070309020205020404" pitchFamily="49" charset="0"/>
+                <a:cs typeface="Courier New" panose="02070309020205020404" pitchFamily="49" charset="0"/>
+              </a:rPr>
+              <a:t>Исследовать причины возникновения </a:t>
+            </a:r>
+            <a:r>
+              <a:rPr lang="ru-RU" sz="2400" dirty="0" smtClean="0">
+                <a:latin typeface="Courier New" panose="02070309020205020404" pitchFamily="49" charset="0"/>
+                <a:cs typeface="Courier New" panose="02070309020205020404" pitchFamily="49" charset="0"/>
+              </a:rPr>
+              <a:t>проблем </a:t>
+            </a:r>
+            <a:r>
+              <a:rPr lang="ru-RU" sz="2400" dirty="0">
+                <a:latin typeface="Courier New" panose="02070309020205020404" pitchFamily="49" charset="0"/>
+                <a:cs typeface="Courier New" panose="02070309020205020404" pitchFamily="49" charset="0"/>
+              </a:rPr>
+              <a:t>с производительностью.</a:t>
+            </a:r>
+          </a:p>
+          <a:p>
+            <a:pPr marL="342900" indent="-342900">
+              <a:buFont typeface="Arial" panose="020B0604020202020204" pitchFamily="34" charset="0"/>
+              <a:buChar char="•"/>
+            </a:pPr>
+            <a:r>
+              <a:rPr lang="ru-RU" sz="2400" dirty="0">
+                <a:latin typeface="Courier New" panose="02070309020205020404" pitchFamily="49" charset="0"/>
+                <a:cs typeface="Courier New" panose="02070309020205020404" pitchFamily="49" charset="0"/>
+              </a:rPr>
+              <a:t>Разработать методы для устранения проблем с производительностью, либо их смягчения.</a:t>
+            </a:r>
+          </a:p>
+          <a:p>
+            <a:pPr marL="342900" indent="-342900">
+              <a:buFont typeface="Arial" panose="020B0604020202020204" pitchFamily="34" charset="0"/>
+              <a:buChar char="•"/>
+            </a:pPr>
+            <a:r>
+              <a:rPr lang="ru-RU" sz="2400" dirty="0">
+                <a:latin typeface="Courier New" panose="02070309020205020404" pitchFamily="49" charset="0"/>
+                <a:cs typeface="Courier New" panose="02070309020205020404" pitchFamily="49" charset="0"/>
+              </a:rPr>
+              <a:t>Применить разработанные </a:t>
+            </a:r>
+            <a:r>
+              <a:rPr lang="ru-RU" sz="2400" dirty="0" smtClean="0">
+                <a:latin typeface="Courier New" panose="02070309020205020404" pitchFamily="49" charset="0"/>
+                <a:cs typeface="Courier New" panose="02070309020205020404" pitchFamily="49" charset="0"/>
+              </a:rPr>
+              <a:t>найденные методы при разработке. </a:t>
+            </a:r>
+          </a:p>
+          <a:p>
+            <a:endParaRPr lang="ru-RU" sz="2200" dirty="0">
               <a:latin typeface="Courier New" panose="02070309020205020404" pitchFamily="49" charset="0"/>
               <a:cs typeface="Courier New" panose="02070309020205020404" pitchFamily="49" charset="0"/>
             </a:endParaRPr>
@@ -11879,243 +11487,6 @@
       </p:grpSpPr>
       <p:sp>
         <p:nvSpPr>
-          <p:cNvPr id="5" name="TextBox 4"/>
-          <p:cNvSpPr txBox="1"/>
-          <p:nvPr/>
-        </p:nvSpPr>
-        <p:spPr>
-          <a:xfrm>
-            <a:off x="734785" y="359229"/>
-            <a:ext cx="10433957" cy="646331"/>
-          </a:xfrm>
-          <a:prstGeom prst="rect">
-            <a:avLst/>
-          </a:prstGeom>
-          <a:noFill/>
-        </p:spPr>
-        <p:txBody>
-          <a:bodyPr wrap="square" rtlCol="0">
-            <a:spAutoFit/>
-          </a:bodyPr>
-          <a:lstStyle/>
-          <a:p>
-            <a:r>
-              <a:rPr lang="ru-RU" sz="3600" b="1" dirty="0" smtClean="0">
-                <a:latin typeface="Courier New" panose="02070309020205020404" pitchFamily="49" charset="0"/>
-                <a:cs typeface="Courier New" panose="02070309020205020404" pitchFamily="49" charset="0"/>
-              </a:rPr>
-              <a:t>Цели и задачи</a:t>
-            </a:r>
-            <a:endParaRPr lang="en-US" sz="3600" b="1" dirty="0">
-              <a:latin typeface="Courier New" panose="02070309020205020404" pitchFamily="49" charset="0"/>
-              <a:cs typeface="Courier New" panose="02070309020205020404" pitchFamily="49" charset="0"/>
-            </a:endParaRPr>
-          </a:p>
-        </p:txBody>
-      </p:sp>
-      <p:sp>
-        <p:nvSpPr>
-          <p:cNvPr id="6" name="TextBox 5"/>
-          <p:cNvSpPr txBox="1"/>
-          <p:nvPr/>
-        </p:nvSpPr>
-        <p:spPr>
-          <a:xfrm>
-            <a:off x="1053192" y="1081355"/>
-            <a:ext cx="10115550" cy="6001643"/>
-          </a:xfrm>
-          <a:prstGeom prst="rect">
-            <a:avLst/>
-          </a:prstGeom>
-          <a:noFill/>
-        </p:spPr>
-        <p:txBody>
-          <a:bodyPr wrap="square" rtlCol="0">
-            <a:spAutoFit/>
-          </a:bodyPr>
-          <a:lstStyle/>
-          <a:p>
-            <a:pPr>
-              <a:lnSpc>
-                <a:spcPct val="150000"/>
-              </a:lnSpc>
-            </a:pPr>
-            <a:r>
-              <a:rPr lang="ru-RU" sz="3200" b="1" dirty="0" smtClean="0">
-                <a:latin typeface="Courier New" panose="02070309020205020404" pitchFamily="49" charset="0"/>
-                <a:cs typeface="Courier New" panose="02070309020205020404" pitchFamily="49" charset="0"/>
-              </a:rPr>
-              <a:t>Поставленные задачи:</a:t>
-            </a:r>
-          </a:p>
-          <a:p>
-            <a:pPr marL="342900" indent="-342900">
-              <a:buFont typeface="Arial" panose="020B0604020202020204" pitchFamily="34" charset="0"/>
-              <a:buChar char="•"/>
-            </a:pPr>
-            <a:r>
-              <a:rPr lang="ru-RU" sz="2400" dirty="0" smtClean="0">
-                <a:latin typeface="Courier New" panose="02070309020205020404" pitchFamily="49" charset="0"/>
-                <a:cs typeface="Courier New" panose="02070309020205020404" pitchFamily="49" charset="0"/>
-              </a:rPr>
-              <a:t>Исследовать </a:t>
-            </a:r>
-            <a:r>
-              <a:rPr lang="ru-RU" sz="2400" dirty="0">
-                <a:latin typeface="Courier New" panose="02070309020205020404" pitchFamily="49" charset="0"/>
-                <a:cs typeface="Courier New" panose="02070309020205020404" pitchFamily="49" charset="0"/>
-              </a:rPr>
-              <a:t>основные принципы функционирования систем веб-шаблонов.</a:t>
-            </a:r>
-          </a:p>
-          <a:p>
-            <a:pPr marL="342900" indent="-342900">
-              <a:buFont typeface="Arial" panose="020B0604020202020204" pitchFamily="34" charset="0"/>
-              <a:buChar char="•"/>
-            </a:pPr>
-            <a:r>
-              <a:rPr lang="ru-RU" sz="2400" dirty="0" smtClean="0">
-                <a:latin typeface="Courier New" panose="02070309020205020404" pitchFamily="49" charset="0"/>
-                <a:cs typeface="Courier New" panose="02070309020205020404" pitchFamily="49" charset="0"/>
-              </a:rPr>
-              <a:t>Проанализировать </a:t>
-            </a:r>
-            <a:r>
-              <a:rPr lang="ru-RU" sz="2400" dirty="0">
-                <a:latin typeface="Courier New" panose="02070309020205020404" pitchFamily="49" charset="0"/>
-                <a:cs typeface="Courier New" panose="02070309020205020404" pitchFamily="49" charset="0"/>
-              </a:rPr>
-              <a:t>существующие системы веб-шаблонов с целью выявления наиболее распространённых проблем с производительностью.</a:t>
-            </a:r>
-          </a:p>
-          <a:p>
-            <a:pPr marL="342900" indent="-342900">
-              <a:buFont typeface="Arial" panose="020B0604020202020204" pitchFamily="34" charset="0"/>
-              <a:buChar char="•"/>
-            </a:pPr>
-            <a:r>
-              <a:rPr lang="ru-RU" sz="2400" dirty="0" smtClean="0">
-                <a:latin typeface="Courier New" panose="02070309020205020404" pitchFamily="49" charset="0"/>
-                <a:cs typeface="Courier New" panose="02070309020205020404" pitchFamily="49" charset="0"/>
-              </a:rPr>
-              <a:t>Исследовать </a:t>
-            </a:r>
-            <a:r>
-              <a:rPr lang="ru-RU" sz="2400" dirty="0">
-                <a:latin typeface="Courier New" panose="02070309020205020404" pitchFamily="49" charset="0"/>
-                <a:cs typeface="Courier New" panose="02070309020205020404" pitchFamily="49" charset="0"/>
-              </a:rPr>
-              <a:t>причины возникновения каждой из проблем с производительностью.</a:t>
-            </a:r>
-          </a:p>
-          <a:p>
-            <a:pPr marL="342900" indent="-342900">
-              <a:buFont typeface="Arial" panose="020B0604020202020204" pitchFamily="34" charset="0"/>
-              <a:buChar char="•"/>
-            </a:pPr>
-            <a:r>
-              <a:rPr lang="ru-RU" sz="2400" dirty="0" smtClean="0">
-                <a:latin typeface="Courier New" panose="02070309020205020404" pitchFamily="49" charset="0"/>
-                <a:cs typeface="Courier New" panose="02070309020205020404" pitchFamily="49" charset="0"/>
-              </a:rPr>
-              <a:t>Разработать </a:t>
-            </a:r>
-            <a:r>
-              <a:rPr lang="ru-RU" sz="2400" dirty="0">
-                <a:latin typeface="Courier New" panose="02070309020205020404" pitchFamily="49" charset="0"/>
-                <a:cs typeface="Courier New" panose="02070309020205020404" pitchFamily="49" charset="0"/>
-              </a:rPr>
-              <a:t>методы для устранения проблем с производительностью, либо их смягчения.</a:t>
-            </a:r>
-          </a:p>
-          <a:p>
-            <a:pPr marL="342900" indent="-342900">
-              <a:buFont typeface="Arial" panose="020B0604020202020204" pitchFamily="34" charset="0"/>
-              <a:buChar char="•"/>
-            </a:pPr>
-            <a:r>
-              <a:rPr lang="ru-RU" sz="2400" dirty="0" smtClean="0">
-                <a:latin typeface="Courier New" panose="02070309020205020404" pitchFamily="49" charset="0"/>
-                <a:cs typeface="Courier New" panose="02070309020205020404" pitchFamily="49" charset="0"/>
-              </a:rPr>
-              <a:t>Применить </a:t>
-            </a:r>
-            <a:r>
-              <a:rPr lang="ru-RU" sz="2400" dirty="0">
-                <a:latin typeface="Courier New" panose="02070309020205020404" pitchFamily="49" charset="0"/>
-                <a:cs typeface="Courier New" panose="02070309020205020404" pitchFamily="49" charset="0"/>
-              </a:rPr>
-              <a:t>разработанные методы на практике, разработав высокопроизводительную систему веб-шаблонов.</a:t>
-            </a:r>
-          </a:p>
-          <a:p>
-            <a:pPr>
-              <a:lnSpc>
-                <a:spcPct val="150000"/>
-              </a:lnSpc>
-            </a:pPr>
-            <a:endParaRPr lang="ru-RU" sz="3200" b="1" dirty="0" smtClean="0">
-              <a:latin typeface="Courier New" panose="02070309020205020404" pitchFamily="49" charset="0"/>
-              <a:cs typeface="Courier New" panose="02070309020205020404" pitchFamily="49" charset="0"/>
-            </a:endParaRPr>
-          </a:p>
-        </p:txBody>
-      </p:sp>
-    </p:spTree>
-    <p:extLst>
-      <p:ext uri="{BB962C8B-B14F-4D97-AF65-F5344CB8AC3E}">
-        <p14:creationId xmlns:p14="http://schemas.microsoft.com/office/powerpoint/2010/main" val="1112639758"/>
-      </p:ext>
-    </p:extLst>
-  </p:cSld>
-  <p:clrMapOvr>
-    <a:masterClrMapping/>
-  </p:clrMapOvr>
-  <p:timing>
-    <p:tnLst>
-      <p:par>
-        <p:cTn id="1" dur="indefinite" restart="never" nodeType="tmRoot"/>
-      </p:par>
-    </p:tnLst>
-  </p:timing>
-</p:sld>
-</file>
-
-<file path=ppt/slides/slide5.xml><?xml version="1.0" encoding="utf-8"?>
-<p:sld xmlns:a="http://schemas.openxmlformats.org/drawingml/2006/main" xmlns:r="http://schemas.openxmlformats.org/officeDocument/2006/relationships" xmlns:p="http://schemas.openxmlformats.org/presentationml/2006/main">
-  <p:cSld>
-    <p:bg>
-      <p:bgPr>
-        <a:pattFill prst="pct10">
-          <a:fgClr>
-            <a:schemeClr val="accent1">
-              <a:lumMod val="60000"/>
-              <a:lumOff val="40000"/>
-            </a:schemeClr>
-          </a:fgClr>
-          <a:bgClr>
-            <a:schemeClr val="bg1"/>
-          </a:bgClr>
-        </a:pattFill>
-        <a:effectLst/>
-      </p:bgPr>
-    </p:bg>
-    <p:spTree>
-      <p:nvGrpSpPr>
-        <p:cNvPr id="1" name=""/>
-        <p:cNvGrpSpPr/>
-        <p:nvPr/>
-      </p:nvGrpSpPr>
-      <p:grpSpPr>
-        <a:xfrm>
-          <a:off x="0" y="0"/>
-          <a:ext cx="0" cy="0"/>
-          <a:chOff x="0" y="0"/>
-          <a:chExt cx="0" cy="0"/>
-        </a:xfrm>
-      </p:grpSpPr>
-      <p:sp>
-        <p:nvSpPr>
           <p:cNvPr id="8" name="TextBox 7"/>
           <p:cNvSpPr txBox="1"/>
           <p:nvPr/>
@@ -12180,7 +11551,7 @@
                 <a:latin typeface="Courier New" panose="02070309020205020404" pitchFamily="49" charset="0"/>
                 <a:cs typeface="Courier New" panose="02070309020205020404" pitchFamily="49" charset="0"/>
               </a:rPr>
-              <a:t>Использование </a:t>
+              <a:t> Использование </a:t>
             </a:r>
             <a:r>
               <a:rPr lang="ru-RU" sz="2800" b="1" dirty="0" smtClean="0">
@@ -12210,7 +11581,14 @@
                 <a:latin typeface="Courier New" panose="02070309020205020404" pitchFamily="49" charset="0"/>
                 <a:cs typeface="Courier New" panose="02070309020205020404" pitchFamily="49" charset="0"/>
               </a:rPr>
-              <a:t>Наличие механизмов </a:t>
+              <a:t> Наличие </a:t>
+            </a:r>
+            <a:r>
+              <a:rPr lang="ru-RU" sz="2800" dirty="0" smtClean="0">
+                <a:latin typeface="Courier New" panose="02070309020205020404" pitchFamily="49" charset="0"/>
+                <a:cs typeface="Courier New" panose="02070309020205020404" pitchFamily="49" charset="0"/>
+              </a:rPr>
+              <a:t>механизмов </a:t>
             </a:r>
             <a:r>
               <a:rPr lang="ru-RU" sz="2800" b="1" dirty="0" smtClean="0">
@@ -12233,7 +11611,7 @@
                 <a:latin typeface="Courier New" panose="02070309020205020404" pitchFamily="49" charset="0"/>
                 <a:cs typeface="Courier New" panose="02070309020205020404" pitchFamily="49" charset="0"/>
               </a:rPr>
-              <a:t>Отсутствие </a:t>
+              <a:t> Отсутствие </a:t>
             </a:r>
             <a:r>
               <a:rPr lang="ru-RU" sz="2800" b="1" dirty="0" smtClean="0">
@@ -12256,7 +11634,14 @@
                 <a:latin typeface="Courier New" panose="02070309020205020404" pitchFamily="49" charset="0"/>
                 <a:cs typeface="Courier New" panose="02070309020205020404" pitchFamily="49" charset="0"/>
               </a:rPr>
-              <a:t>Простой вычислительных ресурсов:</a:t>
+              <a:t> Простой </a:t>
+            </a:r>
+            <a:r>
+              <a:rPr lang="ru-RU" sz="2800" dirty="0" smtClean="0">
+                <a:latin typeface="Courier New" panose="02070309020205020404" pitchFamily="49" charset="0"/>
+                <a:cs typeface="Courier New" panose="02070309020205020404" pitchFamily="49" charset="0"/>
+              </a:rPr>
+              <a:t>вычислительных ресурсов:</a:t>
             </a:r>
           </a:p>
           <a:p>
@@ -12458,7 +11843,7 @@
 </p:sld>
 </file>
 
-<file path=ppt/slides/slide6.xml><?xml version="1.0" encoding="utf-8"?>
+<file path=ppt/slides/slide5.xml><?xml version="1.0" encoding="utf-8"?>
 <p:sld xmlns:a="http://schemas.openxmlformats.org/drawingml/2006/main" xmlns:r="http://schemas.openxmlformats.org/officeDocument/2006/relationships" xmlns:p="http://schemas.openxmlformats.org/presentationml/2006/main">
   <p:cSld>
     <p:bg>
@@ -12512,7 +11897,7 @@
             <p:nvPr>
               <p:extLst>
                 <p:ext uri="{D42A27DB-BD31-4B8C-83A1-F6EECF244321}">
-                  <p14:modId xmlns:p14="http://schemas.microsoft.com/office/powerpoint/2010/main" val="1229570835"/>
+                  <p14:modId xmlns:p14="http://schemas.microsoft.com/office/powerpoint/2010/main" val="2859311194"/>
                 </p:ext>
               </p:extLst>
             </p:nvPr>
@@ -12534,7 +11919,7 @@
             <p:nvPr>
               <p:extLst>
                 <p:ext uri="{D42A27DB-BD31-4B8C-83A1-F6EECF244321}">
-                  <p14:modId xmlns:p14="http://schemas.microsoft.com/office/powerpoint/2010/main" val="524577689"/>
+                  <p14:modId xmlns:p14="http://schemas.microsoft.com/office/powerpoint/2010/main" val="425247530"/>
                 </p:ext>
               </p:extLst>
             </p:nvPr>
@@ -12557,7 +11942,7 @@
           </p:nvSpPr>
           <p:spPr>
             <a:xfrm>
-              <a:off x="3209192" y="4466493"/>
+              <a:off x="2954549" y="4382314"/>
               <a:ext cx="1354016" cy="307777"/>
             </a:xfrm>
             <a:prstGeom prst="rect">
@@ -12587,7 +11972,7 @@
           </p:nvSpPr>
           <p:spPr>
             <a:xfrm>
-              <a:off x="6392008" y="5161085"/>
+              <a:off x="6349702" y="5121181"/>
               <a:ext cx="1406769" cy="307777"/>
             </a:xfrm>
             <a:prstGeom prst="rect">
@@ -12825,525 +12210,7 @@
 </p:sld>
 </file>
 
-<file path=ppt/slides/slide7.xml><?xml version="1.0" encoding="utf-8"?>
-<p:sld xmlns:a="http://schemas.openxmlformats.org/drawingml/2006/main" xmlns:r="http://schemas.openxmlformats.org/officeDocument/2006/relationships" xmlns:p="http://schemas.openxmlformats.org/presentationml/2006/main">
-  <p:cSld>
-    <p:bg>
-      <p:bgPr>
-        <a:pattFill prst="pct10">
-          <a:fgClr>
-            <a:schemeClr val="accent1">
-              <a:lumMod val="60000"/>
-              <a:lumOff val="40000"/>
-            </a:schemeClr>
-          </a:fgClr>
-          <a:bgClr>
-            <a:schemeClr val="bg1"/>
-          </a:bgClr>
-        </a:pattFill>
-        <a:effectLst/>
-      </p:bgPr>
-    </p:bg>
-    <p:spTree>
-      <p:nvGrpSpPr>
-        <p:cNvPr id="1" name=""/>
-        <p:cNvGrpSpPr/>
-        <p:nvPr/>
-      </p:nvGrpSpPr>
-      <p:grpSpPr>
-        <a:xfrm>
-          <a:off x="0" y="0"/>
-          <a:ext cx="0" cy="0"/>
-          <a:chOff x="0" y="0"/>
-          <a:chExt cx="0" cy="0"/>
-        </a:xfrm>
-      </p:grpSpPr>
-      <p:grpSp>
-        <p:nvGrpSpPr>
-          <p:cNvPr id="15" name="Группа 14"/>
-          <p:cNvGrpSpPr/>
-          <p:nvPr/>
-        </p:nvGrpSpPr>
-        <p:grpSpPr>
-          <a:xfrm>
-            <a:off x="1265278" y="1471663"/>
-            <a:ext cx="9333496" cy="4351382"/>
-            <a:chOff x="2196661" y="1849822"/>
-            <a:chExt cx="8387255" cy="3962400"/>
-          </a:xfrm>
-        </p:grpSpPr>
-        <p:sp>
-          <p:nvSpPr>
-            <p:cNvPr id="3" name="Прямоугольник 2"/>
-            <p:cNvSpPr/>
-            <p:nvPr/>
-          </p:nvSpPr>
-          <p:spPr>
-            <a:xfrm>
-              <a:off x="2196661" y="1849822"/>
-              <a:ext cx="8387255" cy="3962400"/>
-            </a:xfrm>
-            <a:prstGeom prst="rect">
-              <a:avLst/>
-            </a:prstGeom>
-            <a:solidFill>
-              <a:schemeClr val="bg2"/>
-            </a:solidFill>
-          </p:spPr>
-          <p:style>
-            <a:lnRef idx="1">
-              <a:schemeClr val="accent5"/>
-            </a:lnRef>
-            <a:fillRef idx="2">
-              <a:schemeClr val="accent5"/>
-            </a:fillRef>
-            <a:effectRef idx="1">
-              <a:schemeClr val="accent5"/>
-            </a:effectRef>
-            <a:fontRef idx="minor">
-              <a:schemeClr val="dk1"/>
-            </a:fontRef>
-          </p:style>
-          <p:txBody>
-            <a:bodyPr rtlCol="0" anchor="ctr"/>
-            <a:lstStyle/>
-            <a:p>
-              <a:pPr algn="ctr"/>
-              <a:endParaRPr lang="en-US" dirty="0"/>
-            </a:p>
-          </p:txBody>
-        </p:sp>
-        <p:sp>
-          <p:nvSpPr>
-            <p:cNvPr id="4" name="Скругленный прямоугольник 3"/>
-            <p:cNvSpPr/>
-            <p:nvPr/>
-          </p:nvSpPr>
-          <p:spPr>
-            <a:xfrm>
-              <a:off x="2412122" y="2102069"/>
-              <a:ext cx="5696608" cy="2112579"/>
-            </a:xfrm>
-            <a:prstGeom prst="roundRect">
-              <a:avLst/>
-            </a:prstGeom>
-          </p:spPr>
-          <p:style>
-            <a:lnRef idx="2">
-              <a:schemeClr val="accent6"/>
-            </a:lnRef>
-            <a:fillRef idx="1">
-              <a:schemeClr val="lt1"/>
-            </a:fillRef>
-            <a:effectRef idx="0">
-              <a:schemeClr val="accent6"/>
-            </a:effectRef>
-            <a:fontRef idx="minor">
-              <a:schemeClr val="dk1"/>
-            </a:fontRef>
-          </p:style>
-          <p:txBody>
-            <a:bodyPr rtlCol="0" anchor="t"/>
-            <a:lstStyle/>
-            <a:p>
-              <a:pPr algn="ctr"/>
-              <a:r>
-                <a:rPr lang="ru-RU" dirty="0" smtClean="0"/>
-                <a:t>Процессор 1</a:t>
-              </a:r>
-            </a:p>
-          </p:txBody>
-        </p:sp>
-        <p:sp>
-          <p:nvSpPr>
-            <p:cNvPr id="8" name="Скругленный прямоугольник 7"/>
-            <p:cNvSpPr/>
-            <p:nvPr/>
-          </p:nvSpPr>
-          <p:spPr>
-            <a:xfrm>
-              <a:off x="8282152" y="2112578"/>
-              <a:ext cx="1975943" cy="2091557"/>
-            </a:xfrm>
-            <a:prstGeom prst="roundRect">
-              <a:avLst/>
-            </a:prstGeom>
-          </p:spPr>
-          <p:style>
-            <a:lnRef idx="2">
-              <a:schemeClr val="accent6"/>
-            </a:lnRef>
-            <a:fillRef idx="1">
-              <a:schemeClr val="lt1"/>
-            </a:fillRef>
-            <a:effectRef idx="0">
-              <a:schemeClr val="accent6"/>
-            </a:effectRef>
-            <a:fontRef idx="minor">
-              <a:schemeClr val="dk1"/>
-            </a:fontRef>
-          </p:style>
-          <p:txBody>
-            <a:bodyPr rtlCol="0" anchor="t"/>
-            <a:lstStyle/>
-            <a:p>
-              <a:pPr algn="ctr"/>
-              <a:r>
-                <a:rPr lang="ru-RU" dirty="0"/>
-                <a:t>Процессор </a:t>
-              </a:r>
-              <a:r>
-                <a:rPr lang="ru-RU" dirty="0" smtClean="0"/>
-                <a:t>2</a:t>
-              </a:r>
-              <a:endParaRPr lang="en-US" dirty="0"/>
-            </a:p>
-          </p:txBody>
-        </p:sp>
-        <p:sp>
-          <p:nvSpPr>
-            <p:cNvPr id="9" name="Скругленный прямоугольник 8"/>
-            <p:cNvSpPr/>
-            <p:nvPr/>
-          </p:nvSpPr>
-          <p:spPr>
-            <a:xfrm>
-              <a:off x="2427889" y="4466895"/>
-              <a:ext cx="3867806" cy="1082568"/>
-            </a:xfrm>
-            <a:prstGeom prst="roundRect">
-              <a:avLst/>
-            </a:prstGeom>
-          </p:spPr>
-          <p:style>
-            <a:lnRef idx="2">
-              <a:schemeClr val="accent6"/>
-            </a:lnRef>
-            <a:fillRef idx="1">
-              <a:schemeClr val="lt1"/>
-            </a:fillRef>
-            <a:effectRef idx="0">
-              <a:schemeClr val="accent6"/>
-            </a:effectRef>
-            <a:fontRef idx="minor">
-              <a:schemeClr val="dk1"/>
-            </a:fontRef>
-          </p:style>
-          <p:txBody>
-            <a:bodyPr rtlCol="0" anchor="t"/>
-            <a:lstStyle/>
-            <a:p>
-              <a:pPr algn="ctr"/>
-              <a:r>
-                <a:rPr lang="ru-RU" dirty="0"/>
-                <a:t>Процессор </a:t>
-              </a:r>
-              <a:r>
-                <a:rPr lang="ru-RU" dirty="0" smtClean="0"/>
-                <a:t>3</a:t>
-              </a:r>
-              <a:endParaRPr lang="en-US" dirty="0"/>
-            </a:p>
-          </p:txBody>
-        </p:sp>
-        <p:sp>
-          <p:nvSpPr>
-            <p:cNvPr id="10" name="Скругленный прямоугольник 9"/>
-            <p:cNvSpPr/>
-            <p:nvPr/>
-          </p:nvSpPr>
-          <p:spPr>
-            <a:xfrm>
-              <a:off x="6526924" y="4466895"/>
-              <a:ext cx="3731172" cy="1082568"/>
-            </a:xfrm>
-            <a:prstGeom prst="roundRect">
-              <a:avLst/>
-            </a:prstGeom>
-          </p:spPr>
-          <p:style>
-            <a:lnRef idx="2">
-              <a:schemeClr val="accent6"/>
-            </a:lnRef>
-            <a:fillRef idx="1">
-              <a:schemeClr val="lt1"/>
-            </a:fillRef>
-            <a:effectRef idx="0">
-              <a:schemeClr val="accent6"/>
-            </a:effectRef>
-            <a:fontRef idx="minor">
-              <a:schemeClr val="dk1"/>
-            </a:fontRef>
-          </p:style>
-          <p:txBody>
-            <a:bodyPr rtlCol="0" anchor="t"/>
-            <a:lstStyle/>
-            <a:p>
-              <a:pPr algn="ctr"/>
-              <a:r>
-                <a:rPr lang="ru-RU" dirty="0"/>
-                <a:t>Процессор 4</a:t>
-              </a:r>
-              <a:endParaRPr lang="en-US" dirty="0"/>
-            </a:p>
-          </p:txBody>
-        </p:sp>
-        <p:sp>
-          <p:nvSpPr>
-            <p:cNvPr id="11" name="Блок-схема: альтернативный процесс 10"/>
-            <p:cNvSpPr/>
-            <p:nvPr/>
-          </p:nvSpPr>
-          <p:spPr>
-            <a:xfrm>
-              <a:off x="2822026" y="2690647"/>
-              <a:ext cx="3799490" cy="1282263"/>
-            </a:xfrm>
-            <a:prstGeom prst="flowChartAlternateProcess">
-              <a:avLst/>
-            </a:prstGeom>
-          </p:spPr>
-          <p:style>
-            <a:lnRef idx="1">
-              <a:schemeClr val="accent4"/>
-            </a:lnRef>
-            <a:fillRef idx="2">
-              <a:schemeClr val="accent4"/>
-            </a:fillRef>
-            <a:effectRef idx="1">
-              <a:schemeClr val="accent4"/>
-            </a:effectRef>
-            <a:fontRef idx="minor">
-              <a:schemeClr val="dk1"/>
-            </a:fontRef>
-          </p:style>
-          <p:txBody>
-            <a:bodyPr rtlCol="0" anchor="ctr"/>
-            <a:lstStyle/>
-            <a:p>
-              <a:pPr marL="342900" indent="-342900">
-                <a:buFont typeface="+mj-lt"/>
-                <a:buAutoNum type="arabicPeriod"/>
-              </a:pPr>
-              <a:r>
-                <a:rPr lang="ru-RU" dirty="0"/>
-                <a:t>Загрузка шаблона</a:t>
-              </a:r>
-            </a:p>
-            <a:p>
-              <a:pPr marL="342900" indent="-342900">
-                <a:buFont typeface="+mj-lt"/>
-                <a:buAutoNum type="arabicPeriod"/>
-              </a:pPr>
-              <a:r>
-                <a:rPr lang="ru-RU" dirty="0" smtClean="0"/>
-                <a:t>Лексический анализ</a:t>
-              </a:r>
-            </a:p>
-            <a:p>
-              <a:pPr marL="342900" indent="-342900">
-                <a:buFont typeface="+mj-lt"/>
-                <a:buAutoNum type="arabicPeriod"/>
-              </a:pPr>
-              <a:r>
-                <a:rPr lang="ru-RU" dirty="0" smtClean="0"/>
-                <a:t>Синтаксический </a:t>
-              </a:r>
-              <a:r>
-                <a:rPr lang="ru-RU" dirty="0"/>
-                <a:t>анализ</a:t>
-              </a:r>
-            </a:p>
-            <a:p>
-              <a:pPr marL="342900" indent="-342900">
-                <a:buFont typeface="+mj-lt"/>
-                <a:buAutoNum type="arabicPeriod"/>
-              </a:pPr>
-              <a:r>
-                <a:rPr lang="ru-RU" dirty="0"/>
-                <a:t>Генерация веб-документа</a:t>
-              </a:r>
-              <a:endParaRPr lang="en-US" dirty="0"/>
-            </a:p>
-          </p:txBody>
-        </p:sp>
-        <p:sp>
-          <p:nvSpPr>
-            <p:cNvPr id="12" name="Блок-схема: альтернативный процесс 11"/>
-            <p:cNvSpPr/>
-            <p:nvPr/>
-          </p:nvSpPr>
-          <p:spPr>
-            <a:xfrm>
-              <a:off x="3145219" y="4987158"/>
-              <a:ext cx="2667001" cy="378373"/>
-            </a:xfrm>
-            <a:prstGeom prst="flowChartAlternateProcess">
-              <a:avLst/>
-            </a:prstGeom>
-          </p:spPr>
-          <p:style>
-            <a:lnRef idx="1">
-              <a:schemeClr val="accent4"/>
-            </a:lnRef>
-            <a:fillRef idx="2">
-              <a:schemeClr val="accent4"/>
-            </a:fillRef>
-            <a:effectRef idx="1">
-              <a:schemeClr val="accent4"/>
-            </a:effectRef>
-            <a:fontRef idx="minor">
-              <a:schemeClr val="dk1"/>
-            </a:fontRef>
-          </p:style>
-          <p:txBody>
-            <a:bodyPr rtlCol="0" anchor="ctr"/>
-            <a:lstStyle/>
-            <a:p>
-              <a:r>
-                <a:rPr lang="ru-RU" dirty="0" smtClean="0"/>
-                <a:t>Ожидаю задач …</a:t>
-              </a:r>
-              <a:endParaRPr lang="en-US" dirty="0"/>
-            </a:p>
-          </p:txBody>
-        </p:sp>
-        <p:sp>
-          <p:nvSpPr>
-            <p:cNvPr id="13" name="Блок-схема: альтернативный процесс 12"/>
-            <p:cNvSpPr/>
-            <p:nvPr/>
-          </p:nvSpPr>
-          <p:spPr>
-            <a:xfrm>
-              <a:off x="7165426" y="4987157"/>
-              <a:ext cx="2667001" cy="378373"/>
-            </a:xfrm>
-            <a:prstGeom prst="flowChartAlternateProcess">
-              <a:avLst/>
-            </a:prstGeom>
-          </p:spPr>
-          <p:style>
-            <a:lnRef idx="1">
-              <a:schemeClr val="accent4"/>
-            </a:lnRef>
-            <a:fillRef idx="2">
-              <a:schemeClr val="accent4"/>
-            </a:fillRef>
-            <a:effectRef idx="1">
-              <a:schemeClr val="accent4"/>
-            </a:effectRef>
-            <a:fontRef idx="minor">
-              <a:schemeClr val="dk1"/>
-            </a:fontRef>
-          </p:style>
-          <p:txBody>
-            <a:bodyPr rtlCol="0" anchor="ctr"/>
-            <a:lstStyle/>
-            <a:p>
-              <a:r>
-                <a:rPr lang="ru-RU" dirty="0" smtClean="0"/>
-                <a:t>Ожидаю задач …</a:t>
-              </a:r>
-              <a:endParaRPr lang="en-US" dirty="0"/>
-            </a:p>
-          </p:txBody>
-        </p:sp>
-        <p:sp>
-          <p:nvSpPr>
-            <p:cNvPr id="14" name="Блок-схема: альтернативный процесс 13"/>
-            <p:cNvSpPr/>
-            <p:nvPr/>
-          </p:nvSpPr>
-          <p:spPr>
-            <a:xfrm>
-              <a:off x="9038895" y="2953405"/>
-              <a:ext cx="462455" cy="378373"/>
-            </a:xfrm>
-            <a:prstGeom prst="flowChartAlternateProcess">
-              <a:avLst/>
-            </a:prstGeom>
-          </p:spPr>
-          <p:style>
-            <a:lnRef idx="1">
-              <a:schemeClr val="accent4"/>
-            </a:lnRef>
-            <a:fillRef idx="2">
-              <a:schemeClr val="accent4"/>
-            </a:fillRef>
-            <a:effectRef idx="1">
-              <a:schemeClr val="accent4"/>
-            </a:effectRef>
-            <a:fontRef idx="minor">
-              <a:schemeClr val="dk1"/>
-            </a:fontRef>
-          </p:style>
-          <p:txBody>
-            <a:bodyPr rtlCol="0" anchor="ctr"/>
-            <a:lstStyle/>
-            <a:p>
-              <a:r>
-                <a:rPr lang="ru-RU" dirty="0" smtClean="0"/>
-                <a:t>…</a:t>
-              </a:r>
-              <a:endParaRPr lang="en-US" dirty="0"/>
-            </a:p>
-          </p:txBody>
-        </p:sp>
-      </p:grpSp>
-      <p:sp>
-        <p:nvSpPr>
-          <p:cNvPr id="16" name="TextBox 15"/>
-          <p:cNvSpPr txBox="1"/>
-          <p:nvPr/>
-        </p:nvSpPr>
-        <p:spPr>
-          <a:xfrm>
-            <a:off x="1265278" y="400050"/>
-            <a:ext cx="9552400" cy="646331"/>
-          </a:xfrm>
-          <a:prstGeom prst="rect">
-            <a:avLst/>
-          </a:prstGeom>
-          <a:noFill/>
-        </p:spPr>
-        <p:txBody>
-          <a:bodyPr wrap="square" rtlCol="0">
-            <a:spAutoFit/>
-          </a:bodyPr>
-          <a:lstStyle/>
-          <a:p>
-            <a:r>
-              <a:rPr lang="ru-RU" sz="3600" b="1" dirty="0" smtClean="0">
-                <a:latin typeface="Courier New" panose="02070309020205020404" pitchFamily="49" charset="0"/>
-                <a:cs typeface="Courier New" panose="02070309020205020404" pitchFamily="49" charset="0"/>
-              </a:rPr>
-              <a:t>Простой вычислительных ресурсов</a:t>
-            </a:r>
-          </a:p>
-        </p:txBody>
-      </p:sp>
-    </p:spTree>
-    <p:extLst>
-      <p:ext uri="{BB962C8B-B14F-4D97-AF65-F5344CB8AC3E}">
-        <p14:creationId xmlns:p14="http://schemas.microsoft.com/office/powerpoint/2010/main" val="44857748"/>
-      </p:ext>
-    </p:extLst>
-  </p:cSld>
-  <p:clrMapOvr>
-    <a:masterClrMapping/>
-  </p:clrMapOvr>
-  <p:timing>
-    <p:tnLst>
-      <p:par>
-        <p:cTn id="1" dur="indefinite" restart="never" nodeType="tmRoot"/>
-      </p:par>
-    </p:tnLst>
-  </p:timing>
-</p:sld>
-</file>
-
-<file path=ppt/slides/slide8.xml><?xml version="1.0" encoding="utf-8"?>
+<file path=ppt/slides/slide6.xml><?xml version="1.0" encoding="utf-8"?>
 <p:sld xmlns:a="http://schemas.openxmlformats.org/drawingml/2006/main" xmlns:r="http://schemas.openxmlformats.org/officeDocument/2006/relationships" xmlns:p="http://schemas.openxmlformats.org/presentationml/2006/main">
   <p:cSld>
     <p:bg>
@@ -13569,19 +12436,8 @@
                 <a:latin typeface="Courier New" panose="02070309020205020404" pitchFamily="49" charset="0"/>
                 <a:cs typeface="Courier New" panose="02070309020205020404" pitchFamily="49" charset="0"/>
               </a:rPr>
-              <a:t> (</a:t>
-            </a:r>
-            <a:r>
-              <a:rPr lang="ru-RU" sz="2400" dirty="0" smtClean="0">
-                <a:latin typeface="Courier New" panose="02070309020205020404" pitchFamily="49" charset="0"/>
-                <a:cs typeface="Courier New" panose="02070309020205020404" pitchFamily="49" charset="0"/>
-              </a:rPr>
-              <a:t>параллельного) исполнения</a:t>
-            </a:r>
-            <a:endParaRPr lang="ru-RU" sz="2400" dirty="0" smtClean="0">
-              <a:latin typeface="Courier New" panose="02070309020205020404" pitchFamily="49" charset="0"/>
-              <a:cs typeface="Courier New" panose="02070309020205020404" pitchFamily="49" charset="0"/>
-            </a:endParaRPr>
+              <a:t> (параллельного) исполнения</a:t>
+            </a:r>
           </a:p>
           <a:p>
             <a:pPr marL="742950" lvl="1" indent="-285750">
@@ -13629,7 +12485,7 @@
 </p:sld>
 </file>
 
-<file path=ppt/slides/slide9.xml><?xml version="1.0" encoding="utf-8"?>
+<file path=ppt/slides/slide7.xml><?xml version="1.0" encoding="utf-8"?>
 <p:sld xmlns:a="http://schemas.openxmlformats.org/drawingml/2006/main" xmlns:r="http://schemas.openxmlformats.org/officeDocument/2006/relationships" xmlns:p="http://schemas.openxmlformats.org/presentationml/2006/main">
   <p:cSld>
     <p:bg>
@@ -14682,6 +13538,446 @@
 </p:sld>
 </file>
 
+<file path=ppt/slides/slide8.xml><?xml version="1.0" encoding="utf-8"?>
+<p:sld xmlns:a="http://schemas.openxmlformats.org/drawingml/2006/main" xmlns:r="http://schemas.openxmlformats.org/officeDocument/2006/relationships" xmlns:p="http://schemas.openxmlformats.org/presentationml/2006/main">
+  <p:cSld>
+    <p:bg>
+      <p:bgPr>
+        <a:pattFill prst="pct10">
+          <a:fgClr>
+            <a:schemeClr val="accent1">
+              <a:lumMod val="60000"/>
+              <a:lumOff val="40000"/>
+            </a:schemeClr>
+          </a:fgClr>
+          <a:bgClr>
+            <a:schemeClr val="bg1"/>
+          </a:bgClr>
+        </a:pattFill>
+        <a:effectLst/>
+      </p:bgPr>
+    </p:bg>
+    <p:spTree>
+      <p:nvGrpSpPr>
+        <p:cNvPr id="1" name=""/>
+        <p:cNvGrpSpPr/>
+        <p:nvPr/>
+      </p:nvGrpSpPr>
+      <p:grpSpPr>
+        <a:xfrm>
+          <a:off x="0" y="0"/>
+          <a:ext cx="0" cy="0"/>
+          <a:chOff x="0" y="0"/>
+          <a:chExt cx="0" cy="0"/>
+        </a:xfrm>
+      </p:grpSpPr>
+      <p:sp>
+        <p:nvSpPr>
+          <p:cNvPr id="3" name="TextBox 2"/>
+          <p:cNvSpPr txBox="1"/>
+          <p:nvPr/>
+        </p:nvSpPr>
+        <p:spPr>
+          <a:xfrm>
+            <a:off x="1248872" y="209084"/>
+            <a:ext cx="8386741" cy="646331"/>
+          </a:xfrm>
+          <a:prstGeom prst="rect">
+            <a:avLst/>
+          </a:prstGeom>
+          <a:noFill/>
+        </p:spPr>
+        <p:txBody>
+          <a:bodyPr wrap="square" rtlCol="0">
+            <a:spAutoFit/>
+          </a:bodyPr>
+          <a:lstStyle/>
+          <a:p>
+            <a:r>
+              <a:rPr lang="ru-RU" sz="3600" b="1" dirty="0" smtClean="0">
+                <a:latin typeface="Courier New" panose="02070309020205020404" pitchFamily="49" charset="0"/>
+                <a:cs typeface="Courier New" panose="02070309020205020404" pitchFamily="49" charset="0"/>
+              </a:rPr>
+              <a:t>Модель работы веб-сервиса</a:t>
+            </a:r>
+            <a:endParaRPr lang="en-US" sz="3600" b="1" dirty="0">
+              <a:latin typeface="Courier New" panose="02070309020205020404" pitchFamily="49" charset="0"/>
+              <a:cs typeface="Courier New" panose="02070309020205020404" pitchFamily="49" charset="0"/>
+            </a:endParaRPr>
+          </a:p>
+        </p:txBody>
+      </p:sp>
+      <p:pic>
+        <p:nvPicPr>
+          <p:cNvPr id="4" name="Рисунок 3"/>
+          <p:cNvPicPr>
+            <a:picLocks noChangeAspect="1"/>
+          </p:cNvPicPr>
+          <p:nvPr/>
+        </p:nvPicPr>
+        <p:blipFill>
+          <a:blip r:embed="rId2">
+            <a:extLst>
+              <a:ext uri="{28A0092B-C50C-407E-A947-70E740481C1C}">
+                <a14:useLocalDpi xmlns:a14="http://schemas.microsoft.com/office/drawing/2010/main" val="0"/>
+              </a:ext>
+            </a:extLst>
+          </a:blip>
+          <a:stretch>
+            <a:fillRect/>
+          </a:stretch>
+        </p:blipFill>
+        <p:spPr>
+          <a:xfrm>
+            <a:off x="1248872" y="999801"/>
+            <a:ext cx="8925275" cy="5505171"/>
+          </a:xfrm>
+          <a:prstGeom prst="rect">
+            <a:avLst/>
+          </a:prstGeom>
+          <a:ln>
+            <a:solidFill>
+              <a:schemeClr val="tx1"/>
+            </a:solidFill>
+          </a:ln>
+        </p:spPr>
+      </p:pic>
+    </p:spTree>
+    <p:extLst>
+      <p:ext uri="{BB962C8B-B14F-4D97-AF65-F5344CB8AC3E}">
+        <p14:creationId xmlns:p14="http://schemas.microsoft.com/office/powerpoint/2010/main" val="279697673"/>
+      </p:ext>
+    </p:extLst>
+  </p:cSld>
+  <p:clrMapOvr>
+    <a:masterClrMapping/>
+  </p:clrMapOvr>
+</p:sld>
+</file>
+
+<file path=ppt/slides/slide9.xml><?xml version="1.0" encoding="utf-8"?>
+<p:sld xmlns:a="http://schemas.openxmlformats.org/drawingml/2006/main" xmlns:r="http://schemas.openxmlformats.org/officeDocument/2006/relationships" xmlns:p="http://schemas.openxmlformats.org/presentationml/2006/main">
+  <p:cSld>
+    <p:bg>
+      <p:bgPr>
+        <a:pattFill prst="pct10">
+          <a:fgClr>
+            <a:schemeClr val="accent1">
+              <a:lumMod val="60000"/>
+              <a:lumOff val="40000"/>
+            </a:schemeClr>
+          </a:fgClr>
+          <a:bgClr>
+            <a:schemeClr val="bg1"/>
+          </a:bgClr>
+        </a:pattFill>
+        <a:effectLst/>
+      </p:bgPr>
+    </p:bg>
+    <p:spTree>
+      <p:nvGrpSpPr>
+        <p:cNvPr id="1" name=""/>
+        <p:cNvGrpSpPr/>
+        <p:nvPr/>
+      </p:nvGrpSpPr>
+      <p:grpSpPr>
+        <a:xfrm>
+          <a:off x="0" y="0"/>
+          <a:ext cx="0" cy="0"/>
+          <a:chOff x="0" y="0"/>
+          <a:chExt cx="0" cy="0"/>
+        </a:xfrm>
+      </p:grpSpPr>
+      <p:sp>
+        <p:nvSpPr>
+          <p:cNvPr id="4" name="TextBox 3"/>
+          <p:cNvSpPr txBox="1"/>
+          <p:nvPr/>
+        </p:nvSpPr>
+        <p:spPr>
+          <a:xfrm>
+            <a:off x="1053190" y="310243"/>
+            <a:ext cx="9794423" cy="646331"/>
+          </a:xfrm>
+          <a:prstGeom prst="rect">
+            <a:avLst/>
+          </a:prstGeom>
+          <a:noFill/>
+        </p:spPr>
+        <p:txBody>
+          <a:bodyPr wrap="square" rtlCol="0">
+            <a:spAutoFit/>
+          </a:bodyPr>
+          <a:lstStyle/>
+          <a:p>
+            <a:r>
+              <a:rPr lang="ru-RU" sz="3600" b="1" dirty="0" smtClean="0">
+                <a:latin typeface="Courier New" panose="02070309020205020404" pitchFamily="49" charset="0"/>
+                <a:cs typeface="Courier New" panose="02070309020205020404" pitchFamily="49" charset="0"/>
+              </a:rPr>
+              <a:t>Выбранные инструменты разработки</a:t>
+            </a:r>
+            <a:endParaRPr lang="en-US" sz="3600" dirty="0"/>
+          </a:p>
+        </p:txBody>
+      </p:sp>
+      <p:sp>
+        <p:nvSpPr>
+          <p:cNvPr id="5" name="TextBox 4"/>
+          <p:cNvSpPr txBox="1"/>
+          <p:nvPr/>
+        </p:nvSpPr>
+        <p:spPr>
+          <a:xfrm>
+            <a:off x="1053191" y="1126671"/>
+            <a:ext cx="10197194" cy="5170646"/>
+          </a:xfrm>
+          <a:prstGeom prst="rect">
+            <a:avLst/>
+          </a:prstGeom>
+          <a:noFill/>
+        </p:spPr>
+        <p:txBody>
+          <a:bodyPr wrap="square" rtlCol="0">
+            <a:spAutoFit/>
+          </a:bodyPr>
+          <a:lstStyle/>
+          <a:p>
+            <a:pPr>
+              <a:lnSpc>
+                <a:spcPct val="150000"/>
+              </a:lnSpc>
+            </a:pPr>
+            <a:r>
+              <a:rPr lang="ru-RU" sz="2400" b="1" dirty="0">
+                <a:latin typeface="Courier New" panose="02070309020205020404" pitchFamily="49" charset="0"/>
+                <a:cs typeface="Courier New" panose="02070309020205020404" pitchFamily="49" charset="0"/>
+              </a:rPr>
+              <a:t>Серверная часть:</a:t>
+            </a:r>
+          </a:p>
+          <a:p>
+            <a:pPr marL="800100" lvl="1" indent="-342900">
+              <a:lnSpc>
+                <a:spcPct val="150000"/>
+              </a:lnSpc>
+              <a:buFont typeface="Arial" panose="020B0604020202020204" pitchFamily="34" charset="0"/>
+              <a:buChar char="•"/>
+            </a:pPr>
+            <a:r>
+              <a:rPr lang="ru-RU" sz="2400" dirty="0">
+                <a:latin typeface="Courier New" panose="02070309020205020404" pitchFamily="49" charset="0"/>
+                <a:cs typeface="Courier New" panose="02070309020205020404" pitchFamily="49" charset="0"/>
+              </a:rPr>
+              <a:t>Язык программирования</a:t>
+            </a:r>
+            <a:r>
+              <a:rPr lang="en-US" sz="2400" dirty="0">
+                <a:latin typeface="Courier New" panose="02070309020205020404" pitchFamily="49" charset="0"/>
+                <a:cs typeface="Courier New" panose="02070309020205020404" pitchFamily="49" charset="0"/>
+              </a:rPr>
+              <a:t> </a:t>
+            </a:r>
+            <a:r>
+              <a:rPr lang="en-US" sz="2400" b="1" dirty="0">
+                <a:latin typeface="Courier New" panose="02070309020205020404" pitchFamily="49" charset="0"/>
+                <a:cs typeface="Courier New" panose="02070309020205020404" pitchFamily="49" charset="0"/>
+              </a:rPr>
+              <a:t>Rust</a:t>
+            </a:r>
+          </a:p>
+          <a:p>
+            <a:pPr marL="800100" lvl="1" indent="-342900">
+              <a:lnSpc>
+                <a:spcPct val="150000"/>
+              </a:lnSpc>
+              <a:buFont typeface="Arial" panose="020B0604020202020204" pitchFamily="34" charset="0"/>
+              <a:buChar char="•"/>
+            </a:pPr>
+            <a:r>
+              <a:rPr lang="ru-RU" sz="2400" dirty="0">
+                <a:latin typeface="Courier New" panose="02070309020205020404" pitchFamily="49" charset="0"/>
+                <a:cs typeface="Courier New" panose="02070309020205020404" pitchFamily="49" charset="0"/>
+              </a:rPr>
+              <a:t>Библиотека асинхронного выполнения </a:t>
+            </a:r>
+            <a:r>
+              <a:rPr lang="en-US" sz="2400" b="1" dirty="0" err="1">
+                <a:latin typeface="Courier New" panose="02070309020205020404" pitchFamily="49" charset="0"/>
+                <a:cs typeface="Courier New" panose="02070309020205020404" pitchFamily="49" charset="0"/>
+              </a:rPr>
+              <a:t>tokio</a:t>
+            </a:r>
+            <a:endParaRPr lang="ru-RU" sz="2400" b="1" dirty="0">
+              <a:latin typeface="Courier New" panose="02070309020205020404" pitchFamily="49" charset="0"/>
+              <a:cs typeface="Courier New" panose="02070309020205020404" pitchFamily="49" charset="0"/>
+            </a:endParaRPr>
+          </a:p>
+          <a:p>
+            <a:pPr marL="800100" lvl="1" indent="-342900">
+              <a:lnSpc>
+                <a:spcPct val="150000"/>
+              </a:lnSpc>
+              <a:buFont typeface="Arial" panose="020B0604020202020204" pitchFamily="34" charset="0"/>
+              <a:buChar char="•"/>
+            </a:pPr>
+            <a:r>
+              <a:rPr lang="ru-RU" sz="2400" dirty="0">
+                <a:latin typeface="Courier New" panose="02070309020205020404" pitchFamily="49" charset="0"/>
+                <a:cs typeface="Courier New" panose="02070309020205020404" pitchFamily="49" charset="0"/>
+              </a:rPr>
+              <a:t>Библиотека шаблонизации </a:t>
+            </a:r>
+            <a:r>
+              <a:rPr lang="en-US" sz="2400" b="1" dirty="0" err="1">
+                <a:latin typeface="Courier New" panose="02070309020205020404" pitchFamily="49" charset="0"/>
+                <a:cs typeface="Courier New" panose="02070309020205020404" pitchFamily="49" charset="0"/>
+              </a:rPr>
+              <a:t>tera</a:t>
+            </a:r>
+            <a:endParaRPr lang="en-US" sz="2400" dirty="0">
+              <a:latin typeface="Courier New" panose="02070309020205020404" pitchFamily="49" charset="0"/>
+              <a:cs typeface="Courier New" panose="02070309020205020404" pitchFamily="49" charset="0"/>
+            </a:endParaRPr>
+          </a:p>
+          <a:p>
+            <a:pPr>
+              <a:lnSpc>
+                <a:spcPct val="150000"/>
+              </a:lnSpc>
+            </a:pPr>
+            <a:r>
+              <a:rPr lang="ru-RU" sz="2400" b="1" dirty="0">
+                <a:latin typeface="Courier New" panose="02070309020205020404" pitchFamily="49" charset="0"/>
+                <a:cs typeface="Courier New" panose="02070309020205020404" pitchFamily="49" charset="0"/>
+              </a:rPr>
+              <a:t>Клиентская часть:</a:t>
+            </a:r>
+          </a:p>
+          <a:p>
+            <a:pPr marL="800100" lvl="1" indent="-342900">
+              <a:lnSpc>
+                <a:spcPct val="150000"/>
+              </a:lnSpc>
+              <a:buFont typeface="Arial" panose="020B0604020202020204" pitchFamily="34" charset="0"/>
+              <a:buChar char="•"/>
+            </a:pPr>
+            <a:r>
+              <a:rPr lang="ru-RU" sz="2400" dirty="0">
+                <a:latin typeface="Courier New" panose="02070309020205020404" pitchFamily="49" charset="0"/>
+                <a:cs typeface="Courier New" panose="02070309020205020404" pitchFamily="49" charset="0"/>
+              </a:rPr>
+              <a:t>Любое приложение, способное совершать </a:t>
+            </a:r>
+            <a:r>
+              <a:rPr lang="en-US" sz="2400" dirty="0">
+                <a:latin typeface="Courier New" panose="02070309020205020404" pitchFamily="49" charset="0"/>
+                <a:cs typeface="Courier New" panose="02070309020205020404" pitchFamily="49" charset="0"/>
+              </a:rPr>
+              <a:t>http </a:t>
+            </a:r>
+            <a:r>
+              <a:rPr lang="ru-RU" sz="2400" dirty="0">
+                <a:latin typeface="Courier New" panose="02070309020205020404" pitchFamily="49" charset="0"/>
+                <a:cs typeface="Courier New" panose="02070309020205020404" pitchFamily="49" charset="0"/>
+              </a:rPr>
+              <a:t>запросы</a:t>
+            </a:r>
+          </a:p>
+          <a:p>
+            <a:pPr marL="800100" lvl="1" indent="-342900">
+              <a:lnSpc>
+                <a:spcPct val="150000"/>
+              </a:lnSpc>
+              <a:buFont typeface="Arial" panose="020B0604020202020204" pitchFamily="34" charset="0"/>
+              <a:buChar char="•"/>
+            </a:pPr>
+            <a:r>
+              <a:rPr lang="ru-RU" sz="2400" dirty="0">
+                <a:latin typeface="Courier New" panose="02070309020205020404" pitchFamily="49" charset="0"/>
+                <a:cs typeface="Courier New" panose="02070309020205020404" pitchFamily="49" charset="0"/>
+              </a:rPr>
+              <a:t>Графический пользовательский интерфейс:</a:t>
+            </a:r>
+          </a:p>
+          <a:p>
+            <a:pPr marL="1257300" lvl="2" indent="-342900">
+              <a:lnSpc>
+                <a:spcPct val="150000"/>
+              </a:lnSpc>
+              <a:buFont typeface="Wingdings" panose="05000000000000000000" pitchFamily="2" charset="2"/>
+              <a:buChar char="§"/>
+            </a:pPr>
+            <a:r>
+              <a:rPr lang="en-US" sz="2000" dirty="0">
+                <a:latin typeface="Courier New" panose="02070309020205020404" pitchFamily="49" charset="0"/>
+                <a:cs typeface="Courier New" panose="02070309020205020404" pitchFamily="49" charset="0"/>
+              </a:rPr>
+              <a:t>JavaScript framework </a:t>
+            </a:r>
+            <a:r>
+              <a:rPr lang="en-US" sz="2000" b="1" dirty="0">
+                <a:latin typeface="Courier New" panose="02070309020205020404" pitchFamily="49" charset="0"/>
+                <a:cs typeface="Courier New" panose="02070309020205020404" pitchFamily="49" charset="0"/>
+              </a:rPr>
+              <a:t>Vue.js</a:t>
+            </a:r>
+          </a:p>
+          <a:p>
+            <a:pPr marL="1257300" lvl="2" indent="-342900">
+              <a:lnSpc>
+                <a:spcPct val="150000"/>
+              </a:lnSpc>
+              <a:buFont typeface="Wingdings" panose="05000000000000000000" pitchFamily="2" charset="2"/>
+              <a:buChar char="§"/>
+            </a:pPr>
+            <a:r>
+              <a:rPr lang="en-US" sz="2000" dirty="0">
+                <a:latin typeface="Courier New" panose="02070309020205020404" pitchFamily="49" charset="0"/>
+                <a:cs typeface="Courier New" panose="02070309020205020404" pitchFamily="49" charset="0"/>
+              </a:rPr>
+              <a:t>HTML </a:t>
+            </a:r>
+            <a:r>
+              <a:rPr lang="ru-RU" sz="2000" dirty="0">
+                <a:latin typeface="Courier New" panose="02070309020205020404" pitchFamily="49" charset="0"/>
+                <a:cs typeface="Courier New" panose="02070309020205020404" pitchFamily="49" charset="0"/>
+              </a:rPr>
+              <a:t>и </a:t>
+            </a:r>
+            <a:r>
+              <a:rPr lang="en-US" sz="2000" dirty="0">
+                <a:latin typeface="Courier New" panose="02070309020205020404" pitchFamily="49" charset="0"/>
+                <a:cs typeface="Courier New" panose="02070309020205020404" pitchFamily="49" charset="0"/>
+              </a:rPr>
+              <a:t>CSS</a:t>
+            </a:r>
+          </a:p>
+          <a:p>
+            <a:endParaRPr lang="en-US" dirty="0"/>
+          </a:p>
+        </p:txBody>
+      </p:sp>
+    </p:spTree>
+    <p:extLst>
+      <p:ext uri="{BB962C8B-B14F-4D97-AF65-F5344CB8AC3E}">
+        <p14:creationId xmlns:p14="http://schemas.microsoft.com/office/powerpoint/2010/main" val="4053716737"/>
+      </p:ext>
+    </p:extLst>
+  </p:cSld>
+  <p:clrMapOvr>
+    <a:masterClrMapping/>
+  </p:clrMapOvr>
+  <p:timing>
+    <p:tnLst>
+      <p:par>
+        <p:cTn id="1" dur="indefinite" restart="never" nodeType="tmRoot"/>
+      </p:par>
+    </p:tnLst>
+  </p:timing>
+</p:sld>
+</file>
+
 <file path=ppt/theme/theme1.xml><?xml version="1.0" encoding="utf-8"?>
 <a:theme xmlns:a="http://schemas.openxmlformats.org/drawingml/2006/main" name="Тема Office">
   <a:themeElements>

</xml_diff>

<commit_message>
Further updates to doc
</commit_message>
<xml_diff>
--- a/docs/Презентация ВКР.pptx
+++ b/docs/Презентация ВКР.pptx
@@ -5,7 +5,7 @@
     <p:sldMasterId id="2147483842" r:id="rId1"/>
   </p:sldMasterIdLst>
   <p:notesMasterIdLst>
-    <p:notesMasterId r:id="rId16"/>
+    <p:notesMasterId r:id="rId15"/>
   </p:notesMasterIdLst>
   <p:sldIdLst>
     <p:sldId id="256" r:id="rId2"/>
@@ -21,7 +21,6 @@
     <p:sldId id="273" r:id="rId12"/>
     <p:sldId id="272" r:id="rId13"/>
     <p:sldId id="277" r:id="rId14"/>
-    <p:sldId id="279" r:id="rId15"/>
   </p:sldIdLst>
   <p:sldSz cx="12192000" cy="6858000"/>
   <p:notesSz cx="6858000" cy="9144000"/>
@@ -140,20 +139,6 @@
 </p:cmAuthorLst>
 </file>
 
-<file path=ppt/comments/comment1.xml><?xml version="1.0" encoding="utf-8"?>
-<p:cmLst xmlns:a="http://schemas.openxmlformats.org/drawingml/2006/main" xmlns:r="http://schemas.openxmlformats.org/officeDocument/2006/relationships" xmlns:p="http://schemas.openxmlformats.org/presentationml/2006/main">
-  <p:cm authorId="1" dt="2020-06-17T21:02:00.419" idx="3">
-    <p:pos x="10" y="10"/>
-    <p:text>Может как-то сократить?</p:text>
-    <p:extLst>
-      <p:ext uri="{C676402C-5697-4E1C-873F-D02D1690AC5C}">
-        <p15:threadingInfo xmlns:p15="http://schemas.microsoft.com/office/powerpoint/2012/main" timeZoneBias="-180"/>
-      </p:ext>
-    </p:extLst>
-  </p:cm>
-</p:cmLst>
-</file>
-
 <file path=ppt/diagrams/colors1.xml><?xml version="1.0" encoding="utf-8"?>
 <dgm:colorsDef xmlns:dgm="http://schemas.openxmlformats.org/drawingml/2006/diagram" xmlns:a="http://schemas.openxmlformats.org/drawingml/2006/main" uniqueId="urn:microsoft.com/office/officeart/2005/8/colors/accent0_2">
   <dgm:title val=""/>
@@ -1788,19 +1773,8 @@
               <a:latin typeface="Courier New" panose="02070309020205020404" pitchFamily="49" charset="0"/>
               <a:cs typeface="Courier New" panose="02070309020205020404" pitchFamily="49" charset="0"/>
             </a:rPr>
-            <a:t>Исходный </a:t>
+            <a:t>Исходный код</a:t>
           </a:r>
-          <a:r>
-            <a:rPr lang="ru-RU" sz="1100" dirty="0" smtClean="0">
-              <a:latin typeface="Courier New" panose="02070309020205020404" pitchFamily="49" charset="0"/>
-              <a:cs typeface="Courier New" panose="02070309020205020404" pitchFamily="49" charset="0"/>
-            </a:rPr>
-            <a:t>код</a:t>
-          </a:r>
-          <a:endParaRPr lang="ru-RU" sz="1100" dirty="0" smtClean="0">
-            <a:latin typeface="Courier New" panose="02070309020205020404" pitchFamily="49" charset="0"/>
-            <a:cs typeface="Courier New" panose="02070309020205020404" pitchFamily="49" charset="0"/>
-          </a:endParaRPr>
         </a:p>
         <a:p>
           <a:pPr algn="l"/>
@@ -2165,19 +2139,8 @@
               <a:latin typeface="Courier New" panose="02070309020205020404" pitchFamily="49" charset="0"/>
               <a:cs typeface="Courier New" panose="02070309020205020404" pitchFamily="49" charset="0"/>
             </a:rPr>
-            <a:t>Исходный </a:t>
+            <a:t>Исходный код</a:t>
           </a:r>
-          <a:r>
-            <a:rPr lang="ru-RU" sz="1200" dirty="0" smtClean="0">
-              <a:latin typeface="Courier New" panose="02070309020205020404" pitchFamily="49" charset="0"/>
-              <a:cs typeface="Courier New" panose="02070309020205020404" pitchFamily="49" charset="0"/>
-            </a:rPr>
-            <a:t>код</a:t>
-          </a:r>
-          <a:endParaRPr lang="ru-RU" sz="1200" dirty="0" smtClean="0">
-            <a:latin typeface="Courier New" panose="02070309020205020404" pitchFamily="49" charset="0"/>
-            <a:cs typeface="Courier New" panose="02070309020205020404" pitchFamily="49" charset="0"/>
-          </a:endParaRPr>
         </a:p>
         <a:p>
           <a:pPr algn="l"/>
@@ -2407,14 +2370,7 @@
               <a:latin typeface="Courier New" panose="02070309020205020404" pitchFamily="49" charset="0"/>
               <a:cs typeface="Courier New" panose="02070309020205020404" pitchFamily="49" charset="0"/>
             </a:rPr>
-            <a:t>Машинный </a:t>
-          </a:r>
-          <a:r>
-            <a:rPr lang="ru-RU" sz="1100" dirty="0" smtClean="0">
-              <a:latin typeface="Courier New" panose="02070309020205020404" pitchFamily="49" charset="0"/>
-              <a:cs typeface="Courier New" panose="02070309020205020404" pitchFamily="49" charset="0"/>
-            </a:rPr>
-            <a:t>код</a:t>
+            <a:t>Машинный код</a:t>
           </a:r>
           <a:endParaRPr lang="ru-RU" sz="1100" dirty="0" smtClean="0">
             <a:solidFill>
@@ -2717,19 +2673,8 @@
               <a:latin typeface="Courier New" panose="02070309020205020404" pitchFamily="49" charset="0"/>
               <a:cs typeface="Courier New" panose="02070309020205020404" pitchFamily="49" charset="0"/>
             </a:rPr>
-            <a:t>Исходный </a:t>
+            <a:t>Исходный код</a:t>
           </a:r>
-          <a:r>
-            <a:rPr lang="ru-RU" sz="1100" kern="1200" dirty="0" smtClean="0">
-              <a:latin typeface="Courier New" panose="02070309020205020404" pitchFamily="49" charset="0"/>
-              <a:cs typeface="Courier New" panose="02070309020205020404" pitchFamily="49" charset="0"/>
-            </a:rPr>
-            <a:t>код</a:t>
-          </a:r>
-          <a:endParaRPr lang="ru-RU" sz="1100" kern="1200" dirty="0" smtClean="0">
-            <a:latin typeface="Courier New" panose="02070309020205020404" pitchFamily="49" charset="0"/>
-            <a:cs typeface="Courier New" panose="02070309020205020404" pitchFamily="49" charset="0"/>
-          </a:endParaRPr>
         </a:p>
         <a:p>
           <a:pPr lvl="0" algn="l" defTabSz="488950">
@@ -3253,19 +3198,8 @@
               <a:latin typeface="Courier New" panose="02070309020205020404" pitchFamily="49" charset="0"/>
               <a:cs typeface="Courier New" panose="02070309020205020404" pitchFamily="49" charset="0"/>
             </a:rPr>
-            <a:t>Исходный </a:t>
+            <a:t>Исходный код</a:t>
           </a:r>
-          <a:r>
-            <a:rPr lang="ru-RU" sz="1200" kern="1200" dirty="0" smtClean="0">
-              <a:latin typeface="Courier New" panose="02070309020205020404" pitchFamily="49" charset="0"/>
-              <a:cs typeface="Courier New" panose="02070309020205020404" pitchFamily="49" charset="0"/>
-            </a:rPr>
-            <a:t>код</a:t>
-          </a:r>
-          <a:endParaRPr lang="ru-RU" sz="1200" kern="1200" dirty="0" smtClean="0">
-            <a:latin typeface="Courier New" panose="02070309020205020404" pitchFamily="49" charset="0"/>
-            <a:cs typeface="Courier New" panose="02070309020205020404" pitchFamily="49" charset="0"/>
-          </a:endParaRPr>
         </a:p>
         <a:p>
           <a:pPr lvl="0" algn="l" defTabSz="533400">
@@ -3749,14 +3683,7 @@
               <a:latin typeface="Courier New" panose="02070309020205020404" pitchFamily="49" charset="0"/>
               <a:cs typeface="Courier New" panose="02070309020205020404" pitchFamily="49" charset="0"/>
             </a:rPr>
-            <a:t>Машинный </a:t>
-          </a:r>
-          <a:r>
-            <a:rPr lang="ru-RU" sz="1100" kern="1200" dirty="0" smtClean="0">
-              <a:latin typeface="Courier New" panose="02070309020205020404" pitchFamily="49" charset="0"/>
-              <a:cs typeface="Courier New" panose="02070309020205020404" pitchFamily="49" charset="0"/>
-            </a:rPr>
-            <a:t>код</a:t>
+            <a:t>Машинный код</a:t>
           </a:r>
           <a:endParaRPr lang="ru-RU" sz="1100" kern="1200" dirty="0" smtClean="0">
             <a:solidFill>
@@ -6424,7 +6351,7 @@
           <a:p>
             <a:fld id="{866795EF-B5F3-41B8-8955-C946C1B25F38}" type="datetimeFigureOut">
               <a:rPr lang="en-US" smtClean="0"/>
-              <a:t>6/17/2020</a:t>
+              <a:t>6/18/2020</a:t>
             </a:fld>
             <a:endParaRPr lang="en-US" dirty="0"/>
           </a:p>
@@ -6823,7 +6750,7 @@
           <a:p>
             <a:fld id="{8A5229FB-8832-4A27-994F-F3EDC38C3527}" type="datetimeFigureOut">
               <a:rPr lang="en-US" smtClean="0"/>
-              <a:t>6/17/2020</a:t>
+              <a:t>6/18/2020</a:t>
             </a:fld>
             <a:endParaRPr lang="en-US" dirty="0"/>
           </a:p>
@@ -6993,7 +6920,7 @@
           <a:p>
             <a:fld id="{8A5229FB-8832-4A27-994F-F3EDC38C3527}" type="datetimeFigureOut">
               <a:rPr lang="en-US" smtClean="0"/>
-              <a:t>6/17/2020</a:t>
+              <a:t>6/18/2020</a:t>
             </a:fld>
             <a:endParaRPr lang="en-US" dirty="0"/>
           </a:p>
@@ -7173,7 +7100,7 @@
           <a:p>
             <a:fld id="{8A5229FB-8832-4A27-994F-F3EDC38C3527}" type="datetimeFigureOut">
               <a:rPr lang="en-US" smtClean="0"/>
-              <a:t>6/17/2020</a:t>
+              <a:t>6/18/2020</a:t>
             </a:fld>
             <a:endParaRPr lang="en-US" dirty="0"/>
           </a:p>
@@ -7343,7 +7270,7 @@
           <a:p>
             <a:fld id="{8A5229FB-8832-4A27-994F-F3EDC38C3527}" type="datetimeFigureOut">
               <a:rPr lang="en-US" smtClean="0"/>
-              <a:t>6/17/2020</a:t>
+              <a:t>6/18/2020</a:t>
             </a:fld>
             <a:endParaRPr lang="en-US" dirty="0"/>
           </a:p>
@@ -7589,7 +7516,7 @@
           <a:p>
             <a:fld id="{8A5229FB-8832-4A27-994F-F3EDC38C3527}" type="datetimeFigureOut">
               <a:rPr lang="en-US" smtClean="0"/>
-              <a:t>6/17/2020</a:t>
+              <a:t>6/18/2020</a:t>
             </a:fld>
             <a:endParaRPr lang="en-US" dirty="0"/>
           </a:p>
@@ -7821,7 +7748,7 @@
           <a:p>
             <a:fld id="{8A5229FB-8832-4A27-994F-F3EDC38C3527}" type="datetimeFigureOut">
               <a:rPr lang="en-US" smtClean="0"/>
-              <a:t>6/17/2020</a:t>
+              <a:t>6/18/2020</a:t>
             </a:fld>
             <a:endParaRPr lang="en-US" dirty="0"/>
           </a:p>
@@ -8188,7 +8115,7 @@
           <a:p>
             <a:fld id="{8A5229FB-8832-4A27-994F-F3EDC38C3527}" type="datetimeFigureOut">
               <a:rPr lang="en-US" smtClean="0"/>
-              <a:t>6/17/2020</a:t>
+              <a:t>6/18/2020</a:t>
             </a:fld>
             <a:endParaRPr lang="en-US" dirty="0"/>
           </a:p>
@@ -8306,7 +8233,7 @@
           <a:p>
             <a:fld id="{8A5229FB-8832-4A27-994F-F3EDC38C3527}" type="datetimeFigureOut">
               <a:rPr lang="en-US" smtClean="0"/>
-              <a:t>6/17/2020</a:t>
+              <a:t>6/18/2020</a:t>
             </a:fld>
             <a:endParaRPr lang="en-US" dirty="0"/>
           </a:p>
@@ -8401,7 +8328,7 @@
           <a:p>
             <a:fld id="{8A5229FB-8832-4A27-994F-F3EDC38C3527}" type="datetimeFigureOut">
               <a:rPr lang="en-US" smtClean="0"/>
-              <a:t>6/17/2020</a:t>
+              <a:t>6/18/2020</a:t>
             </a:fld>
             <a:endParaRPr lang="en-US" dirty="0"/>
           </a:p>
@@ -8678,7 +8605,7 @@
           <a:p>
             <a:fld id="{8A5229FB-8832-4A27-994F-F3EDC38C3527}" type="datetimeFigureOut">
               <a:rPr lang="en-US" smtClean="0"/>
-              <a:t>6/17/2020</a:t>
+              <a:t>6/18/2020</a:t>
             </a:fld>
             <a:endParaRPr lang="en-US" dirty="0"/>
           </a:p>
@@ -8931,7 +8858,7 @@
           <a:p>
             <a:fld id="{8A5229FB-8832-4A27-994F-F3EDC38C3527}" type="datetimeFigureOut">
               <a:rPr lang="en-US" smtClean="0"/>
-              <a:t>6/17/2020</a:t>
+              <a:t>6/18/2020</a:t>
             </a:fld>
             <a:endParaRPr lang="en-US" dirty="0"/>
           </a:p>
@@ -9144,7 +9071,7 @@
           <a:p>
             <a:fld id="{8A5229FB-8832-4A27-994F-F3EDC38C3527}" type="datetimeFigureOut">
               <a:rPr lang="en-US" smtClean="0"/>
-              <a:t>6/17/2020</a:t>
+              <a:t>6/18/2020</a:t>
             </a:fld>
             <a:endParaRPr lang="en-US" dirty="0"/>
           </a:p>
@@ -10255,14 +10182,7 @@
                 <a:latin typeface="Courier New" panose="02070309020205020404" pitchFamily="49" charset="0"/>
                 <a:cs typeface="Courier New" panose="02070309020205020404" pitchFamily="49" charset="0"/>
               </a:rPr>
-              <a:t>Ссылка </a:t>
-            </a:r>
-            <a:r>
-              <a:rPr lang="ru-RU" sz="2000" b="1" dirty="0" smtClean="0">
-                <a:latin typeface="Courier New" panose="02070309020205020404" pitchFamily="49" charset="0"/>
-                <a:cs typeface="Courier New" panose="02070309020205020404" pitchFamily="49" charset="0"/>
-              </a:rPr>
-              <a:t>на демонстративную версию </a:t>
+              <a:t>Ссылка на демонстративную версию </a:t>
             </a:r>
             <a:r>
               <a:rPr lang="en-US" sz="2000" b="1" dirty="0" smtClean="0">
@@ -10863,95 +10783,6 @@
 </p:sld>
 </file>
 
-<file path=ppt/slides/slide14.xml><?xml version="1.0" encoding="utf-8"?>
-<p:sld xmlns:a="http://schemas.openxmlformats.org/drawingml/2006/main" xmlns:r="http://schemas.openxmlformats.org/officeDocument/2006/relationships" xmlns:p="http://schemas.openxmlformats.org/presentationml/2006/main">
-  <p:cSld>
-    <p:bg>
-      <p:bgPr>
-        <a:pattFill prst="pct10">
-          <a:fgClr>
-            <a:schemeClr val="accent1">
-              <a:lumMod val="60000"/>
-              <a:lumOff val="40000"/>
-            </a:schemeClr>
-          </a:fgClr>
-          <a:bgClr>
-            <a:schemeClr val="bg1"/>
-          </a:bgClr>
-        </a:pattFill>
-        <a:effectLst/>
-      </p:bgPr>
-    </p:bg>
-    <p:spTree>
-      <p:nvGrpSpPr>
-        <p:cNvPr id="1" name=""/>
-        <p:cNvGrpSpPr/>
-        <p:nvPr/>
-      </p:nvGrpSpPr>
-      <p:grpSpPr>
-        <a:xfrm>
-          <a:off x="0" y="0"/>
-          <a:ext cx="0" cy="0"/>
-          <a:chOff x="0" y="0"/>
-          <a:chExt cx="0" cy="0"/>
-        </a:xfrm>
-      </p:grpSpPr>
-      <p:sp>
-        <p:nvSpPr>
-          <p:cNvPr id="3" name="TextBox 2"/>
-          <p:cNvSpPr txBox="1"/>
-          <p:nvPr/>
-        </p:nvSpPr>
-        <p:spPr>
-          <a:xfrm>
-            <a:off x="1121790" y="2686639"/>
-            <a:ext cx="10388338" cy="1107996"/>
-          </a:xfrm>
-          <a:prstGeom prst="rect">
-            <a:avLst/>
-          </a:prstGeom>
-          <a:noFill/>
-        </p:spPr>
-        <p:txBody>
-          <a:bodyPr wrap="square" rtlCol="0">
-            <a:spAutoFit/>
-          </a:bodyPr>
-          <a:lstStyle/>
-          <a:p>
-            <a:r>
-              <a:rPr lang="ru-RU" sz="6600" b="1" dirty="0" smtClean="0">
-                <a:latin typeface="Courier New" panose="02070309020205020404" pitchFamily="49" charset="0"/>
-                <a:cs typeface="Courier New" panose="02070309020205020404" pitchFamily="49" charset="0"/>
-              </a:rPr>
-              <a:t>Спасибо за внимание!</a:t>
-            </a:r>
-            <a:endParaRPr lang="en-US" sz="6600" b="1" dirty="0">
-              <a:latin typeface="Courier New" panose="02070309020205020404" pitchFamily="49" charset="0"/>
-              <a:cs typeface="Courier New" panose="02070309020205020404" pitchFamily="49" charset="0"/>
-            </a:endParaRPr>
-          </a:p>
-        </p:txBody>
-      </p:sp>
-    </p:spTree>
-    <p:extLst>
-      <p:ext uri="{BB962C8B-B14F-4D97-AF65-F5344CB8AC3E}">
-        <p14:creationId xmlns:p14="http://schemas.microsoft.com/office/powerpoint/2010/main" val="541023994"/>
-      </p:ext>
-    </p:extLst>
-  </p:cSld>
-  <p:clrMapOvr>
-    <a:masterClrMapping/>
-  </p:clrMapOvr>
-  <p:timing>
-    <p:tnLst>
-      <p:par>
-        <p:cTn id="1" dur="indefinite" restart="never" nodeType="tmRoot"/>
-      </p:par>
-    </p:tnLst>
-  </p:timing>
-</p:sld>
-</file>
-
 <file path=ppt/slides/slide2.xml><?xml version="1.0" encoding="utf-8"?>
 <p:sld xmlns:a="http://schemas.openxmlformats.org/drawingml/2006/main" xmlns:r="http://schemas.openxmlformats.org/officeDocument/2006/relationships" xmlns:p="http://schemas.openxmlformats.org/presentationml/2006/main">
   <p:cSld>
@@ -11189,8 +11020,8 @@
         </p:nvSpPr>
         <p:spPr>
           <a:xfrm>
-            <a:off x="734785" y="1133767"/>
-            <a:ext cx="10758876" cy="5539978"/>
+            <a:off x="734785" y="994244"/>
+            <a:ext cx="10758876" cy="5416868"/>
           </a:xfrm>
           <a:prstGeom prst="rect">
             <a:avLst/>
@@ -11327,8 +11158,19 @@
                 <a:latin typeface="Courier New" panose="02070309020205020404" pitchFamily="49" charset="0"/>
                 <a:cs typeface="Courier New" panose="02070309020205020404" pitchFamily="49" charset="0"/>
               </a:rPr>
-              <a:t>Поставленные задачи:</a:t>
-            </a:r>
+              <a:t>Поставленные задачи</a:t>
+            </a:r>
+            <a:r>
+              <a:rPr lang="ru-RU" sz="2400" b="1" dirty="0" smtClean="0">
+                <a:latin typeface="Courier New" panose="02070309020205020404" pitchFamily="49" charset="0"/>
+                <a:cs typeface="Courier New" panose="02070309020205020404" pitchFamily="49" charset="0"/>
+              </a:rPr>
+              <a:t>:</a:t>
+            </a:r>
+            <a:endParaRPr lang="en-US" sz="2400" b="1" dirty="0" smtClean="0">
+              <a:latin typeface="Courier New" panose="02070309020205020404" pitchFamily="49" charset="0"/>
+              <a:cs typeface="Courier New" panose="02070309020205020404" pitchFamily="49" charset="0"/>
+            </a:endParaRPr>
           </a:p>
           <a:p>
             <a:pPr marL="342900" indent="-342900">
@@ -11336,28 +11178,52 @@
               <a:buChar char="•"/>
             </a:pPr>
             <a:r>
-              <a:rPr lang="ru-RU" sz="2400" dirty="0" smtClean="0">
+              <a:rPr lang="ru-RU" sz="2000" dirty="0" smtClean="0">
+                <a:latin typeface="Courier New" panose="02070309020205020404" pitchFamily="49" charset="0"/>
+                <a:cs typeface="Courier New" panose="02070309020205020404" pitchFamily="49" charset="0"/>
+              </a:rPr>
+              <a:t>Исследовать </a:t>
+            </a:r>
+            <a:r>
+              <a:rPr lang="ru-RU" sz="2000" dirty="0">
+                <a:latin typeface="Courier New" panose="02070309020205020404" pitchFamily="49" charset="0"/>
+                <a:cs typeface="Courier New" panose="02070309020205020404" pitchFamily="49" charset="0"/>
+              </a:rPr>
+              <a:t>основные принципы функционирования систем веб-шаблонов</a:t>
+            </a:r>
+            <a:endParaRPr lang="ru-RU" sz="2000" dirty="0">
+              <a:latin typeface="Courier New" panose="02070309020205020404" pitchFamily="49" charset="0"/>
+              <a:cs typeface="Courier New" panose="02070309020205020404" pitchFamily="49" charset="0"/>
+            </a:endParaRPr>
+          </a:p>
+          <a:p>
+            <a:pPr marL="342900" indent="-342900">
+              <a:buFont typeface="Arial" panose="020B0604020202020204" pitchFamily="34" charset="0"/>
+              <a:buChar char="•"/>
+            </a:pPr>
+            <a:r>
+              <a:rPr lang="ru-RU" sz="2000" dirty="0" smtClean="0">
                 <a:latin typeface="Courier New" panose="02070309020205020404" pitchFamily="49" charset="0"/>
                 <a:cs typeface="Courier New" panose="02070309020205020404" pitchFamily="49" charset="0"/>
               </a:rPr>
               <a:t>Проанализировать </a:t>
             </a:r>
             <a:r>
-              <a:rPr lang="ru-RU" sz="2400" dirty="0">
+              <a:rPr lang="ru-RU" sz="2000" dirty="0">
                 <a:latin typeface="Courier New" panose="02070309020205020404" pitchFamily="49" charset="0"/>
                 <a:cs typeface="Courier New" panose="02070309020205020404" pitchFamily="49" charset="0"/>
               </a:rPr>
               <a:t>существующие </a:t>
             </a:r>
             <a:r>
-              <a:rPr lang="ru-RU" sz="2400" dirty="0" smtClean="0">
+              <a:rPr lang="ru-RU" sz="2000" dirty="0" smtClean="0">
                 <a:latin typeface="Courier New" panose="02070309020205020404" pitchFamily="49" charset="0"/>
                 <a:cs typeface="Courier New" panose="02070309020205020404" pitchFamily="49" charset="0"/>
               </a:rPr>
               <a:t>решения для выявления </a:t>
             </a:r>
             <a:r>
-              <a:rPr lang="ru-RU" sz="2400" dirty="0">
+              <a:rPr lang="ru-RU" sz="2000" dirty="0">
                 <a:latin typeface="Courier New" panose="02070309020205020404" pitchFamily="49" charset="0"/>
                 <a:cs typeface="Courier New" panose="02070309020205020404" pitchFamily="49" charset="0"/>
               </a:rPr>
@@ -11370,21 +11236,21 @@
               <a:buChar char="•"/>
             </a:pPr>
             <a:r>
-              <a:rPr lang="ru-RU" sz="2400" dirty="0">
+              <a:rPr lang="ru-RU" sz="2000" dirty="0">
                 <a:latin typeface="Courier New" panose="02070309020205020404" pitchFamily="49" charset="0"/>
                 <a:cs typeface="Courier New" panose="02070309020205020404" pitchFamily="49" charset="0"/>
               </a:rPr>
               <a:t>Исследовать причины возникновения </a:t>
             </a:r>
             <a:r>
-              <a:rPr lang="ru-RU" sz="2400" dirty="0" smtClean="0">
+              <a:rPr lang="ru-RU" sz="2000" dirty="0" smtClean="0">
                 <a:latin typeface="Courier New" panose="02070309020205020404" pitchFamily="49" charset="0"/>
                 <a:cs typeface="Courier New" panose="02070309020205020404" pitchFamily="49" charset="0"/>
               </a:rPr>
               <a:t>проблем </a:t>
             </a:r>
             <a:r>
-              <a:rPr lang="ru-RU" sz="2400" dirty="0">
+              <a:rPr lang="ru-RU" sz="2000" dirty="0">
                 <a:latin typeface="Courier New" panose="02070309020205020404" pitchFamily="49" charset="0"/>
                 <a:cs typeface="Courier New" panose="02070309020205020404" pitchFamily="49" charset="0"/>
               </a:rPr>
@@ -11397,7 +11263,7 @@
               <a:buChar char="•"/>
             </a:pPr>
             <a:r>
-              <a:rPr lang="ru-RU" sz="2400" dirty="0">
+              <a:rPr lang="ru-RU" sz="2000" dirty="0">
                 <a:latin typeface="Courier New" panose="02070309020205020404" pitchFamily="49" charset="0"/>
                 <a:cs typeface="Courier New" panose="02070309020205020404" pitchFamily="49" charset="0"/>
               </a:rPr>
@@ -11410,19 +11276,16 @@
               <a:buChar char="•"/>
             </a:pPr>
             <a:r>
-              <a:rPr lang="ru-RU" sz="2400" dirty="0">
+              <a:rPr lang="ru-RU" sz="2000" dirty="0">
                 <a:latin typeface="Courier New" panose="02070309020205020404" pitchFamily="49" charset="0"/>
                 <a:cs typeface="Courier New" panose="02070309020205020404" pitchFamily="49" charset="0"/>
               </a:rPr>
-              <a:t>Применить разработанные </a:t>
-            </a:r>
-            <a:r>
-              <a:rPr lang="ru-RU" sz="2400" dirty="0" smtClean="0">
-                <a:latin typeface="Courier New" panose="02070309020205020404" pitchFamily="49" charset="0"/>
-                <a:cs typeface="Courier New" panose="02070309020205020404" pitchFamily="49" charset="0"/>
-              </a:rPr>
-              <a:t>найденные методы при разработке. </a:t>
-            </a:r>
+              <a:t>Применить разработанные методы на практике, разработав высокопроизводительную систему веб-шаблонов. </a:t>
+            </a:r>
+            <a:endParaRPr lang="ru-RU" sz="2000" dirty="0" smtClean="0">
+              <a:latin typeface="Courier New" panose="02070309020205020404" pitchFamily="49" charset="0"/>
+              <a:cs typeface="Courier New" panose="02070309020205020404" pitchFamily="49" charset="0"/>
+            </a:endParaRPr>
           </a:p>
           <a:p>
             <a:endParaRPr lang="ru-RU" sz="2200" dirty="0">
@@ -11581,14 +11444,7 @@
                 <a:latin typeface="Courier New" panose="02070309020205020404" pitchFamily="49" charset="0"/>
                 <a:cs typeface="Courier New" panose="02070309020205020404" pitchFamily="49" charset="0"/>
               </a:rPr>
-              <a:t> Наличие </a:t>
-            </a:r>
-            <a:r>
-              <a:rPr lang="ru-RU" sz="2800" dirty="0" smtClean="0">
-                <a:latin typeface="Courier New" panose="02070309020205020404" pitchFamily="49" charset="0"/>
-                <a:cs typeface="Courier New" panose="02070309020205020404" pitchFamily="49" charset="0"/>
-              </a:rPr>
-              <a:t>механизмов </a:t>
+              <a:t> Наличие механизмов </a:t>
             </a:r>
             <a:r>
               <a:rPr lang="ru-RU" sz="2800" b="1" dirty="0" smtClean="0">
@@ -11634,14 +11490,7 @@
                 <a:latin typeface="Courier New" panose="02070309020205020404" pitchFamily="49" charset="0"/>
                 <a:cs typeface="Courier New" panose="02070309020205020404" pitchFamily="49" charset="0"/>
               </a:rPr>
-              <a:t> Простой </a:t>
-            </a:r>
-            <a:r>
-              <a:rPr lang="ru-RU" sz="2800" dirty="0" smtClean="0">
-                <a:latin typeface="Courier New" panose="02070309020205020404" pitchFamily="49" charset="0"/>
-                <a:cs typeface="Courier New" panose="02070309020205020404" pitchFamily="49" charset="0"/>
-              </a:rPr>
-              <a:t>вычислительных ресурсов:</a:t>
+              <a:t> Простой вычислительных ресурсов:</a:t>
             </a:r>
           </a:p>
           <a:p>
@@ -11709,134 +11558,7 @@
   <p:timing>
     <p:tnLst>
       <p:par>
-        <p:cTn id="1" dur="indefinite" restart="never" nodeType="tmRoot">
-          <p:childTnLst>
-            <p:seq concurrent="1" nextAc="seek">
-              <p:cTn id="2" dur="indefinite" nodeType="mainSeq">
-                <p:childTnLst>
-                  <p:par>
-                    <p:cTn id="3" fill="hold">
-                      <p:stCondLst>
-                        <p:cond delay="indefinite"/>
-                      </p:stCondLst>
-                      <p:childTnLst>
-                        <p:par>
-                          <p:cTn id="4" fill="hold">
-                            <p:stCondLst>
-                              <p:cond delay="0"/>
-                            </p:stCondLst>
-                            <p:childTnLst>
-                              <p:par>
-                                <p:cTn id="5" presetID="26" presetClass="emph" presetSubtype="0" fill="hold" nodeType="clickEffect">
-                                  <p:stCondLst>
-                                    <p:cond delay="0"/>
-                                  </p:stCondLst>
-                                  <p:childTnLst>
-                                    <p:animEffect transition="out" filter="fade">
-                                      <p:cBhvr>
-                                        <p:cTn id="6" dur="1000" tmFilter="0, 0; .2, .5; .8, .5; 1, 0"/>
-                                        <p:tgtEl>
-                                          <p:spTgt spid="9">
-                                            <p:txEl>
-                                              <p:pRg st="0" end="0"/>
-                                            </p:txEl>
-                                          </p:spTgt>
-                                        </p:tgtEl>
-                                      </p:cBhvr>
-                                    </p:animEffect>
-                                    <p:animScale>
-                                      <p:cBhvr>
-                                        <p:cTn id="7" dur="500" autoRev="1" fill="hold"/>
-                                        <p:tgtEl>
-                                          <p:spTgt spid="9">
-                                            <p:txEl>
-                                              <p:pRg st="0" end="0"/>
-                                            </p:txEl>
-                                          </p:spTgt>
-                                        </p:tgtEl>
-                                      </p:cBhvr>
-                                      <p:by x="105000" y="105000"/>
-                                    </p:animScale>
-                                  </p:childTnLst>
-                                </p:cTn>
-                              </p:par>
-                            </p:childTnLst>
-                          </p:cTn>
-                        </p:par>
-                      </p:childTnLst>
-                    </p:cTn>
-                  </p:par>
-                  <p:par>
-                    <p:cTn id="8" fill="hold">
-                      <p:stCondLst>
-                        <p:cond delay="indefinite"/>
-                      </p:stCondLst>
-                      <p:childTnLst>
-                        <p:par>
-                          <p:cTn id="9" fill="hold">
-                            <p:stCondLst>
-                              <p:cond delay="0"/>
-                            </p:stCondLst>
-                            <p:childTnLst>
-                              <p:par>
-                                <p:cTn id="10" presetID="26" presetClass="emph" presetSubtype="0" fill="hold" nodeType="clickEffect">
-                                  <p:stCondLst>
-                                    <p:cond delay="0"/>
-                                  </p:stCondLst>
-                                  <p:childTnLst>
-                                    <p:animEffect transition="out" filter="fade">
-                                      <p:cBhvr>
-                                        <p:cTn id="11" dur="1000" tmFilter="0, 0; .2, .5; .8, .5; 1, 0"/>
-                                        <p:tgtEl>
-                                          <p:spTgt spid="9">
-                                            <p:txEl>
-                                              <p:pRg st="3" end="3"/>
-                                            </p:txEl>
-                                          </p:spTgt>
-                                        </p:tgtEl>
-                                      </p:cBhvr>
-                                    </p:animEffect>
-                                    <p:animScale>
-                                      <p:cBhvr>
-                                        <p:cTn id="12" dur="500" autoRev="1" fill="hold"/>
-                                        <p:tgtEl>
-                                          <p:spTgt spid="9">
-                                            <p:txEl>
-                                              <p:pRg st="3" end="3"/>
-                                            </p:txEl>
-                                          </p:spTgt>
-                                        </p:tgtEl>
-                                      </p:cBhvr>
-                                      <p:by x="105000" y="105000"/>
-                                    </p:animScale>
-                                  </p:childTnLst>
-                                </p:cTn>
-                              </p:par>
-                            </p:childTnLst>
-                          </p:cTn>
-                        </p:par>
-                      </p:childTnLst>
-                    </p:cTn>
-                  </p:par>
-                </p:childTnLst>
-              </p:cTn>
-              <p:prevCondLst>
-                <p:cond evt="onPrev" delay="0">
-                  <p:tgtEl>
-                    <p:sldTgt/>
-                  </p:tgtEl>
-                </p:cond>
-              </p:prevCondLst>
-              <p:nextCondLst>
-                <p:cond evt="onNext" delay="0">
-                  <p:tgtEl>
-                    <p:sldTgt/>
-                  </p:tgtEl>
-                </p:cond>
-              </p:nextCondLst>
-            </p:seq>
-          </p:childTnLst>
-        </p:cTn>
+        <p:cTn id="1" dur="indefinite" restart="never" nodeType="tmRoot"/>
       </p:par>
     </p:tnLst>
   </p:timing>
@@ -12332,7 +12054,14 @@
                 <a:latin typeface="Courier New" panose="02070309020205020404" pitchFamily="49" charset="0"/>
                 <a:cs typeface="Courier New" panose="02070309020205020404" pitchFamily="49" charset="0"/>
               </a:rPr>
-              <a:t>Использование парадигмы </a:t>
+              <a:t>Использование </a:t>
+            </a:r>
+            <a:r>
+              <a:rPr lang="ru-RU" sz="2400" dirty="0" smtClean="0">
+                <a:latin typeface="Courier New" panose="02070309020205020404" pitchFamily="49" charset="0"/>
+                <a:cs typeface="Courier New" panose="02070309020205020404" pitchFamily="49" charset="0"/>
+              </a:rPr>
+              <a:t>идиомы </a:t>
             </a:r>
             <a:r>
               <a:rPr lang="en-US" sz="2400" b="1" dirty="0" smtClean="0">
@@ -12378,6 +12107,24 @@
               </a:rPr>
               <a:t>LRU</a:t>
             </a:r>
+            <a:r>
+              <a:rPr lang="ru-RU" sz="2400" b="1" dirty="0" smtClean="0">
+                <a:latin typeface="Courier New" panose="02070309020205020404" pitchFamily="49" charset="0"/>
+                <a:cs typeface="Courier New" panose="02070309020205020404" pitchFamily="49" charset="0"/>
+              </a:rPr>
+              <a:t> или </a:t>
+            </a:r>
+            <a:r>
+              <a:rPr lang="en-US" sz="2400" b="1" dirty="0" smtClean="0">
+                <a:latin typeface="Courier New" panose="02070309020205020404" pitchFamily="49" charset="0"/>
+                <a:cs typeface="Courier New" panose="02070309020205020404" pitchFamily="49" charset="0"/>
+              </a:rPr>
+              <a:t>LFU</a:t>
+            </a:r>
+            <a:endParaRPr lang="en-US" sz="2400" b="1" dirty="0" smtClean="0">
+              <a:latin typeface="Courier New" panose="02070309020205020404" pitchFamily="49" charset="0"/>
+              <a:cs typeface="Courier New" panose="02070309020205020404" pitchFamily="49" charset="0"/>
+            </a:endParaRPr>
           </a:p>
           <a:p>
             <a:pPr marL="457200" indent="-457200">
@@ -12482,6 +12229,13 @@
   <p:clrMapOvr>
     <a:masterClrMapping/>
   </p:clrMapOvr>
+  <p:timing>
+    <p:tnLst>
+      <p:par>
+        <p:cTn id="1" dur="indefinite" restart="never" nodeType="tmRoot"/>
+      </p:par>
+    </p:tnLst>
+  </p:timing>
 </p:sld>
 </file>
 
@@ -13579,8 +13333,8 @@
         </p:nvSpPr>
         <p:spPr>
           <a:xfrm>
-            <a:off x="1248872" y="209084"/>
-            <a:ext cx="8386741" cy="646331"/>
+            <a:off x="752258" y="224849"/>
+            <a:ext cx="10488556" cy="646331"/>
           </a:xfrm>
           <a:prstGeom prst="rect">
             <a:avLst/>
@@ -13594,11 +13348,11 @@
           <a:lstStyle/>
           <a:p>
             <a:r>
-              <a:rPr lang="ru-RU" sz="3600" b="1" dirty="0" smtClean="0">
+              <a:rPr lang="ru-RU" sz="3600" b="1" dirty="0">
                 <a:latin typeface="Courier New" panose="02070309020205020404" pitchFamily="49" charset="0"/>
                 <a:cs typeface="Courier New" panose="02070309020205020404" pitchFamily="49" charset="0"/>
               </a:rPr>
-              <a:t>Модель работы веб-сервиса</a:t>
+              <a:t>Схема IDEF0 модели работы веб-сервиса</a:t>
             </a:r>
             <a:endParaRPr lang="en-US" sz="3600" b="1" dirty="0">
               <a:latin typeface="Courier New" panose="02070309020205020404" pitchFamily="49" charset="0"/>
@@ -13652,6 +13406,13 @@
   <p:clrMapOvr>
     <a:masterClrMapping/>
   </p:clrMapOvr>
+  <p:timing>
+    <p:tnLst>
+      <p:par>
+        <p:cTn id="1" dur="indefinite" restart="never" nodeType="tmRoot"/>
+      </p:par>
+    </p:tnLst>
+  </p:timing>
 </p:sld>
 </file>
 

</xml_diff>

<commit_message>
Updated all materials a bit, according to new rules
</commit_message>
<xml_diff>
--- a/docs/Презентация ВКР.pptx
+++ b/docs/Презентация ВКР.pptx
@@ -129,7 +129,7 @@
 
 <file path=ppt/commentAuthors.xml><?xml version="1.0" encoding="utf-8"?>
 <p:cmAuthorLst xmlns:a="http://schemas.openxmlformats.org/drawingml/2006/main" xmlns:r="http://schemas.openxmlformats.org/officeDocument/2006/relationships" xmlns:p="http://schemas.openxmlformats.org/presentationml/2006/main">
-  <p:cmAuthor id="1" name="bobur" initials="b" lastIdx="3" clrIdx="0">
+  <p:cmAuthor id="1" name="bobur" initials="b" lastIdx="4" clrIdx="0">
     <p:extLst>
       <p:ext uri="{19B8F6BF-5375-455C-9EA6-DF929625EA0E}">
         <p15:presenceInfo xmlns:p15="http://schemas.microsoft.com/office/powerpoint/2012/main" userId="bobur" providerId="None"/>
@@ -2106,7 +2106,7 @@
   <dgm:whole/>
   <dgm:extLst>
     <a:ext uri="http://schemas.microsoft.com/office/drawing/2008/diagram">
-      <dsp:dataModelExt xmlns:dsp="http://schemas.microsoft.com/office/drawing/2008/diagram" relId="rId6" minVer="http://schemas.openxmlformats.org/drawingml/2006/diagram"/>
+      <dsp:dataModelExt xmlns:dsp="http://schemas.microsoft.com/office/drawing/2008/diagram" relId="rId7" minVer="http://schemas.openxmlformats.org/drawingml/2006/diagram"/>
     </a:ext>
   </dgm:extLst>
 </dgm:dataModel>
@@ -2585,7 +2585,7 @@
   <dgm:whole/>
   <dgm:extLst>
     <a:ext uri="http://schemas.microsoft.com/office/drawing/2008/diagram">
-      <dsp:dataModelExt xmlns:dsp="http://schemas.microsoft.com/office/drawing/2008/diagram" relId="rId11" minVer="http://schemas.openxmlformats.org/drawingml/2006/diagram"/>
+      <dsp:dataModelExt xmlns:dsp="http://schemas.microsoft.com/office/drawing/2008/diagram" relId="rId12" minVer="http://schemas.openxmlformats.org/drawingml/2006/diagram"/>
     </a:ext>
   </dgm:extLst>
 </dgm:dataModel>
@@ -6351,7 +6351,7 @@
           <a:p>
             <a:fld id="{866795EF-B5F3-41B8-8955-C946C1B25F38}" type="datetimeFigureOut">
               <a:rPr lang="en-US" smtClean="0"/>
-              <a:t>6/18/2020</a:t>
+              <a:t>6/19/2020</a:t>
             </a:fld>
             <a:endParaRPr lang="en-US" dirty="0"/>
           </a:p>
@@ -6619,6 +6619,3264 @@
 </p:notesMaster>
 </file>
 
+<file path=ppt/notesSlides/notesSlide1.xml><?xml version="1.0" encoding="utf-8"?>
+<p:notes xmlns:a="http://schemas.openxmlformats.org/drawingml/2006/main" xmlns:r="http://schemas.openxmlformats.org/officeDocument/2006/relationships" xmlns:p="http://schemas.openxmlformats.org/presentationml/2006/main">
+  <p:cSld>
+    <p:spTree>
+      <p:nvGrpSpPr>
+        <p:cNvPr id="1" name=""/>
+        <p:cNvGrpSpPr/>
+        <p:nvPr/>
+      </p:nvGrpSpPr>
+      <p:grpSpPr>
+        <a:xfrm>
+          <a:off x="0" y="0"/>
+          <a:ext cx="0" cy="0"/>
+          <a:chOff x="0" y="0"/>
+          <a:chExt cx="0" cy="0"/>
+        </a:xfrm>
+      </p:grpSpPr>
+      <p:sp>
+        <p:nvSpPr>
+          <p:cNvPr id="2" name="Образ слайда 1"/>
+          <p:cNvSpPr>
+            <a:spLocks noGrp="1" noRot="1" noChangeAspect="1"/>
+          </p:cNvSpPr>
+          <p:nvPr>
+            <p:ph type="sldImg"/>
+          </p:nvPr>
+        </p:nvSpPr>
+        <p:spPr/>
+      </p:sp>
+      <p:sp>
+        <p:nvSpPr>
+          <p:cNvPr id="3" name="Заметки 2"/>
+          <p:cNvSpPr>
+            <a:spLocks noGrp="1"/>
+          </p:cNvSpPr>
+          <p:nvPr>
+            <p:ph type="body" idx="1"/>
+          </p:nvPr>
+        </p:nvSpPr>
+        <p:spPr/>
+        <p:txBody>
+          <a:bodyPr/>
+          <a:lstStyle/>
+          <a:p>
+            <a:pPr marL="0" marR="0" indent="0" algn="l" defTabSz="914400" rtl="0" eaLnBrk="1" fontAlgn="auto" latinLnBrk="0" hangingPunct="1">
+              <a:lnSpc>
+                <a:spcPct val="100000"/>
+              </a:lnSpc>
+              <a:spcBef>
+                <a:spcPts val="0"/>
+              </a:spcBef>
+              <a:spcAft>
+                <a:spcPts val="0"/>
+              </a:spcAft>
+              <a:buClrTx/>
+              <a:buSzTx/>
+              <a:buFontTx/>
+              <a:buNone/>
+              <a:tabLst/>
+              <a:defRPr/>
+            </a:pPr>
+            <a:r>
+              <a:rPr lang="ru-RU" sz="1200" kern="1200" dirty="0" smtClean="0">
+                <a:solidFill>
+                  <a:schemeClr val="tx1"/>
+                </a:solidFill>
+                <a:effectLst/>
+                <a:latin typeface="+mn-lt"/>
+                <a:ea typeface="+mn-ea"/>
+                <a:cs typeface="+mn-cs"/>
+              </a:rPr>
+              <a:t>Здравствуйте уважаемые члены государственной аттестационной комиссии, меня зовут Махмудов </a:t>
+            </a:r>
+            <a:r>
+              <a:rPr lang="ru-RU" sz="1200" kern="1200" dirty="0" err="1" smtClean="0">
+                <a:solidFill>
+                  <a:schemeClr val="tx1"/>
+                </a:solidFill>
+                <a:effectLst/>
+                <a:latin typeface="+mn-lt"/>
+                <a:ea typeface="+mn-ea"/>
+                <a:cs typeface="+mn-cs"/>
+              </a:rPr>
+              <a:t>Бабур</a:t>
+            </a:r>
+            <a:r>
+              <a:rPr lang="ru-RU" sz="1200" kern="1200" dirty="0" smtClean="0">
+                <a:solidFill>
+                  <a:schemeClr val="tx1"/>
+                </a:solidFill>
+                <a:effectLst/>
+                <a:latin typeface="+mn-lt"/>
+                <a:ea typeface="+mn-ea"/>
+                <a:cs typeface="+mn-cs"/>
+              </a:rPr>
+              <a:t>. Тема моей выпускной квалификационной работы – «исследование методов повышения производительности систем веб-шаблонов и разработка системы шаблонизации на их основе».</a:t>
+            </a:r>
+            <a:endParaRPr lang="en-US" sz="1200" kern="1200" dirty="0" smtClean="0">
+              <a:solidFill>
+                <a:schemeClr val="tx1"/>
+              </a:solidFill>
+              <a:effectLst/>
+              <a:latin typeface="+mn-lt"/>
+              <a:ea typeface="+mn-ea"/>
+              <a:cs typeface="+mn-cs"/>
+            </a:endParaRPr>
+          </a:p>
+          <a:p>
+            <a:endParaRPr lang="en-US" dirty="0"/>
+          </a:p>
+        </p:txBody>
+      </p:sp>
+      <p:sp>
+        <p:nvSpPr>
+          <p:cNvPr id="4" name="Номер слайда 3"/>
+          <p:cNvSpPr>
+            <a:spLocks noGrp="1"/>
+          </p:cNvSpPr>
+          <p:nvPr>
+            <p:ph type="sldNum" sz="quarter" idx="10"/>
+          </p:nvPr>
+        </p:nvSpPr>
+        <p:spPr/>
+        <p:txBody>
+          <a:bodyPr/>
+          <a:lstStyle/>
+          <a:p>
+            <a:fld id="{608A3F3F-0F8E-4901-95F3-ECC8D9533356}" type="slidenum">
+              <a:rPr lang="en-US" smtClean="0"/>
+              <a:t>1</a:t>
+            </a:fld>
+            <a:endParaRPr lang="en-US" dirty="0"/>
+          </a:p>
+        </p:txBody>
+      </p:sp>
+    </p:spTree>
+    <p:extLst>
+      <p:ext uri="{BB962C8B-B14F-4D97-AF65-F5344CB8AC3E}">
+        <p14:creationId xmlns:p14="http://schemas.microsoft.com/office/powerpoint/2010/main" val="3111962899"/>
+      </p:ext>
+    </p:extLst>
+  </p:cSld>
+  <p:clrMapOvr>
+    <a:masterClrMapping/>
+  </p:clrMapOvr>
+</p:notes>
+</file>
+
+<file path=ppt/notesSlides/notesSlide10.xml><?xml version="1.0" encoding="utf-8"?>
+<p:notes xmlns:a="http://schemas.openxmlformats.org/drawingml/2006/main" xmlns:r="http://schemas.openxmlformats.org/officeDocument/2006/relationships" xmlns:p="http://schemas.openxmlformats.org/presentationml/2006/main">
+  <p:cSld>
+    <p:spTree>
+      <p:nvGrpSpPr>
+        <p:cNvPr id="1" name=""/>
+        <p:cNvGrpSpPr/>
+        <p:nvPr/>
+      </p:nvGrpSpPr>
+      <p:grpSpPr>
+        <a:xfrm>
+          <a:off x="0" y="0"/>
+          <a:ext cx="0" cy="0"/>
+          <a:chOff x="0" y="0"/>
+          <a:chExt cx="0" cy="0"/>
+        </a:xfrm>
+      </p:grpSpPr>
+      <p:sp>
+        <p:nvSpPr>
+          <p:cNvPr id="2" name="Образ слайда 1"/>
+          <p:cNvSpPr>
+            <a:spLocks noGrp="1" noRot="1" noChangeAspect="1"/>
+          </p:cNvSpPr>
+          <p:nvPr>
+            <p:ph type="sldImg"/>
+          </p:nvPr>
+        </p:nvSpPr>
+        <p:spPr/>
+      </p:sp>
+      <p:sp>
+        <p:nvSpPr>
+          <p:cNvPr id="3" name="Заметки 2"/>
+          <p:cNvSpPr>
+            <a:spLocks noGrp="1"/>
+          </p:cNvSpPr>
+          <p:nvPr>
+            <p:ph type="body" idx="1"/>
+          </p:nvPr>
+        </p:nvSpPr>
+        <p:spPr/>
+        <p:txBody>
+          <a:bodyPr/>
+          <a:lstStyle/>
+          <a:p>
+            <a:pPr marL="0" marR="0" indent="0" algn="l" defTabSz="914400" rtl="0" eaLnBrk="1" fontAlgn="auto" latinLnBrk="0" hangingPunct="1">
+              <a:lnSpc>
+                <a:spcPct val="100000"/>
+              </a:lnSpc>
+              <a:spcBef>
+                <a:spcPts val="0"/>
+              </a:spcBef>
+              <a:spcAft>
+                <a:spcPts val="0"/>
+              </a:spcAft>
+              <a:buClrTx/>
+              <a:buSzTx/>
+              <a:buFontTx/>
+              <a:buNone/>
+              <a:tabLst/>
+              <a:defRPr/>
+            </a:pPr>
+            <a:r>
+              <a:rPr lang="ru-RU" sz="1200" kern="1200" dirty="0" smtClean="0">
+                <a:solidFill>
+                  <a:schemeClr val="tx1"/>
+                </a:solidFill>
+                <a:effectLst/>
+                <a:latin typeface="+mn-lt"/>
+                <a:ea typeface="+mn-ea"/>
+                <a:cs typeface="+mn-cs"/>
+              </a:rPr>
+              <a:t>На данном слайде приведён пример пользовательского веб-интерфейса разработанного сервиса. А также по указанной ссылке можно ознакомиться с демонстративной версией разработанной системы.</a:t>
+            </a:r>
+            <a:endParaRPr lang="en-US" sz="1200" kern="1200" dirty="0" smtClean="0">
+              <a:solidFill>
+                <a:schemeClr val="tx1"/>
+              </a:solidFill>
+              <a:effectLst/>
+              <a:latin typeface="+mn-lt"/>
+              <a:ea typeface="+mn-ea"/>
+              <a:cs typeface="+mn-cs"/>
+            </a:endParaRPr>
+          </a:p>
+          <a:p>
+            <a:endParaRPr lang="en-US" dirty="0"/>
+          </a:p>
+        </p:txBody>
+      </p:sp>
+      <p:sp>
+        <p:nvSpPr>
+          <p:cNvPr id="4" name="Номер слайда 3"/>
+          <p:cNvSpPr>
+            <a:spLocks noGrp="1"/>
+          </p:cNvSpPr>
+          <p:nvPr>
+            <p:ph type="sldNum" sz="quarter" idx="10"/>
+          </p:nvPr>
+        </p:nvSpPr>
+        <p:spPr/>
+        <p:txBody>
+          <a:bodyPr/>
+          <a:lstStyle/>
+          <a:p>
+            <a:fld id="{608A3F3F-0F8E-4901-95F3-ECC8D9533356}" type="slidenum">
+              <a:rPr lang="en-US" smtClean="0"/>
+              <a:t>10</a:t>
+            </a:fld>
+            <a:endParaRPr lang="en-US" dirty="0"/>
+          </a:p>
+        </p:txBody>
+      </p:sp>
+    </p:spTree>
+    <p:extLst>
+      <p:ext uri="{BB962C8B-B14F-4D97-AF65-F5344CB8AC3E}">
+        <p14:creationId xmlns:p14="http://schemas.microsoft.com/office/powerpoint/2010/main" val="731371623"/>
+      </p:ext>
+    </p:extLst>
+  </p:cSld>
+  <p:clrMapOvr>
+    <a:masterClrMapping/>
+  </p:clrMapOvr>
+</p:notes>
+</file>
+
+<file path=ppt/notesSlides/notesSlide11.xml><?xml version="1.0" encoding="utf-8"?>
+<p:notes xmlns:a="http://schemas.openxmlformats.org/drawingml/2006/main" xmlns:r="http://schemas.openxmlformats.org/officeDocument/2006/relationships" xmlns:p="http://schemas.openxmlformats.org/presentationml/2006/main">
+  <p:cSld>
+    <p:spTree>
+      <p:nvGrpSpPr>
+        <p:cNvPr id="1" name=""/>
+        <p:cNvGrpSpPr/>
+        <p:nvPr/>
+      </p:nvGrpSpPr>
+      <p:grpSpPr>
+        <a:xfrm>
+          <a:off x="0" y="0"/>
+          <a:ext cx="0" cy="0"/>
+          <a:chOff x="0" y="0"/>
+          <a:chExt cx="0" cy="0"/>
+        </a:xfrm>
+      </p:grpSpPr>
+      <p:sp>
+        <p:nvSpPr>
+          <p:cNvPr id="2" name="Образ слайда 1"/>
+          <p:cNvSpPr>
+            <a:spLocks noGrp="1" noRot="1" noChangeAspect="1"/>
+          </p:cNvSpPr>
+          <p:nvPr>
+            <p:ph type="sldImg"/>
+          </p:nvPr>
+        </p:nvSpPr>
+        <p:spPr/>
+      </p:sp>
+      <p:sp>
+        <p:nvSpPr>
+          <p:cNvPr id="3" name="Заметки 2"/>
+          <p:cNvSpPr>
+            <a:spLocks noGrp="1"/>
+          </p:cNvSpPr>
+          <p:nvPr>
+            <p:ph type="body" idx="1"/>
+          </p:nvPr>
+        </p:nvSpPr>
+        <p:spPr/>
+        <p:txBody>
+          <a:bodyPr/>
+          <a:lstStyle/>
+          <a:p>
+            <a:r>
+              <a:rPr lang="ru-RU" sz="1200" kern="1200" dirty="0" smtClean="0">
+                <a:solidFill>
+                  <a:schemeClr val="tx1"/>
+                </a:solidFill>
+                <a:effectLst/>
+                <a:latin typeface="+mn-lt"/>
+                <a:ea typeface="+mn-ea"/>
+                <a:cs typeface="+mn-cs"/>
+              </a:rPr>
+              <a:t>По завершению разработки были проведены тесты для оценки производительности.</a:t>
+            </a:r>
+            <a:endParaRPr lang="en-US" sz="1200" kern="1200" dirty="0" smtClean="0">
+              <a:solidFill>
+                <a:schemeClr val="tx1"/>
+              </a:solidFill>
+              <a:effectLst/>
+              <a:latin typeface="+mn-lt"/>
+              <a:ea typeface="+mn-ea"/>
+              <a:cs typeface="+mn-cs"/>
+            </a:endParaRPr>
+          </a:p>
+          <a:p>
+            <a:r>
+              <a:rPr lang="ru-RU" sz="1200" kern="1200" dirty="0" smtClean="0">
+                <a:solidFill>
+                  <a:schemeClr val="tx1"/>
+                </a:solidFill>
+                <a:effectLst/>
+                <a:latin typeface="+mn-lt"/>
+                <a:ea typeface="+mn-ea"/>
+                <a:cs typeface="+mn-cs"/>
+              </a:rPr>
+              <a:t>Тестирование велось на виртуальном сервере от </a:t>
+            </a:r>
+            <a:r>
+              <a:rPr lang="en-US" sz="1200" kern="1200" dirty="0" smtClean="0">
+                <a:solidFill>
+                  <a:schemeClr val="tx1"/>
+                </a:solidFill>
+                <a:effectLst/>
+                <a:latin typeface="+mn-lt"/>
+                <a:ea typeface="+mn-ea"/>
+                <a:cs typeface="+mn-cs"/>
+              </a:rPr>
+              <a:t>Google</a:t>
+            </a:r>
+            <a:r>
+              <a:rPr lang="ru-RU" sz="1200" kern="1200" dirty="0" smtClean="0">
+                <a:solidFill>
+                  <a:schemeClr val="tx1"/>
+                </a:solidFill>
+                <a:effectLst/>
+                <a:latin typeface="+mn-lt"/>
+                <a:ea typeface="+mn-ea"/>
+                <a:cs typeface="+mn-cs"/>
+              </a:rPr>
+              <a:t> в Стокгольме в то время как клиентские запросы исходили из штата Вирджиния, на слайде приведены характеристики этого сервера.</a:t>
+            </a:r>
+            <a:endParaRPr lang="en-US" sz="1200" kern="1200" dirty="0" smtClean="0">
+              <a:solidFill>
+                <a:schemeClr val="tx1"/>
+              </a:solidFill>
+              <a:effectLst/>
+              <a:latin typeface="+mn-lt"/>
+              <a:ea typeface="+mn-ea"/>
+              <a:cs typeface="+mn-cs"/>
+            </a:endParaRPr>
+          </a:p>
+          <a:p>
+            <a:r>
+              <a:rPr lang="ru-RU" sz="1200" kern="1200" dirty="0" smtClean="0">
+                <a:solidFill>
+                  <a:schemeClr val="tx1"/>
+                </a:solidFill>
+                <a:effectLst/>
+                <a:latin typeface="+mn-lt"/>
+                <a:ea typeface="+mn-ea"/>
+                <a:cs typeface="+mn-cs"/>
+              </a:rPr>
+              <a:t>На диаграмме показано соотношение одновременных подключений в определённые</a:t>
+            </a:r>
+            <a:r>
+              <a:rPr lang="ru-RU" sz="1200" kern="1200" baseline="0" dirty="0" smtClean="0">
+                <a:solidFill>
+                  <a:schemeClr val="tx1"/>
+                </a:solidFill>
+                <a:effectLst/>
+                <a:latin typeface="+mn-lt"/>
+                <a:ea typeface="+mn-ea"/>
+                <a:cs typeface="+mn-cs"/>
+              </a:rPr>
+              <a:t> </a:t>
+            </a:r>
+            <a:r>
+              <a:rPr lang="ru-RU" sz="1200" kern="1200" dirty="0" smtClean="0">
+                <a:solidFill>
+                  <a:schemeClr val="tx1"/>
+                </a:solidFill>
+                <a:effectLst/>
+                <a:latin typeface="+mn-lt"/>
+                <a:ea typeface="+mn-ea"/>
+                <a:cs typeface="+mn-cs"/>
+              </a:rPr>
+              <a:t>интервалы времени и среднее</a:t>
+            </a:r>
+            <a:r>
+              <a:rPr lang="ru-RU" sz="1200" kern="1200" baseline="0" dirty="0" smtClean="0">
+                <a:solidFill>
+                  <a:schemeClr val="tx1"/>
+                </a:solidFill>
+                <a:effectLst/>
+                <a:latin typeface="+mn-lt"/>
+                <a:ea typeface="+mn-ea"/>
+                <a:cs typeface="+mn-cs"/>
+              </a:rPr>
+              <a:t> </a:t>
+            </a:r>
+            <a:r>
+              <a:rPr lang="ru-RU" sz="1200" kern="1200" dirty="0" smtClean="0">
+                <a:solidFill>
+                  <a:schemeClr val="tx1"/>
+                </a:solidFill>
+                <a:effectLst/>
+                <a:latin typeface="+mn-lt"/>
+                <a:ea typeface="+mn-ea"/>
+                <a:cs typeface="+mn-cs"/>
+              </a:rPr>
+              <a:t>время ответа веб-сервиса. А именно по диаграмме видно, что на 550 одновременных подключений среднее время ответа системы составляет чуть более 4-х секунд. </a:t>
+            </a:r>
+            <a:endParaRPr lang="en-US" sz="1200" kern="1200" dirty="0" smtClean="0">
+              <a:solidFill>
+                <a:schemeClr val="tx1"/>
+              </a:solidFill>
+              <a:effectLst/>
+              <a:latin typeface="+mn-lt"/>
+              <a:ea typeface="+mn-ea"/>
+              <a:cs typeface="+mn-cs"/>
+            </a:endParaRPr>
+          </a:p>
+          <a:p>
+            <a:endParaRPr lang="en-US" dirty="0"/>
+          </a:p>
+        </p:txBody>
+      </p:sp>
+      <p:sp>
+        <p:nvSpPr>
+          <p:cNvPr id="4" name="Номер слайда 3"/>
+          <p:cNvSpPr>
+            <a:spLocks noGrp="1"/>
+          </p:cNvSpPr>
+          <p:nvPr>
+            <p:ph type="sldNum" sz="quarter" idx="10"/>
+          </p:nvPr>
+        </p:nvSpPr>
+        <p:spPr/>
+        <p:txBody>
+          <a:bodyPr/>
+          <a:lstStyle/>
+          <a:p>
+            <a:fld id="{608A3F3F-0F8E-4901-95F3-ECC8D9533356}" type="slidenum">
+              <a:rPr lang="en-US" smtClean="0"/>
+              <a:t>11</a:t>
+            </a:fld>
+            <a:endParaRPr lang="en-US" dirty="0"/>
+          </a:p>
+        </p:txBody>
+      </p:sp>
+    </p:spTree>
+    <p:extLst>
+      <p:ext uri="{BB962C8B-B14F-4D97-AF65-F5344CB8AC3E}">
+        <p14:creationId xmlns:p14="http://schemas.microsoft.com/office/powerpoint/2010/main" val="8792718"/>
+      </p:ext>
+    </p:extLst>
+  </p:cSld>
+  <p:clrMapOvr>
+    <a:masterClrMapping/>
+  </p:clrMapOvr>
+</p:notes>
+</file>
+
+<file path=ppt/notesSlides/notesSlide12.xml><?xml version="1.0" encoding="utf-8"?>
+<p:notes xmlns:a="http://schemas.openxmlformats.org/drawingml/2006/main" xmlns:r="http://schemas.openxmlformats.org/officeDocument/2006/relationships" xmlns:p="http://schemas.openxmlformats.org/presentationml/2006/main">
+  <p:cSld>
+    <p:spTree>
+      <p:nvGrpSpPr>
+        <p:cNvPr id="1" name=""/>
+        <p:cNvGrpSpPr/>
+        <p:nvPr/>
+      </p:nvGrpSpPr>
+      <p:grpSpPr>
+        <a:xfrm>
+          <a:off x="0" y="0"/>
+          <a:ext cx="0" cy="0"/>
+          <a:chOff x="0" y="0"/>
+          <a:chExt cx="0" cy="0"/>
+        </a:xfrm>
+      </p:grpSpPr>
+      <p:sp>
+        <p:nvSpPr>
+          <p:cNvPr id="2" name="Образ слайда 1"/>
+          <p:cNvSpPr>
+            <a:spLocks noGrp="1" noRot="1" noChangeAspect="1"/>
+          </p:cNvSpPr>
+          <p:nvPr>
+            <p:ph type="sldImg"/>
+          </p:nvPr>
+        </p:nvSpPr>
+        <p:spPr/>
+      </p:sp>
+      <p:sp>
+        <p:nvSpPr>
+          <p:cNvPr id="3" name="Заметки 2"/>
+          <p:cNvSpPr>
+            <a:spLocks noGrp="1"/>
+          </p:cNvSpPr>
+          <p:nvPr>
+            <p:ph type="body" idx="1"/>
+          </p:nvPr>
+        </p:nvSpPr>
+        <p:spPr/>
+        <p:txBody>
+          <a:bodyPr/>
+          <a:lstStyle/>
+          <a:p>
+            <a:pPr marL="0" marR="0" indent="0" algn="l" defTabSz="914400" rtl="0" eaLnBrk="1" fontAlgn="auto" latinLnBrk="0" hangingPunct="1">
+              <a:lnSpc>
+                <a:spcPct val="100000"/>
+              </a:lnSpc>
+              <a:spcBef>
+                <a:spcPts val="0"/>
+              </a:spcBef>
+              <a:spcAft>
+                <a:spcPts val="0"/>
+              </a:spcAft>
+              <a:buClrTx/>
+              <a:buSzTx/>
+              <a:buFontTx/>
+              <a:buNone/>
+              <a:tabLst/>
+              <a:defRPr/>
+            </a:pPr>
+            <a:r>
+              <a:rPr lang="ru-RU" sz="1200" kern="1200" dirty="0" smtClean="0">
+                <a:solidFill>
+                  <a:schemeClr val="tx1"/>
+                </a:solidFill>
+                <a:effectLst/>
+                <a:latin typeface="+mn-lt"/>
+                <a:ea typeface="+mn-ea"/>
+                <a:cs typeface="+mn-cs"/>
+              </a:rPr>
+              <a:t>Нагрузка, которая фиксировалась на сервере во время проведения теста показана на слайде №12. По нему видно, что оба ядра процессора нагружены только на 50%, т.е., не смотря на большое количество одновременных запросов, </a:t>
+            </a:r>
+            <a:r>
+              <a:rPr lang="ru-RU" sz="1200" kern="1200" dirty="0" smtClean="0">
+                <a:solidFill>
+                  <a:schemeClr val="tx1"/>
+                </a:solidFill>
+                <a:effectLst/>
+                <a:latin typeface="+mn-lt"/>
+                <a:ea typeface="+mn-ea"/>
+                <a:cs typeface="+mn-cs"/>
+              </a:rPr>
+              <a:t>такая рода </a:t>
+            </a:r>
+            <a:r>
+              <a:rPr lang="ru-RU" sz="1200" kern="1200" dirty="0" smtClean="0">
+                <a:solidFill>
+                  <a:schemeClr val="tx1"/>
+                </a:solidFill>
+                <a:effectLst/>
+                <a:latin typeface="+mn-lt"/>
+                <a:ea typeface="+mn-ea"/>
+                <a:cs typeface="+mn-cs"/>
+              </a:rPr>
+              <a:t>нагрузка находится в допустимых пределах для разработанной системы веб-шаблонов</a:t>
+            </a:r>
+            <a:r>
+              <a:rPr lang="ru-RU" sz="1200" kern="1200" dirty="0" smtClean="0">
+                <a:solidFill>
+                  <a:schemeClr val="tx1"/>
+                </a:solidFill>
+                <a:effectLst/>
+                <a:latin typeface="+mn-lt"/>
+                <a:ea typeface="+mn-ea"/>
+                <a:cs typeface="+mn-cs"/>
+              </a:rPr>
+              <a:t>.</a:t>
+            </a:r>
+            <a:endParaRPr lang="en-US" sz="1200" kern="1200" dirty="0" smtClean="0">
+              <a:solidFill>
+                <a:schemeClr val="tx1"/>
+              </a:solidFill>
+              <a:effectLst/>
+              <a:latin typeface="+mn-lt"/>
+              <a:ea typeface="+mn-ea"/>
+              <a:cs typeface="+mn-cs"/>
+            </a:endParaRPr>
+          </a:p>
+          <a:p>
+            <a:endParaRPr lang="en-US" dirty="0"/>
+          </a:p>
+        </p:txBody>
+      </p:sp>
+      <p:sp>
+        <p:nvSpPr>
+          <p:cNvPr id="4" name="Номер слайда 3"/>
+          <p:cNvSpPr>
+            <a:spLocks noGrp="1"/>
+          </p:cNvSpPr>
+          <p:nvPr>
+            <p:ph type="sldNum" sz="quarter" idx="10"/>
+          </p:nvPr>
+        </p:nvSpPr>
+        <p:spPr/>
+        <p:txBody>
+          <a:bodyPr/>
+          <a:lstStyle/>
+          <a:p>
+            <a:fld id="{608A3F3F-0F8E-4901-95F3-ECC8D9533356}" type="slidenum">
+              <a:rPr lang="en-US" smtClean="0"/>
+              <a:t>12</a:t>
+            </a:fld>
+            <a:endParaRPr lang="en-US" dirty="0"/>
+          </a:p>
+        </p:txBody>
+      </p:sp>
+    </p:spTree>
+    <p:extLst>
+      <p:ext uri="{BB962C8B-B14F-4D97-AF65-F5344CB8AC3E}">
+        <p14:creationId xmlns:p14="http://schemas.microsoft.com/office/powerpoint/2010/main" val="101314672"/>
+      </p:ext>
+    </p:extLst>
+  </p:cSld>
+  <p:clrMapOvr>
+    <a:masterClrMapping/>
+  </p:clrMapOvr>
+</p:notes>
+</file>
+
+<file path=ppt/notesSlides/notesSlide13.xml><?xml version="1.0" encoding="utf-8"?>
+<p:notes xmlns:a="http://schemas.openxmlformats.org/drawingml/2006/main" xmlns:r="http://schemas.openxmlformats.org/officeDocument/2006/relationships" xmlns:p="http://schemas.openxmlformats.org/presentationml/2006/main">
+  <p:cSld>
+    <p:spTree>
+      <p:nvGrpSpPr>
+        <p:cNvPr id="1" name=""/>
+        <p:cNvGrpSpPr/>
+        <p:nvPr/>
+      </p:nvGrpSpPr>
+      <p:grpSpPr>
+        <a:xfrm>
+          <a:off x="0" y="0"/>
+          <a:ext cx="0" cy="0"/>
+          <a:chOff x="0" y="0"/>
+          <a:chExt cx="0" cy="0"/>
+        </a:xfrm>
+      </p:grpSpPr>
+      <p:sp>
+        <p:nvSpPr>
+          <p:cNvPr id="2" name="Образ слайда 1"/>
+          <p:cNvSpPr>
+            <a:spLocks noGrp="1" noRot="1" noChangeAspect="1"/>
+          </p:cNvSpPr>
+          <p:nvPr>
+            <p:ph type="sldImg"/>
+          </p:nvPr>
+        </p:nvSpPr>
+        <p:spPr/>
+      </p:sp>
+      <p:sp>
+        <p:nvSpPr>
+          <p:cNvPr id="3" name="Заметки 2"/>
+          <p:cNvSpPr>
+            <a:spLocks noGrp="1"/>
+          </p:cNvSpPr>
+          <p:nvPr>
+            <p:ph type="body" idx="1"/>
+          </p:nvPr>
+        </p:nvSpPr>
+        <p:spPr/>
+        <p:txBody>
+          <a:bodyPr/>
+          <a:lstStyle/>
+          <a:p>
+            <a:pPr marL="0" marR="0" indent="0" algn="l" defTabSz="914400" rtl="0" eaLnBrk="1" fontAlgn="auto" latinLnBrk="0" hangingPunct="1">
+              <a:lnSpc>
+                <a:spcPct val="100000"/>
+              </a:lnSpc>
+              <a:spcBef>
+                <a:spcPts val="0"/>
+              </a:spcBef>
+              <a:spcAft>
+                <a:spcPts val="0"/>
+              </a:spcAft>
+              <a:buClrTx/>
+              <a:buSzTx/>
+              <a:buFontTx/>
+              <a:buNone/>
+              <a:tabLst/>
+              <a:defRPr/>
+            </a:pPr>
+            <a:r>
+              <a:rPr lang="ru-RU" sz="1200" kern="1200" dirty="0" smtClean="0">
+                <a:solidFill>
+                  <a:schemeClr val="tx1"/>
+                </a:solidFill>
+                <a:effectLst/>
+                <a:latin typeface="+mn-lt"/>
+                <a:ea typeface="+mn-ea"/>
+                <a:cs typeface="+mn-cs"/>
+              </a:rPr>
+              <a:t>В заключении можно сказать что все поставленные цели были достигнуты: были проанализированы проблемы низкой производительности веб-шаблонов, предложены способы устранения данных проблем, после чего разработана высокопроизводительная и удобная в использовании система веб-шаблонов. </a:t>
+            </a:r>
+            <a:r>
+              <a:rPr lang="ru-RU" sz="1200" kern="1200" dirty="0" smtClean="0">
+                <a:solidFill>
+                  <a:schemeClr val="tx1"/>
+                </a:solidFill>
+                <a:effectLst/>
+                <a:latin typeface="+mn-lt"/>
+                <a:ea typeface="+mn-ea"/>
+                <a:cs typeface="+mn-cs"/>
+              </a:rPr>
+              <a:t> </a:t>
+            </a:r>
+          </a:p>
+          <a:p>
+            <a:pPr marL="0" marR="0" indent="0" algn="l" defTabSz="914400" rtl="0" eaLnBrk="1" fontAlgn="auto" latinLnBrk="0" hangingPunct="1">
+              <a:lnSpc>
+                <a:spcPct val="100000"/>
+              </a:lnSpc>
+              <a:spcBef>
+                <a:spcPts val="0"/>
+              </a:spcBef>
+              <a:spcAft>
+                <a:spcPts val="0"/>
+              </a:spcAft>
+              <a:buClrTx/>
+              <a:buSzTx/>
+              <a:buFontTx/>
+              <a:buNone/>
+              <a:tabLst/>
+              <a:defRPr/>
+            </a:pPr>
+            <a:r>
+              <a:rPr lang="ru-RU" sz="1200" kern="1200" dirty="0" smtClean="0">
+                <a:solidFill>
+                  <a:schemeClr val="tx1"/>
+                </a:solidFill>
+                <a:effectLst/>
+                <a:latin typeface="+mn-lt"/>
+                <a:ea typeface="+mn-ea"/>
+                <a:cs typeface="+mn-cs"/>
+              </a:rPr>
+              <a:t>На</a:t>
+            </a:r>
+            <a:r>
+              <a:rPr lang="ru-RU" sz="1200" kern="1200" baseline="0" dirty="0" smtClean="0">
+                <a:solidFill>
+                  <a:schemeClr val="tx1"/>
+                </a:solidFill>
+                <a:effectLst/>
+                <a:latin typeface="+mn-lt"/>
+                <a:ea typeface="+mn-ea"/>
+                <a:cs typeface="+mn-cs"/>
+              </a:rPr>
+              <a:t> этом всё, спасибо за внимание, буду рад ответить на Ваши вопросы.</a:t>
+            </a:r>
+            <a:endParaRPr lang="en-US" sz="1200" kern="1200" dirty="0" smtClean="0">
+              <a:solidFill>
+                <a:schemeClr val="tx1"/>
+              </a:solidFill>
+              <a:effectLst/>
+              <a:latin typeface="+mn-lt"/>
+              <a:ea typeface="+mn-ea"/>
+              <a:cs typeface="+mn-cs"/>
+            </a:endParaRPr>
+          </a:p>
+          <a:p>
+            <a:endParaRPr lang="en-US" dirty="0"/>
+          </a:p>
+        </p:txBody>
+      </p:sp>
+      <p:sp>
+        <p:nvSpPr>
+          <p:cNvPr id="4" name="Номер слайда 3"/>
+          <p:cNvSpPr>
+            <a:spLocks noGrp="1"/>
+          </p:cNvSpPr>
+          <p:nvPr>
+            <p:ph type="sldNum" sz="quarter" idx="10"/>
+          </p:nvPr>
+        </p:nvSpPr>
+        <p:spPr/>
+        <p:txBody>
+          <a:bodyPr/>
+          <a:lstStyle/>
+          <a:p>
+            <a:fld id="{608A3F3F-0F8E-4901-95F3-ECC8D9533356}" type="slidenum">
+              <a:rPr lang="en-US" smtClean="0"/>
+              <a:t>13</a:t>
+            </a:fld>
+            <a:endParaRPr lang="en-US" dirty="0"/>
+          </a:p>
+        </p:txBody>
+      </p:sp>
+    </p:spTree>
+    <p:extLst>
+      <p:ext uri="{BB962C8B-B14F-4D97-AF65-F5344CB8AC3E}">
+        <p14:creationId xmlns:p14="http://schemas.microsoft.com/office/powerpoint/2010/main" val="2020818994"/>
+      </p:ext>
+    </p:extLst>
+  </p:cSld>
+  <p:clrMapOvr>
+    <a:masterClrMapping/>
+  </p:clrMapOvr>
+</p:notes>
+</file>
+
+<file path=ppt/notesSlides/notesSlide2.xml><?xml version="1.0" encoding="utf-8"?>
+<p:notes xmlns:a="http://schemas.openxmlformats.org/drawingml/2006/main" xmlns:r="http://schemas.openxmlformats.org/officeDocument/2006/relationships" xmlns:p="http://schemas.openxmlformats.org/presentationml/2006/main">
+  <p:cSld>
+    <p:spTree>
+      <p:nvGrpSpPr>
+        <p:cNvPr id="1" name=""/>
+        <p:cNvGrpSpPr/>
+        <p:nvPr/>
+      </p:nvGrpSpPr>
+      <p:grpSpPr>
+        <a:xfrm>
+          <a:off x="0" y="0"/>
+          <a:ext cx="0" cy="0"/>
+          <a:chOff x="0" y="0"/>
+          <a:chExt cx="0" cy="0"/>
+        </a:xfrm>
+      </p:grpSpPr>
+      <p:sp>
+        <p:nvSpPr>
+          <p:cNvPr id="2" name="Образ слайда 1"/>
+          <p:cNvSpPr>
+            <a:spLocks noGrp="1" noRot="1" noChangeAspect="1"/>
+          </p:cNvSpPr>
+          <p:nvPr>
+            <p:ph type="sldImg"/>
+          </p:nvPr>
+        </p:nvSpPr>
+        <p:spPr/>
+      </p:sp>
+      <p:sp>
+        <p:nvSpPr>
+          <p:cNvPr id="3" name="Заметки 2"/>
+          <p:cNvSpPr>
+            <a:spLocks noGrp="1"/>
+          </p:cNvSpPr>
+          <p:nvPr>
+            <p:ph type="body" idx="1"/>
+          </p:nvPr>
+        </p:nvSpPr>
+        <p:spPr/>
+        <p:txBody>
+          <a:bodyPr/>
+          <a:lstStyle/>
+          <a:p>
+            <a:pPr marL="0" marR="0" indent="0" algn="l" defTabSz="914400" rtl="0" eaLnBrk="1" fontAlgn="auto" latinLnBrk="0" hangingPunct="1">
+              <a:lnSpc>
+                <a:spcPct val="100000"/>
+              </a:lnSpc>
+              <a:spcBef>
+                <a:spcPts val="0"/>
+              </a:spcBef>
+              <a:spcAft>
+                <a:spcPts val="0"/>
+              </a:spcAft>
+              <a:buClrTx/>
+              <a:buSzTx/>
+              <a:buFontTx/>
+              <a:buNone/>
+              <a:tabLst/>
+              <a:defRPr/>
+            </a:pPr>
+            <a:r>
+              <a:rPr lang="ru-RU" sz="1200" kern="1200" dirty="0" smtClean="0">
+                <a:solidFill>
+                  <a:schemeClr val="tx1"/>
+                </a:solidFill>
+                <a:effectLst/>
+                <a:latin typeface="+mn-lt"/>
+                <a:ea typeface="+mn-ea"/>
+                <a:cs typeface="+mn-cs"/>
+              </a:rPr>
+              <a:t>Актуальность данной работы заключается в том, что существующие решения не эффективны в плане потребления вычислительных ресурсов, также большинство из исследованных</a:t>
+            </a:r>
+            <a:r>
+              <a:rPr lang="ru-RU" sz="1200" kern="1200" baseline="0" dirty="0" smtClean="0">
+                <a:solidFill>
+                  <a:schemeClr val="tx1"/>
+                </a:solidFill>
+                <a:effectLst/>
+                <a:latin typeface="+mn-lt"/>
+                <a:ea typeface="+mn-ea"/>
+                <a:cs typeface="+mn-cs"/>
+              </a:rPr>
+              <a:t> мной продуктов</a:t>
+            </a:r>
+            <a:r>
+              <a:rPr lang="ru-RU" sz="1200" kern="1200" dirty="0" smtClean="0">
+                <a:solidFill>
+                  <a:schemeClr val="tx1"/>
+                </a:solidFill>
+                <a:effectLst/>
+                <a:latin typeface="+mn-lt"/>
+                <a:ea typeface="+mn-ea"/>
+                <a:cs typeface="+mn-cs"/>
+              </a:rPr>
+              <a:t> предназначены для использования в составе более крупных веб-фреймворков, </a:t>
+            </a:r>
+            <a:r>
+              <a:rPr lang="ru-RU" sz="1200" kern="1200" dirty="0" smtClean="0">
+                <a:solidFill>
+                  <a:schemeClr val="tx1"/>
+                </a:solidFill>
+                <a:effectLst/>
+                <a:latin typeface="+mn-lt"/>
+                <a:ea typeface="+mn-ea"/>
+                <a:cs typeface="+mn-cs"/>
+              </a:rPr>
+              <a:t>что</a:t>
+            </a:r>
+            <a:r>
+              <a:rPr lang="en-US" sz="1200" kern="1200" dirty="0" smtClean="0">
+                <a:solidFill>
+                  <a:schemeClr val="tx1"/>
+                </a:solidFill>
+                <a:effectLst/>
+                <a:latin typeface="+mn-lt"/>
+                <a:ea typeface="+mn-ea"/>
+                <a:cs typeface="+mn-cs"/>
+              </a:rPr>
+              <a:t> </a:t>
+            </a:r>
+            <a:r>
+              <a:rPr lang="ru-RU" sz="1200" kern="1200" dirty="0" smtClean="0">
+                <a:solidFill>
+                  <a:schemeClr val="tx1"/>
+                </a:solidFill>
+                <a:effectLst/>
+                <a:latin typeface="+mn-lt"/>
+                <a:ea typeface="+mn-ea"/>
+                <a:cs typeface="+mn-cs"/>
+              </a:rPr>
+              <a:t>в</a:t>
+            </a:r>
+            <a:r>
+              <a:rPr lang="ru-RU" sz="1200" kern="1200" baseline="0" dirty="0" smtClean="0">
+                <a:solidFill>
+                  <a:schemeClr val="tx1"/>
+                </a:solidFill>
+                <a:effectLst/>
+                <a:latin typeface="+mn-lt"/>
+                <a:ea typeface="+mn-ea"/>
+                <a:cs typeface="+mn-cs"/>
+              </a:rPr>
+              <a:t> свою </a:t>
+            </a:r>
+            <a:r>
+              <a:rPr lang="ru-RU" sz="1200" kern="1200" baseline="0" dirty="0" err="1" smtClean="0">
+                <a:solidFill>
+                  <a:schemeClr val="tx1"/>
+                </a:solidFill>
+                <a:effectLst/>
+                <a:latin typeface="+mn-lt"/>
+                <a:ea typeface="+mn-ea"/>
+                <a:cs typeface="+mn-cs"/>
+              </a:rPr>
+              <a:t>очердь</a:t>
+            </a:r>
+            <a:r>
+              <a:rPr lang="ru-RU" sz="1200" kern="1200" dirty="0" smtClean="0">
+                <a:solidFill>
+                  <a:schemeClr val="tx1"/>
+                </a:solidFill>
+                <a:effectLst/>
+                <a:latin typeface="+mn-lt"/>
+                <a:ea typeface="+mn-ea"/>
+                <a:cs typeface="+mn-cs"/>
+              </a:rPr>
+              <a:t> </a:t>
+            </a:r>
+            <a:r>
+              <a:rPr lang="ru-RU" sz="1200" kern="1200" dirty="0" smtClean="0">
+                <a:solidFill>
+                  <a:schemeClr val="tx1"/>
+                </a:solidFill>
+                <a:effectLst/>
+                <a:latin typeface="+mn-lt"/>
+                <a:ea typeface="+mn-ea"/>
+                <a:cs typeface="+mn-cs"/>
+              </a:rPr>
+              <a:t>понижает их показатель удобства в эксплуатации пользователями не технических</a:t>
+            </a:r>
+            <a:r>
+              <a:rPr lang="ru-RU" sz="1200" kern="1200" baseline="0" dirty="0" smtClean="0">
+                <a:solidFill>
+                  <a:schemeClr val="tx1"/>
+                </a:solidFill>
+                <a:effectLst/>
+                <a:latin typeface="+mn-lt"/>
+                <a:ea typeface="+mn-ea"/>
+                <a:cs typeface="+mn-cs"/>
+              </a:rPr>
+              <a:t> специальностей</a:t>
+            </a:r>
+            <a:r>
+              <a:rPr lang="ru-RU" sz="1200" kern="1200" dirty="0" smtClean="0">
+                <a:solidFill>
+                  <a:schemeClr val="tx1"/>
+                </a:solidFill>
+                <a:effectLst/>
+                <a:latin typeface="+mn-lt"/>
+                <a:ea typeface="+mn-ea"/>
+                <a:cs typeface="+mn-cs"/>
+              </a:rPr>
+              <a:t>.</a:t>
+            </a:r>
+            <a:endParaRPr lang="en-US" sz="1200" kern="1200" dirty="0" smtClean="0">
+              <a:solidFill>
+                <a:schemeClr val="tx1"/>
+              </a:solidFill>
+              <a:effectLst/>
+              <a:latin typeface="+mn-lt"/>
+              <a:ea typeface="+mn-ea"/>
+              <a:cs typeface="+mn-cs"/>
+            </a:endParaRPr>
+          </a:p>
+          <a:p>
+            <a:endParaRPr lang="en-US" dirty="0"/>
+          </a:p>
+        </p:txBody>
+      </p:sp>
+      <p:sp>
+        <p:nvSpPr>
+          <p:cNvPr id="4" name="Номер слайда 3"/>
+          <p:cNvSpPr>
+            <a:spLocks noGrp="1"/>
+          </p:cNvSpPr>
+          <p:nvPr>
+            <p:ph type="sldNum" sz="quarter" idx="10"/>
+          </p:nvPr>
+        </p:nvSpPr>
+        <p:spPr/>
+        <p:txBody>
+          <a:bodyPr/>
+          <a:lstStyle/>
+          <a:p>
+            <a:fld id="{608A3F3F-0F8E-4901-95F3-ECC8D9533356}" type="slidenum">
+              <a:rPr lang="en-US" smtClean="0"/>
+              <a:t>2</a:t>
+            </a:fld>
+            <a:endParaRPr lang="en-US" dirty="0"/>
+          </a:p>
+        </p:txBody>
+      </p:sp>
+    </p:spTree>
+    <p:extLst>
+      <p:ext uri="{BB962C8B-B14F-4D97-AF65-F5344CB8AC3E}">
+        <p14:creationId xmlns:p14="http://schemas.microsoft.com/office/powerpoint/2010/main" val="1869397095"/>
+      </p:ext>
+    </p:extLst>
+  </p:cSld>
+  <p:clrMapOvr>
+    <a:masterClrMapping/>
+  </p:clrMapOvr>
+</p:notes>
+</file>
+
+<file path=ppt/notesSlides/notesSlide3.xml><?xml version="1.0" encoding="utf-8"?>
+<p:notes xmlns:a="http://schemas.openxmlformats.org/drawingml/2006/main" xmlns:r="http://schemas.openxmlformats.org/officeDocument/2006/relationships" xmlns:p="http://schemas.openxmlformats.org/presentationml/2006/main">
+  <p:cSld>
+    <p:spTree>
+      <p:nvGrpSpPr>
+        <p:cNvPr id="1" name=""/>
+        <p:cNvGrpSpPr/>
+        <p:nvPr/>
+      </p:nvGrpSpPr>
+      <p:grpSpPr>
+        <a:xfrm>
+          <a:off x="0" y="0"/>
+          <a:ext cx="0" cy="0"/>
+          <a:chOff x="0" y="0"/>
+          <a:chExt cx="0" cy="0"/>
+        </a:xfrm>
+      </p:grpSpPr>
+      <p:sp>
+        <p:nvSpPr>
+          <p:cNvPr id="2" name="Образ слайда 1"/>
+          <p:cNvSpPr>
+            <a:spLocks noGrp="1" noRot="1" noChangeAspect="1"/>
+          </p:cNvSpPr>
+          <p:nvPr>
+            <p:ph type="sldImg"/>
+          </p:nvPr>
+        </p:nvSpPr>
+        <p:spPr/>
+      </p:sp>
+      <p:sp>
+        <p:nvSpPr>
+          <p:cNvPr id="3" name="Заметки 2"/>
+          <p:cNvSpPr>
+            <a:spLocks noGrp="1"/>
+          </p:cNvSpPr>
+          <p:nvPr>
+            <p:ph type="body" idx="1"/>
+          </p:nvPr>
+        </p:nvSpPr>
+        <p:spPr/>
+        <p:txBody>
+          <a:bodyPr/>
+          <a:lstStyle/>
+          <a:p>
+            <a:pPr marL="0" marR="0" indent="0" algn="l" defTabSz="914400" rtl="0" eaLnBrk="1" fontAlgn="auto" latinLnBrk="0" hangingPunct="1">
+              <a:lnSpc>
+                <a:spcPct val="100000"/>
+              </a:lnSpc>
+              <a:spcBef>
+                <a:spcPts val="0"/>
+              </a:spcBef>
+              <a:spcAft>
+                <a:spcPts val="0"/>
+              </a:spcAft>
+              <a:buClrTx/>
+              <a:buSzTx/>
+              <a:buFontTx/>
+              <a:buNone/>
+              <a:tabLst/>
+              <a:defRPr/>
+            </a:pPr>
+            <a:r>
+              <a:rPr lang="ru-RU" sz="1200" kern="1200" dirty="0" smtClean="0">
+                <a:solidFill>
+                  <a:schemeClr val="tx1"/>
+                </a:solidFill>
+                <a:effectLst/>
+                <a:latin typeface="+mn-lt"/>
+                <a:ea typeface="+mn-ea"/>
+                <a:cs typeface="+mn-cs"/>
+              </a:rPr>
+              <a:t>Цель, объект, предмет и задачи исследования представлены на слайде №3. Основной целью работы был анализ основных факторов негативно сказывающихся на производительности систем веб-шаблонов, поиск способов их устранения и </a:t>
+            </a:r>
+            <a:r>
+              <a:rPr lang="ru-RU" sz="1200" kern="1200" dirty="0" smtClean="0">
+                <a:solidFill>
+                  <a:schemeClr val="tx1"/>
+                </a:solidFill>
+                <a:effectLst/>
+                <a:latin typeface="+mn-lt"/>
+                <a:ea typeface="+mn-ea"/>
+                <a:cs typeface="+mn-cs"/>
+              </a:rPr>
+              <a:t>дальнейшая разработка </a:t>
+            </a:r>
+            <a:r>
+              <a:rPr lang="ru-RU" sz="1200" kern="1200" dirty="0" smtClean="0">
+                <a:solidFill>
+                  <a:schemeClr val="tx1"/>
+                </a:solidFill>
+                <a:effectLst/>
+                <a:latin typeface="+mn-lt"/>
+                <a:ea typeface="+mn-ea"/>
+                <a:cs typeface="+mn-cs"/>
+              </a:rPr>
+              <a:t>высокопроизводительной системы веб-шаблонов с применение данных подходов. Основные проблемы производительности выявленные в ходе исследования показаны на следующем слайде. </a:t>
+            </a:r>
+            <a:endParaRPr lang="en-US" sz="1200" kern="1200" dirty="0" smtClean="0">
+              <a:solidFill>
+                <a:schemeClr val="tx1"/>
+              </a:solidFill>
+              <a:effectLst/>
+              <a:latin typeface="+mn-lt"/>
+              <a:ea typeface="+mn-ea"/>
+              <a:cs typeface="+mn-cs"/>
+            </a:endParaRPr>
+          </a:p>
+          <a:p>
+            <a:endParaRPr lang="en-US" dirty="0"/>
+          </a:p>
+        </p:txBody>
+      </p:sp>
+      <p:sp>
+        <p:nvSpPr>
+          <p:cNvPr id="4" name="Номер слайда 3"/>
+          <p:cNvSpPr>
+            <a:spLocks noGrp="1"/>
+          </p:cNvSpPr>
+          <p:nvPr>
+            <p:ph type="sldNum" sz="quarter" idx="10"/>
+          </p:nvPr>
+        </p:nvSpPr>
+        <p:spPr/>
+        <p:txBody>
+          <a:bodyPr/>
+          <a:lstStyle/>
+          <a:p>
+            <a:fld id="{608A3F3F-0F8E-4901-95F3-ECC8D9533356}" type="slidenum">
+              <a:rPr lang="en-US" smtClean="0"/>
+              <a:t>3</a:t>
+            </a:fld>
+            <a:endParaRPr lang="en-US" dirty="0"/>
+          </a:p>
+        </p:txBody>
+      </p:sp>
+    </p:spTree>
+    <p:extLst>
+      <p:ext uri="{BB962C8B-B14F-4D97-AF65-F5344CB8AC3E}">
+        <p14:creationId xmlns:p14="http://schemas.microsoft.com/office/powerpoint/2010/main" val="2798603627"/>
+      </p:ext>
+    </p:extLst>
+  </p:cSld>
+  <p:clrMapOvr>
+    <a:masterClrMapping/>
+  </p:clrMapOvr>
+</p:notes>
+</file>
+
+<file path=ppt/notesSlides/notesSlide4.xml><?xml version="1.0" encoding="utf-8"?>
+<p:notes xmlns:a="http://schemas.openxmlformats.org/drawingml/2006/main" xmlns:r="http://schemas.openxmlformats.org/officeDocument/2006/relationships" xmlns:p="http://schemas.openxmlformats.org/presentationml/2006/main">
+  <p:cSld>
+    <p:spTree>
+      <p:nvGrpSpPr>
+        <p:cNvPr id="1" name=""/>
+        <p:cNvGrpSpPr/>
+        <p:nvPr/>
+      </p:nvGrpSpPr>
+      <p:grpSpPr>
+        <a:xfrm>
+          <a:off x="0" y="0"/>
+          <a:ext cx="0" cy="0"/>
+          <a:chOff x="0" y="0"/>
+          <a:chExt cx="0" cy="0"/>
+        </a:xfrm>
+      </p:grpSpPr>
+      <p:sp>
+        <p:nvSpPr>
+          <p:cNvPr id="2" name="Образ слайда 1"/>
+          <p:cNvSpPr>
+            <a:spLocks noGrp="1" noRot="1" noChangeAspect="1"/>
+          </p:cNvSpPr>
+          <p:nvPr>
+            <p:ph type="sldImg"/>
+          </p:nvPr>
+        </p:nvSpPr>
+        <p:spPr/>
+      </p:sp>
+      <p:sp>
+        <p:nvSpPr>
+          <p:cNvPr id="3" name="Заметки 2"/>
+          <p:cNvSpPr>
+            <a:spLocks noGrp="1"/>
+          </p:cNvSpPr>
+          <p:nvPr>
+            <p:ph type="body" idx="1"/>
+          </p:nvPr>
+        </p:nvSpPr>
+        <p:spPr/>
+        <p:txBody>
+          <a:bodyPr/>
+          <a:lstStyle/>
+          <a:p>
+            <a:pPr lvl="0"/>
+            <a:r>
+              <a:rPr lang="ru-RU" sz="1200" kern="1200" dirty="0" smtClean="0">
+                <a:solidFill>
+                  <a:schemeClr val="tx1"/>
+                </a:solidFill>
+                <a:effectLst/>
+                <a:latin typeface="+mn-lt"/>
+                <a:ea typeface="+mn-ea"/>
+                <a:cs typeface="+mn-cs"/>
+              </a:rPr>
+              <a:t>1.</a:t>
+            </a:r>
+            <a:r>
+              <a:rPr lang="ru-RU" sz="1200" kern="1200" baseline="0" dirty="0" smtClean="0">
+                <a:solidFill>
+                  <a:schemeClr val="tx1"/>
+                </a:solidFill>
+                <a:effectLst/>
+                <a:latin typeface="+mn-lt"/>
+                <a:ea typeface="+mn-ea"/>
+                <a:cs typeface="+mn-cs"/>
+              </a:rPr>
+              <a:t> </a:t>
+            </a:r>
+            <a:r>
+              <a:rPr lang="ru-RU" sz="1200" kern="1200" dirty="0" smtClean="0">
+                <a:solidFill>
+                  <a:schemeClr val="tx1"/>
+                </a:solidFill>
+                <a:effectLst/>
+                <a:latin typeface="+mn-lt"/>
+                <a:ea typeface="+mn-ea"/>
+                <a:cs typeface="+mn-cs"/>
+              </a:rPr>
+              <a:t>Подавляющее </a:t>
+            </a:r>
+            <a:r>
+              <a:rPr lang="ru-RU" sz="1200" kern="1200" dirty="0" smtClean="0">
+                <a:solidFill>
+                  <a:schemeClr val="tx1"/>
+                </a:solidFill>
+                <a:effectLst/>
+                <a:latin typeface="+mn-lt"/>
+                <a:ea typeface="+mn-ea"/>
+                <a:cs typeface="+mn-cs"/>
+              </a:rPr>
+              <a:t>большинство существующих решений написаны на интерпретируемых языках (</a:t>
+            </a:r>
+            <a:r>
+              <a:rPr lang="en-US" sz="1200" kern="1200" dirty="0" smtClean="0">
+                <a:solidFill>
+                  <a:schemeClr val="tx1"/>
+                </a:solidFill>
+                <a:effectLst/>
+                <a:latin typeface="+mn-lt"/>
+                <a:ea typeface="+mn-ea"/>
+                <a:cs typeface="+mn-cs"/>
+              </a:rPr>
+              <a:t>PHP</a:t>
+            </a:r>
+            <a:r>
+              <a:rPr lang="ru-RU" sz="1200" kern="1200" dirty="0" smtClean="0">
+                <a:solidFill>
+                  <a:schemeClr val="tx1"/>
+                </a:solidFill>
+                <a:effectLst/>
+                <a:latin typeface="+mn-lt"/>
+                <a:ea typeface="+mn-ea"/>
+                <a:cs typeface="+mn-cs"/>
+              </a:rPr>
+              <a:t>, </a:t>
+            </a:r>
+            <a:r>
+              <a:rPr lang="en-US" sz="1200" kern="1200" dirty="0" smtClean="0">
+                <a:solidFill>
+                  <a:schemeClr val="tx1"/>
+                </a:solidFill>
+                <a:effectLst/>
+                <a:latin typeface="+mn-lt"/>
+                <a:ea typeface="+mn-ea"/>
+                <a:cs typeface="+mn-cs"/>
+              </a:rPr>
+              <a:t>Python</a:t>
+            </a:r>
+            <a:r>
+              <a:rPr lang="ru-RU" sz="1200" kern="1200" dirty="0" smtClean="0">
+                <a:solidFill>
+                  <a:schemeClr val="tx1"/>
+                </a:solidFill>
+                <a:effectLst/>
+                <a:latin typeface="+mn-lt"/>
+                <a:ea typeface="+mn-ea"/>
+                <a:cs typeface="+mn-cs"/>
+              </a:rPr>
+              <a:t>, </a:t>
+            </a:r>
+            <a:r>
+              <a:rPr lang="en-US" sz="1200" kern="1200" dirty="0" smtClean="0">
+                <a:solidFill>
+                  <a:schemeClr val="tx1"/>
+                </a:solidFill>
+                <a:effectLst/>
+                <a:latin typeface="+mn-lt"/>
+                <a:ea typeface="+mn-ea"/>
+                <a:cs typeface="+mn-cs"/>
+              </a:rPr>
+              <a:t>JavaScript</a:t>
+            </a:r>
+            <a:r>
+              <a:rPr lang="ru-RU" sz="1200" kern="1200" dirty="0" smtClean="0">
+                <a:solidFill>
+                  <a:schemeClr val="tx1"/>
+                </a:solidFill>
+                <a:effectLst/>
+                <a:latin typeface="+mn-lt"/>
+                <a:ea typeface="+mn-ea"/>
+                <a:cs typeface="+mn-cs"/>
+              </a:rPr>
+              <a:t>).</a:t>
+            </a:r>
+            <a:r>
+              <a:rPr lang="en-US" sz="1200" kern="1200" dirty="0" smtClean="0">
+                <a:solidFill>
+                  <a:schemeClr val="tx1"/>
+                </a:solidFill>
+                <a:effectLst/>
+                <a:latin typeface="+mn-lt"/>
+                <a:ea typeface="+mn-ea"/>
+                <a:cs typeface="+mn-cs"/>
+              </a:rPr>
+              <a:t> </a:t>
+            </a:r>
+            <a:r>
+              <a:rPr lang="ru-RU" sz="1200" kern="1200" dirty="0" smtClean="0">
+                <a:solidFill>
+                  <a:schemeClr val="tx1"/>
+                </a:solidFill>
+                <a:effectLst/>
+                <a:latin typeface="+mn-lt"/>
+                <a:ea typeface="+mn-ea"/>
+                <a:cs typeface="+mn-cs"/>
+              </a:rPr>
+              <a:t>На</a:t>
+            </a:r>
+            <a:r>
+              <a:rPr lang="ru-RU" sz="1200" kern="1200" baseline="0" dirty="0" smtClean="0">
+                <a:solidFill>
+                  <a:schemeClr val="tx1"/>
+                </a:solidFill>
+                <a:effectLst/>
+                <a:latin typeface="+mn-lt"/>
+                <a:ea typeface="+mn-ea"/>
+                <a:cs typeface="+mn-cs"/>
+              </a:rPr>
+              <a:t> следующем слайде приведена причина почему это является негативным фактором.</a:t>
+            </a:r>
+            <a:endParaRPr lang="en-US" sz="1200" kern="1200" dirty="0" smtClean="0">
+              <a:solidFill>
+                <a:schemeClr val="tx1"/>
+              </a:solidFill>
+              <a:effectLst/>
+              <a:latin typeface="+mn-lt"/>
+              <a:ea typeface="+mn-ea"/>
+              <a:cs typeface="+mn-cs"/>
+            </a:endParaRPr>
+          </a:p>
+          <a:p>
+            <a:pPr lvl="0"/>
+            <a:r>
+              <a:rPr lang="ru-RU" sz="1200" kern="1200" dirty="0" smtClean="0">
+                <a:solidFill>
+                  <a:schemeClr val="tx1"/>
+                </a:solidFill>
+                <a:effectLst/>
+                <a:latin typeface="+mn-lt"/>
+                <a:ea typeface="+mn-ea"/>
+                <a:cs typeface="+mn-cs"/>
+              </a:rPr>
+              <a:t>2. Присутствие </a:t>
+            </a:r>
+            <a:r>
+              <a:rPr lang="ru-RU" sz="1200" kern="1200" dirty="0" smtClean="0">
+                <a:solidFill>
+                  <a:schemeClr val="tx1"/>
+                </a:solidFill>
+                <a:effectLst/>
+                <a:latin typeface="+mn-lt"/>
+                <a:ea typeface="+mn-ea"/>
+                <a:cs typeface="+mn-cs"/>
+              </a:rPr>
+              <a:t>механизм автоматического управления памятью, также известного как сборщик мусора,</a:t>
+            </a:r>
+            <a:r>
+              <a:rPr lang="ru-RU" sz="1200" kern="1200" baseline="0" dirty="0" smtClean="0">
+                <a:solidFill>
+                  <a:schemeClr val="tx1"/>
+                </a:solidFill>
+                <a:effectLst/>
+                <a:latin typeface="+mn-lt"/>
+                <a:ea typeface="+mn-ea"/>
+                <a:cs typeface="+mn-cs"/>
+              </a:rPr>
+              <a:t> который останавливает выполнение программы для освобождения неиспользуемой памяти.</a:t>
+            </a:r>
+            <a:endParaRPr lang="en-US" sz="1200" kern="1200" dirty="0" smtClean="0">
+              <a:solidFill>
+                <a:schemeClr val="tx1"/>
+              </a:solidFill>
+              <a:effectLst/>
+              <a:latin typeface="+mn-lt"/>
+              <a:ea typeface="+mn-ea"/>
+              <a:cs typeface="+mn-cs"/>
+            </a:endParaRPr>
+          </a:p>
+          <a:p>
+            <a:pPr lvl="0"/>
+            <a:r>
+              <a:rPr lang="ru-RU" sz="1200" kern="1200" dirty="0" smtClean="0">
+                <a:solidFill>
+                  <a:schemeClr val="tx1"/>
+                </a:solidFill>
+                <a:effectLst/>
+                <a:latin typeface="+mn-lt"/>
+                <a:ea typeface="+mn-ea"/>
+                <a:cs typeface="+mn-cs"/>
+              </a:rPr>
+              <a:t>3. Не </a:t>
+            </a:r>
+            <a:r>
+              <a:rPr lang="ru-RU" sz="1200" kern="1200" dirty="0" smtClean="0">
+                <a:solidFill>
+                  <a:schemeClr val="tx1"/>
+                </a:solidFill>
+                <a:effectLst/>
+                <a:latin typeface="+mn-lt"/>
+                <a:ea typeface="+mn-ea"/>
+                <a:cs typeface="+mn-cs"/>
+              </a:rPr>
+              <a:t>всегда присутствует кеширования обработанных шаблонов, что приводит к необходимости повторной </a:t>
+            </a:r>
+            <a:r>
+              <a:rPr lang="ru-RU" sz="1200" kern="1200" dirty="0" smtClean="0">
+                <a:solidFill>
+                  <a:schemeClr val="tx1"/>
+                </a:solidFill>
+                <a:effectLst/>
+                <a:latin typeface="+mn-lt"/>
+                <a:ea typeface="+mn-ea"/>
+                <a:cs typeface="+mn-cs"/>
+              </a:rPr>
+              <a:t>обработки</a:t>
+            </a:r>
+            <a:r>
+              <a:rPr lang="ru-RU" sz="1200" kern="1200" baseline="0" dirty="0" smtClean="0">
+                <a:solidFill>
+                  <a:schemeClr val="tx1"/>
+                </a:solidFill>
+                <a:effectLst/>
+                <a:latin typeface="+mn-lt"/>
+                <a:ea typeface="+mn-ea"/>
+                <a:cs typeface="+mn-cs"/>
+              </a:rPr>
+              <a:t>.</a:t>
+            </a:r>
+            <a:endParaRPr lang="en-US" sz="1200" kern="1200" dirty="0" smtClean="0">
+              <a:solidFill>
+                <a:schemeClr val="tx1"/>
+              </a:solidFill>
+              <a:effectLst/>
+              <a:latin typeface="+mn-lt"/>
+              <a:ea typeface="+mn-ea"/>
+              <a:cs typeface="+mn-cs"/>
+            </a:endParaRPr>
+          </a:p>
+          <a:p>
+            <a:pPr lvl="0"/>
+            <a:r>
+              <a:rPr lang="ru-RU" sz="1200" kern="1200" dirty="0" smtClean="0">
+                <a:solidFill>
+                  <a:schemeClr val="tx1"/>
+                </a:solidFill>
+                <a:effectLst/>
+                <a:latin typeface="+mn-lt"/>
+                <a:ea typeface="+mn-ea"/>
+                <a:cs typeface="+mn-cs"/>
+              </a:rPr>
+              <a:t>4. Вычислительные </a:t>
+            </a:r>
+            <a:r>
+              <a:rPr lang="ru-RU" sz="1200" kern="1200" dirty="0" smtClean="0">
+                <a:solidFill>
+                  <a:schemeClr val="tx1"/>
+                </a:solidFill>
+                <a:effectLst/>
+                <a:latin typeface="+mn-lt"/>
+                <a:ea typeface="+mn-ea"/>
+                <a:cs typeface="+mn-cs"/>
+              </a:rPr>
+              <a:t>ресурсы не используются полностью, это является следствием того, что исполнение программы происходит в одном </a:t>
+            </a:r>
+            <a:r>
+              <a:rPr lang="ru-RU" sz="1200" kern="1200" dirty="0" smtClean="0">
+                <a:solidFill>
+                  <a:schemeClr val="tx1"/>
+                </a:solidFill>
+                <a:effectLst/>
+                <a:latin typeface="+mn-lt"/>
+                <a:ea typeface="+mn-ea"/>
+                <a:cs typeface="+mn-cs"/>
+              </a:rPr>
+              <a:t>логическом потоке</a:t>
+            </a:r>
+            <a:r>
+              <a:rPr lang="ru-RU" sz="1200" kern="1200" dirty="0" smtClean="0">
+                <a:solidFill>
+                  <a:schemeClr val="tx1"/>
+                </a:solidFill>
+                <a:effectLst/>
+                <a:latin typeface="+mn-lt"/>
+                <a:ea typeface="+mn-ea"/>
+                <a:cs typeface="+mn-cs"/>
+              </a:rPr>
+              <a:t>, а</a:t>
+            </a:r>
+            <a:r>
+              <a:rPr lang="ru-RU" sz="1200" kern="1200" baseline="0" dirty="0" smtClean="0">
+                <a:solidFill>
+                  <a:schemeClr val="tx1"/>
+                </a:solidFill>
+                <a:effectLst/>
+                <a:latin typeface="+mn-lt"/>
+                <a:ea typeface="+mn-ea"/>
+                <a:cs typeface="+mn-cs"/>
+              </a:rPr>
+              <a:t> также</a:t>
+            </a:r>
+            <a:r>
+              <a:rPr lang="ru-RU" sz="1200" kern="1200" dirty="0" smtClean="0">
+                <a:solidFill>
+                  <a:schemeClr val="tx1"/>
+                </a:solidFill>
+                <a:effectLst/>
+                <a:latin typeface="+mn-lt"/>
+                <a:ea typeface="+mn-ea"/>
+                <a:cs typeface="+mn-cs"/>
+              </a:rPr>
+              <a:t> наличием блокировок процессора, связанных с чтением и записью с медленных хранилищ или каналов передачи данных.</a:t>
+            </a:r>
+            <a:endParaRPr lang="en-US" sz="1200" kern="1200" dirty="0" smtClean="0">
+              <a:solidFill>
+                <a:schemeClr val="tx1"/>
+              </a:solidFill>
+              <a:effectLst/>
+              <a:latin typeface="+mn-lt"/>
+              <a:ea typeface="+mn-ea"/>
+              <a:cs typeface="+mn-cs"/>
+            </a:endParaRPr>
+          </a:p>
+          <a:p>
+            <a:endParaRPr lang="en-US" dirty="0"/>
+          </a:p>
+        </p:txBody>
+      </p:sp>
+      <p:sp>
+        <p:nvSpPr>
+          <p:cNvPr id="4" name="Номер слайда 3"/>
+          <p:cNvSpPr>
+            <a:spLocks noGrp="1"/>
+          </p:cNvSpPr>
+          <p:nvPr>
+            <p:ph type="sldNum" sz="quarter" idx="10"/>
+          </p:nvPr>
+        </p:nvSpPr>
+        <p:spPr/>
+        <p:txBody>
+          <a:bodyPr/>
+          <a:lstStyle/>
+          <a:p>
+            <a:fld id="{608A3F3F-0F8E-4901-95F3-ECC8D9533356}" type="slidenum">
+              <a:rPr lang="en-US" smtClean="0"/>
+              <a:t>4</a:t>
+            </a:fld>
+            <a:endParaRPr lang="en-US" dirty="0"/>
+          </a:p>
+        </p:txBody>
+      </p:sp>
+    </p:spTree>
+    <p:extLst>
+      <p:ext uri="{BB962C8B-B14F-4D97-AF65-F5344CB8AC3E}">
+        <p14:creationId xmlns:p14="http://schemas.microsoft.com/office/powerpoint/2010/main" val="1027962310"/>
+      </p:ext>
+    </p:extLst>
+  </p:cSld>
+  <p:clrMapOvr>
+    <a:masterClrMapping/>
+  </p:clrMapOvr>
+</p:notes>
+</file>
+
+<file path=ppt/notesSlides/notesSlide5.xml><?xml version="1.0" encoding="utf-8"?>
+<p:notes xmlns:a="http://schemas.openxmlformats.org/drawingml/2006/main" xmlns:r="http://schemas.openxmlformats.org/officeDocument/2006/relationships" xmlns:p="http://schemas.openxmlformats.org/presentationml/2006/main">
+  <p:cSld>
+    <p:spTree>
+      <p:nvGrpSpPr>
+        <p:cNvPr id="1" name=""/>
+        <p:cNvGrpSpPr/>
+        <p:nvPr/>
+      </p:nvGrpSpPr>
+      <p:grpSpPr>
+        <a:xfrm>
+          <a:off x="0" y="0"/>
+          <a:ext cx="0" cy="0"/>
+          <a:chOff x="0" y="0"/>
+          <a:chExt cx="0" cy="0"/>
+        </a:xfrm>
+      </p:grpSpPr>
+      <p:sp>
+        <p:nvSpPr>
+          <p:cNvPr id="2" name="Образ слайда 1"/>
+          <p:cNvSpPr>
+            <a:spLocks noGrp="1" noRot="1" noChangeAspect="1"/>
+          </p:cNvSpPr>
+          <p:nvPr>
+            <p:ph type="sldImg"/>
+          </p:nvPr>
+        </p:nvSpPr>
+        <p:spPr/>
+      </p:sp>
+      <p:sp>
+        <p:nvSpPr>
+          <p:cNvPr id="3" name="Заметки 2"/>
+          <p:cNvSpPr>
+            <a:spLocks noGrp="1"/>
+          </p:cNvSpPr>
+          <p:nvPr>
+            <p:ph type="body" idx="1"/>
+          </p:nvPr>
+        </p:nvSpPr>
+        <p:spPr/>
+        <p:txBody>
+          <a:bodyPr/>
+          <a:lstStyle/>
+          <a:p>
+            <a:r>
+              <a:rPr lang="ru-RU" sz="1200" kern="1200" dirty="0" smtClean="0">
+                <a:solidFill>
+                  <a:schemeClr val="tx1"/>
+                </a:solidFill>
+                <a:effectLst/>
+                <a:latin typeface="+mn-lt"/>
+                <a:ea typeface="+mn-ea"/>
+                <a:cs typeface="+mn-cs"/>
+              </a:rPr>
+              <a:t>На слайде №5 представлено схематическое сравнение интерпретируемых и компилируемых языков программирования.</a:t>
+            </a:r>
+            <a:endParaRPr lang="en-US" sz="1200" kern="1200" dirty="0" smtClean="0">
+              <a:solidFill>
+                <a:schemeClr val="tx1"/>
+              </a:solidFill>
+              <a:effectLst/>
+              <a:latin typeface="+mn-lt"/>
+              <a:ea typeface="+mn-ea"/>
+              <a:cs typeface="+mn-cs"/>
+            </a:endParaRPr>
+          </a:p>
+          <a:p>
+            <a:r>
+              <a:rPr lang="ru-RU" sz="1200" kern="1200" dirty="0" smtClean="0">
+                <a:solidFill>
+                  <a:schemeClr val="tx1"/>
+                </a:solidFill>
+                <a:effectLst/>
+                <a:latin typeface="+mn-lt"/>
+                <a:ea typeface="+mn-ea"/>
+                <a:cs typeface="+mn-cs"/>
+              </a:rPr>
+              <a:t>При компиляции, компилятор обрабатывает исходный код и производит оптимизированный машинный бинарный код под целевую архитектуру ЭВМ.</a:t>
+            </a:r>
+            <a:endParaRPr lang="en-US" sz="1200" kern="1200" dirty="0" smtClean="0">
+              <a:solidFill>
+                <a:schemeClr val="tx1"/>
+              </a:solidFill>
+              <a:effectLst/>
+              <a:latin typeface="+mn-lt"/>
+              <a:ea typeface="+mn-ea"/>
+              <a:cs typeface="+mn-cs"/>
+            </a:endParaRPr>
+          </a:p>
+          <a:p>
+            <a:r>
+              <a:rPr lang="ru-RU" sz="1200" kern="1200" dirty="0" smtClean="0">
+                <a:solidFill>
+                  <a:schemeClr val="tx1"/>
+                </a:solidFill>
+                <a:effectLst/>
+                <a:latin typeface="+mn-lt"/>
+                <a:ea typeface="+mn-ea"/>
+                <a:cs typeface="+mn-cs"/>
+              </a:rPr>
+              <a:t>В</a:t>
+            </a:r>
+            <a:r>
+              <a:rPr lang="ru-RU" sz="1200" kern="1200" baseline="0" dirty="0" smtClean="0">
+                <a:solidFill>
+                  <a:schemeClr val="tx1"/>
+                </a:solidFill>
+                <a:effectLst/>
+                <a:latin typeface="+mn-lt"/>
+                <a:ea typeface="+mn-ea"/>
+                <a:cs typeface="+mn-cs"/>
+              </a:rPr>
+              <a:t> случае</a:t>
+            </a:r>
+            <a:r>
+              <a:rPr lang="ru-RU" sz="1200" kern="1200" dirty="0" smtClean="0">
+                <a:solidFill>
+                  <a:schemeClr val="tx1"/>
+                </a:solidFill>
+                <a:effectLst/>
+                <a:latin typeface="+mn-lt"/>
+                <a:ea typeface="+mn-ea"/>
+                <a:cs typeface="+mn-cs"/>
+              </a:rPr>
+              <a:t> интерпретации обработка исходного кода происходит построчно, и результатом такого процесса является промежуточный код некой виртуальной машины, так же известной как байт-код. Далее байт-код подвергается процессу трансляции в машинный код </a:t>
+            </a:r>
+            <a:r>
+              <a:rPr lang="ru-RU" sz="1200" kern="1200" dirty="0" smtClean="0">
+                <a:solidFill>
+                  <a:schemeClr val="tx1"/>
+                </a:solidFill>
+                <a:effectLst/>
+                <a:latin typeface="+mn-lt"/>
+                <a:ea typeface="+mn-ea"/>
+                <a:cs typeface="+mn-cs"/>
+              </a:rPr>
+              <a:t>уже целевой </a:t>
+            </a:r>
+            <a:r>
+              <a:rPr lang="ru-RU" sz="1200" kern="1200" dirty="0" smtClean="0">
+                <a:solidFill>
+                  <a:schemeClr val="tx1"/>
+                </a:solidFill>
+                <a:effectLst/>
+                <a:latin typeface="+mn-lt"/>
+                <a:ea typeface="+mn-ea"/>
+                <a:cs typeface="+mn-cs"/>
+              </a:rPr>
+              <a:t>архитектуры. </a:t>
+            </a:r>
+            <a:endParaRPr lang="en-US" sz="1200" kern="1200" dirty="0" smtClean="0">
+              <a:solidFill>
+                <a:schemeClr val="tx1"/>
+              </a:solidFill>
+              <a:effectLst/>
+              <a:latin typeface="+mn-lt"/>
+              <a:ea typeface="+mn-ea"/>
+              <a:cs typeface="+mn-cs"/>
+            </a:endParaRPr>
+          </a:p>
+          <a:p>
+            <a:r>
+              <a:rPr lang="ru-RU" sz="1200" kern="1200" dirty="0" smtClean="0">
+                <a:solidFill>
+                  <a:schemeClr val="tx1"/>
+                </a:solidFill>
+                <a:effectLst/>
+                <a:latin typeface="+mn-lt"/>
+                <a:ea typeface="+mn-ea"/>
+                <a:cs typeface="+mn-cs"/>
+              </a:rPr>
+              <a:t>Такой подход к исполнению программы в несколько раз медленнее по сравнению с компилируемым аналогом.</a:t>
+            </a:r>
+            <a:endParaRPr lang="en-US" sz="1200" kern="1200" dirty="0" smtClean="0">
+              <a:solidFill>
+                <a:schemeClr val="tx1"/>
+              </a:solidFill>
+              <a:effectLst/>
+              <a:latin typeface="+mn-lt"/>
+              <a:ea typeface="+mn-ea"/>
+              <a:cs typeface="+mn-cs"/>
+            </a:endParaRPr>
+          </a:p>
+          <a:p>
+            <a:endParaRPr lang="en-US" dirty="0"/>
+          </a:p>
+        </p:txBody>
+      </p:sp>
+      <p:sp>
+        <p:nvSpPr>
+          <p:cNvPr id="4" name="Номер слайда 3"/>
+          <p:cNvSpPr>
+            <a:spLocks noGrp="1"/>
+          </p:cNvSpPr>
+          <p:nvPr>
+            <p:ph type="sldNum" sz="quarter" idx="10"/>
+          </p:nvPr>
+        </p:nvSpPr>
+        <p:spPr/>
+        <p:txBody>
+          <a:bodyPr/>
+          <a:lstStyle/>
+          <a:p>
+            <a:fld id="{608A3F3F-0F8E-4901-95F3-ECC8D9533356}" type="slidenum">
+              <a:rPr lang="en-US" smtClean="0"/>
+              <a:t>5</a:t>
+            </a:fld>
+            <a:endParaRPr lang="en-US" dirty="0"/>
+          </a:p>
+        </p:txBody>
+      </p:sp>
+    </p:spTree>
+    <p:extLst>
+      <p:ext uri="{BB962C8B-B14F-4D97-AF65-F5344CB8AC3E}">
+        <p14:creationId xmlns:p14="http://schemas.microsoft.com/office/powerpoint/2010/main" val="3111289847"/>
+      </p:ext>
+    </p:extLst>
+  </p:cSld>
+  <p:clrMapOvr>
+    <a:masterClrMapping/>
+  </p:clrMapOvr>
+</p:notes>
+</file>
+
+<file path=ppt/notesSlides/notesSlide6.xml><?xml version="1.0" encoding="utf-8"?>
+<p:notes xmlns:a="http://schemas.openxmlformats.org/drawingml/2006/main" xmlns:r="http://schemas.openxmlformats.org/officeDocument/2006/relationships" xmlns:p="http://schemas.openxmlformats.org/presentationml/2006/main">
+  <p:cSld>
+    <p:spTree>
+      <p:nvGrpSpPr>
+        <p:cNvPr id="1" name=""/>
+        <p:cNvGrpSpPr/>
+        <p:nvPr/>
+      </p:nvGrpSpPr>
+      <p:grpSpPr>
+        <a:xfrm>
+          <a:off x="0" y="0"/>
+          <a:ext cx="0" cy="0"/>
+          <a:chOff x="0" y="0"/>
+          <a:chExt cx="0" cy="0"/>
+        </a:xfrm>
+      </p:grpSpPr>
+      <p:sp>
+        <p:nvSpPr>
+          <p:cNvPr id="2" name="Образ слайда 1"/>
+          <p:cNvSpPr>
+            <a:spLocks noGrp="1" noRot="1" noChangeAspect="1"/>
+          </p:cNvSpPr>
+          <p:nvPr>
+            <p:ph type="sldImg"/>
+          </p:nvPr>
+        </p:nvSpPr>
+        <p:spPr/>
+      </p:sp>
+      <p:sp>
+        <p:nvSpPr>
+          <p:cNvPr id="3" name="Заметки 2"/>
+          <p:cNvSpPr>
+            <a:spLocks noGrp="1"/>
+          </p:cNvSpPr>
+          <p:nvPr>
+            <p:ph type="body" idx="1"/>
+          </p:nvPr>
+        </p:nvSpPr>
+        <p:spPr/>
+        <p:txBody>
+          <a:bodyPr/>
+          <a:lstStyle/>
+          <a:p>
+            <a:r>
+              <a:rPr lang="ru-RU" sz="1200" kern="1200" dirty="0" smtClean="0">
+                <a:solidFill>
+                  <a:schemeClr val="tx1"/>
+                </a:solidFill>
+                <a:effectLst/>
+                <a:latin typeface="+mn-lt"/>
+                <a:ea typeface="+mn-ea"/>
+                <a:cs typeface="+mn-cs"/>
+              </a:rPr>
+              <a:t>Для решения ранее описанных проблем, были предложены следующие подходы:</a:t>
+            </a:r>
+            <a:endParaRPr lang="en-US" sz="1200" kern="1200" dirty="0" smtClean="0">
+              <a:solidFill>
+                <a:schemeClr val="tx1"/>
+              </a:solidFill>
+              <a:effectLst/>
+              <a:latin typeface="+mn-lt"/>
+              <a:ea typeface="+mn-ea"/>
+              <a:cs typeface="+mn-cs"/>
+            </a:endParaRPr>
+          </a:p>
+          <a:p>
+            <a:pPr lvl="0"/>
+            <a:r>
+              <a:rPr lang="ru-RU" sz="1200" kern="1200" dirty="0" smtClean="0">
+                <a:solidFill>
+                  <a:schemeClr val="tx1"/>
+                </a:solidFill>
+                <a:effectLst/>
+                <a:latin typeface="+mn-lt"/>
+                <a:ea typeface="+mn-ea"/>
+                <a:cs typeface="+mn-cs"/>
+              </a:rPr>
+              <a:t>1.</a:t>
+            </a:r>
+            <a:r>
+              <a:rPr lang="ru-RU" sz="1200" kern="1200" baseline="0" dirty="0" smtClean="0">
+                <a:solidFill>
+                  <a:schemeClr val="tx1"/>
+                </a:solidFill>
+                <a:effectLst/>
+                <a:latin typeface="+mn-lt"/>
+                <a:ea typeface="+mn-ea"/>
+                <a:cs typeface="+mn-cs"/>
+              </a:rPr>
+              <a:t> </a:t>
+            </a:r>
+            <a:r>
+              <a:rPr lang="ru-RU" sz="1200" kern="1200" dirty="0" smtClean="0">
+                <a:solidFill>
+                  <a:schemeClr val="tx1"/>
+                </a:solidFill>
+                <a:effectLst/>
+                <a:latin typeface="+mn-lt"/>
+                <a:ea typeface="+mn-ea"/>
+                <a:cs typeface="+mn-cs"/>
+              </a:rPr>
+              <a:t>Использование </a:t>
+            </a:r>
+            <a:r>
+              <a:rPr lang="ru-RU" sz="1200" kern="1200" dirty="0" smtClean="0">
+                <a:solidFill>
+                  <a:schemeClr val="tx1"/>
+                </a:solidFill>
+                <a:effectLst/>
+                <a:latin typeface="+mn-lt"/>
+                <a:ea typeface="+mn-ea"/>
+                <a:cs typeface="+mn-cs"/>
+              </a:rPr>
+              <a:t>компилируемых языков программирования вместо интерпретируемых.</a:t>
+            </a:r>
+            <a:endParaRPr lang="en-US" sz="1200" kern="1200" dirty="0" smtClean="0">
+              <a:solidFill>
+                <a:schemeClr val="tx1"/>
+              </a:solidFill>
+              <a:effectLst/>
+              <a:latin typeface="+mn-lt"/>
+              <a:ea typeface="+mn-ea"/>
+              <a:cs typeface="+mn-cs"/>
+            </a:endParaRPr>
+          </a:p>
+          <a:p>
+            <a:pPr lvl="0"/>
+            <a:r>
+              <a:rPr lang="ru-RU" sz="1200" kern="1200" baseline="0" dirty="0" smtClean="0">
+                <a:solidFill>
+                  <a:schemeClr val="tx1"/>
+                </a:solidFill>
+                <a:effectLst/>
+                <a:latin typeface="+mn-lt"/>
+                <a:ea typeface="+mn-ea"/>
+                <a:cs typeface="+mn-cs"/>
+              </a:rPr>
+              <a:t>2. </a:t>
+            </a:r>
+            <a:r>
+              <a:rPr lang="ru-RU" sz="1200" kern="1200" dirty="0" smtClean="0">
+                <a:solidFill>
+                  <a:schemeClr val="tx1"/>
+                </a:solidFill>
+                <a:effectLst/>
+                <a:latin typeface="+mn-lt"/>
+                <a:ea typeface="+mn-ea"/>
+                <a:cs typeface="+mn-cs"/>
+              </a:rPr>
+              <a:t>В выбранном языке программирования не должно быть механизма сборки мусора, а в целях упрощения управления памятью необходимо чтобы язык поддерживал идиому </a:t>
+            </a:r>
+            <a:r>
+              <a:rPr lang="en-US" sz="1200" kern="1200" dirty="0" smtClean="0">
+                <a:solidFill>
+                  <a:schemeClr val="tx1"/>
+                </a:solidFill>
+                <a:effectLst/>
+                <a:latin typeface="+mn-lt"/>
+                <a:ea typeface="+mn-ea"/>
+                <a:cs typeface="+mn-cs"/>
+              </a:rPr>
+              <a:t>RAII</a:t>
+            </a:r>
+            <a:r>
+              <a:rPr lang="ru-RU" sz="1200" kern="1200" dirty="0" smtClean="0">
+                <a:solidFill>
+                  <a:schemeClr val="tx1"/>
+                </a:solidFill>
+                <a:effectLst/>
+                <a:latin typeface="+mn-lt"/>
+                <a:ea typeface="+mn-ea"/>
+                <a:cs typeface="+mn-cs"/>
+              </a:rPr>
+              <a:t> (объект который получил ресурс, ответственен за его освобождение).</a:t>
+            </a:r>
+            <a:endParaRPr lang="en-US" sz="1200" kern="1200" dirty="0" smtClean="0">
+              <a:solidFill>
+                <a:schemeClr val="tx1"/>
+              </a:solidFill>
+              <a:effectLst/>
+              <a:latin typeface="+mn-lt"/>
+              <a:ea typeface="+mn-ea"/>
+              <a:cs typeface="+mn-cs"/>
+            </a:endParaRPr>
+          </a:p>
+          <a:p>
+            <a:pPr lvl="0"/>
+            <a:r>
+              <a:rPr lang="ru-RU" sz="1200" kern="1200" baseline="0" dirty="0" smtClean="0">
+                <a:solidFill>
+                  <a:schemeClr val="tx1"/>
+                </a:solidFill>
+                <a:effectLst/>
+                <a:latin typeface="+mn-lt"/>
+                <a:ea typeface="+mn-ea"/>
+                <a:cs typeface="+mn-cs"/>
+              </a:rPr>
+              <a:t>3. </a:t>
+            </a:r>
+            <a:r>
+              <a:rPr lang="ru-RU" sz="1200" kern="1200" dirty="0" smtClean="0">
+                <a:solidFill>
+                  <a:schemeClr val="tx1"/>
+                </a:solidFill>
+                <a:effectLst/>
+                <a:latin typeface="+mn-lt"/>
+                <a:ea typeface="+mn-ea"/>
+                <a:cs typeface="+mn-cs"/>
+              </a:rPr>
+              <a:t>Реализация кеширования шаблонов с применением вытесняющих </a:t>
+            </a:r>
+            <a:r>
+              <a:rPr lang="ru-RU" sz="1200" kern="1200" dirty="0" smtClean="0">
+                <a:solidFill>
+                  <a:schemeClr val="tx1"/>
+                </a:solidFill>
+                <a:effectLst/>
+                <a:latin typeface="+mn-lt"/>
+                <a:ea typeface="+mn-ea"/>
+                <a:cs typeface="+mn-cs"/>
+              </a:rPr>
+              <a:t>алгоритмов, таких</a:t>
+            </a:r>
+            <a:r>
+              <a:rPr lang="ru-RU" sz="1200" kern="1200" baseline="0" dirty="0" smtClean="0">
+                <a:solidFill>
+                  <a:schemeClr val="tx1"/>
+                </a:solidFill>
+                <a:effectLst/>
+                <a:latin typeface="+mn-lt"/>
+                <a:ea typeface="+mn-ea"/>
+                <a:cs typeface="+mn-cs"/>
+              </a:rPr>
+              <a:t> как</a:t>
+            </a:r>
+            <a:r>
+              <a:rPr lang="ru-RU" sz="1200" kern="1200" dirty="0" smtClean="0">
+                <a:solidFill>
+                  <a:schemeClr val="tx1"/>
+                </a:solidFill>
+                <a:effectLst/>
+                <a:latin typeface="+mn-lt"/>
+                <a:ea typeface="+mn-ea"/>
+                <a:cs typeface="+mn-cs"/>
+              </a:rPr>
+              <a:t> </a:t>
+            </a:r>
+            <a:r>
+              <a:rPr lang="en-US" sz="1200" kern="1200" dirty="0" smtClean="0">
+                <a:solidFill>
+                  <a:schemeClr val="tx1"/>
+                </a:solidFill>
+                <a:effectLst/>
+                <a:latin typeface="+mn-lt"/>
+                <a:ea typeface="+mn-ea"/>
+                <a:cs typeface="+mn-cs"/>
+              </a:rPr>
+              <a:t>LRU </a:t>
+            </a:r>
+            <a:r>
+              <a:rPr lang="ru-RU" sz="1200" kern="1200" dirty="0" smtClean="0">
+                <a:solidFill>
+                  <a:schemeClr val="tx1"/>
+                </a:solidFill>
+                <a:effectLst/>
+                <a:latin typeface="+mn-lt"/>
+                <a:ea typeface="+mn-ea"/>
+                <a:cs typeface="+mn-cs"/>
+              </a:rPr>
+              <a:t>(вытеснение давно не используемых объектов из кеша) или </a:t>
+            </a:r>
+            <a:r>
+              <a:rPr lang="en-US" sz="1200" kern="1200" dirty="0" smtClean="0">
+                <a:solidFill>
+                  <a:schemeClr val="tx1"/>
+                </a:solidFill>
+                <a:effectLst/>
+                <a:latin typeface="+mn-lt"/>
+                <a:ea typeface="+mn-ea"/>
+                <a:cs typeface="+mn-cs"/>
+              </a:rPr>
+              <a:t>LFU</a:t>
+            </a:r>
+            <a:r>
+              <a:rPr lang="ru-RU" sz="1200" kern="1200" dirty="0" smtClean="0">
+                <a:solidFill>
+                  <a:schemeClr val="tx1"/>
+                </a:solidFill>
+                <a:effectLst/>
+                <a:latin typeface="+mn-lt"/>
+                <a:ea typeface="+mn-ea"/>
+                <a:cs typeface="+mn-cs"/>
+              </a:rPr>
+              <a:t> (вытеснение наименее используемых объектов).</a:t>
+            </a:r>
+            <a:endParaRPr lang="en-US" sz="1200" kern="1200" dirty="0" smtClean="0">
+              <a:solidFill>
+                <a:schemeClr val="tx1"/>
+              </a:solidFill>
+              <a:effectLst/>
+              <a:latin typeface="+mn-lt"/>
+              <a:ea typeface="+mn-ea"/>
+              <a:cs typeface="+mn-cs"/>
+            </a:endParaRPr>
+          </a:p>
+          <a:p>
+            <a:pPr lvl="0"/>
+            <a:r>
+              <a:rPr lang="ru-RU" sz="1200" kern="1200" dirty="0" smtClean="0">
+                <a:solidFill>
+                  <a:schemeClr val="tx1"/>
+                </a:solidFill>
+                <a:effectLst/>
+                <a:latin typeface="+mn-lt"/>
+                <a:ea typeface="+mn-ea"/>
+                <a:cs typeface="+mn-cs"/>
+              </a:rPr>
+              <a:t>И для адресации проблемы простоя вычислительных ресурсов,</a:t>
+            </a:r>
+            <a:r>
+              <a:rPr lang="ru-RU" sz="1200" kern="1200" baseline="0" dirty="0" smtClean="0">
+                <a:solidFill>
+                  <a:schemeClr val="tx1"/>
+                </a:solidFill>
+                <a:effectLst/>
+                <a:latin typeface="+mn-lt"/>
+                <a:ea typeface="+mn-ea"/>
+                <a:cs typeface="+mn-cs"/>
+              </a:rPr>
+              <a:t> и повышения удобства эксплуатации продукта, </a:t>
+            </a:r>
+            <a:r>
+              <a:rPr lang="ru-RU" sz="1200" kern="1200" dirty="0" smtClean="0">
+                <a:solidFill>
+                  <a:schemeClr val="tx1"/>
+                </a:solidFill>
+                <a:effectLst/>
+                <a:latin typeface="+mn-lt"/>
+                <a:ea typeface="+mn-ea"/>
+                <a:cs typeface="+mn-cs"/>
+              </a:rPr>
+              <a:t>Реализация системы веб-шаблонов как веб-сервис, который может параллельно и асинхронно обрабатывать большое количество запросов на построение веб-документов или на управление шаблонами.</a:t>
+            </a:r>
+            <a:endParaRPr lang="en-US" sz="1200" kern="1200" dirty="0" smtClean="0">
+              <a:solidFill>
+                <a:schemeClr val="tx1"/>
+              </a:solidFill>
+              <a:effectLst/>
+              <a:latin typeface="+mn-lt"/>
+              <a:ea typeface="+mn-ea"/>
+              <a:cs typeface="+mn-cs"/>
+            </a:endParaRPr>
+          </a:p>
+          <a:p>
+            <a:endParaRPr lang="en-US" dirty="0"/>
+          </a:p>
+        </p:txBody>
+      </p:sp>
+      <p:sp>
+        <p:nvSpPr>
+          <p:cNvPr id="4" name="Номер слайда 3"/>
+          <p:cNvSpPr>
+            <a:spLocks noGrp="1"/>
+          </p:cNvSpPr>
+          <p:nvPr>
+            <p:ph type="sldNum" sz="quarter" idx="10"/>
+          </p:nvPr>
+        </p:nvSpPr>
+        <p:spPr/>
+        <p:txBody>
+          <a:bodyPr/>
+          <a:lstStyle/>
+          <a:p>
+            <a:fld id="{608A3F3F-0F8E-4901-95F3-ECC8D9533356}" type="slidenum">
+              <a:rPr lang="en-US" smtClean="0"/>
+              <a:t>6</a:t>
+            </a:fld>
+            <a:endParaRPr lang="en-US" dirty="0"/>
+          </a:p>
+        </p:txBody>
+      </p:sp>
+    </p:spTree>
+    <p:extLst>
+      <p:ext uri="{BB962C8B-B14F-4D97-AF65-F5344CB8AC3E}">
+        <p14:creationId xmlns:p14="http://schemas.microsoft.com/office/powerpoint/2010/main" val="1710772339"/>
+      </p:ext>
+    </p:extLst>
+  </p:cSld>
+  <p:clrMapOvr>
+    <a:masterClrMapping/>
+  </p:clrMapOvr>
+</p:notes>
+</file>
+
+<file path=ppt/notesSlides/notesSlide7.xml><?xml version="1.0" encoding="utf-8"?>
+<p:notes xmlns:a="http://schemas.openxmlformats.org/drawingml/2006/main" xmlns:r="http://schemas.openxmlformats.org/officeDocument/2006/relationships" xmlns:p="http://schemas.openxmlformats.org/presentationml/2006/main">
+  <p:cSld>
+    <p:spTree>
+      <p:nvGrpSpPr>
+        <p:cNvPr id="1" name=""/>
+        <p:cNvGrpSpPr/>
+        <p:nvPr/>
+      </p:nvGrpSpPr>
+      <p:grpSpPr>
+        <a:xfrm>
+          <a:off x="0" y="0"/>
+          <a:ext cx="0" cy="0"/>
+          <a:chOff x="0" y="0"/>
+          <a:chExt cx="0" cy="0"/>
+        </a:xfrm>
+      </p:grpSpPr>
+      <p:sp>
+        <p:nvSpPr>
+          <p:cNvPr id="2" name="Образ слайда 1"/>
+          <p:cNvSpPr>
+            <a:spLocks noGrp="1" noRot="1" noChangeAspect="1"/>
+          </p:cNvSpPr>
+          <p:nvPr>
+            <p:ph type="sldImg"/>
+          </p:nvPr>
+        </p:nvSpPr>
+        <p:spPr/>
+      </p:sp>
+      <p:sp>
+        <p:nvSpPr>
+          <p:cNvPr id="3" name="Заметки 2"/>
+          <p:cNvSpPr>
+            <a:spLocks noGrp="1"/>
+          </p:cNvSpPr>
+          <p:nvPr>
+            <p:ph type="body" idx="1"/>
+          </p:nvPr>
+        </p:nvSpPr>
+        <p:spPr/>
+        <p:txBody>
+          <a:bodyPr/>
+          <a:lstStyle/>
+          <a:p>
+            <a:r>
+              <a:rPr lang="ru-RU" sz="1200" kern="1200" dirty="0" smtClean="0">
+                <a:solidFill>
+                  <a:schemeClr val="tx1"/>
+                </a:solidFill>
+                <a:effectLst/>
+                <a:latin typeface="+mn-lt"/>
+                <a:ea typeface="+mn-ea"/>
+                <a:cs typeface="+mn-cs"/>
+              </a:rPr>
+              <a:t>Практическая часть работы посвящена проектированию и разработке ранее упомянутого веб-сервиса по построению веб-документов.</a:t>
+            </a:r>
+            <a:endParaRPr lang="en-US" sz="1200" kern="1200" dirty="0" smtClean="0">
+              <a:solidFill>
+                <a:schemeClr val="tx1"/>
+              </a:solidFill>
+              <a:effectLst/>
+              <a:latin typeface="+mn-lt"/>
+              <a:ea typeface="+mn-ea"/>
+              <a:cs typeface="+mn-cs"/>
+            </a:endParaRPr>
+          </a:p>
+          <a:p>
+            <a:r>
+              <a:rPr lang="ru-RU" sz="1200" kern="1200" dirty="0" smtClean="0">
+                <a:solidFill>
+                  <a:schemeClr val="tx1"/>
+                </a:solidFill>
+                <a:effectLst/>
+                <a:latin typeface="+mn-lt"/>
+                <a:ea typeface="+mn-ea"/>
+                <a:cs typeface="+mn-cs"/>
+              </a:rPr>
+              <a:t>Укрупнённо модель веб-сервиса выглядит следующим образом:</a:t>
+            </a:r>
+            <a:endParaRPr lang="en-US" sz="1200" kern="1200" dirty="0" smtClean="0">
+              <a:solidFill>
+                <a:schemeClr val="tx1"/>
+              </a:solidFill>
+              <a:effectLst/>
+              <a:latin typeface="+mn-lt"/>
+              <a:ea typeface="+mn-ea"/>
+              <a:cs typeface="+mn-cs"/>
+            </a:endParaRPr>
+          </a:p>
+          <a:p>
+            <a:r>
+              <a:rPr lang="en-US" sz="1200" kern="1200" dirty="0" smtClean="0">
+                <a:solidFill>
+                  <a:schemeClr val="tx1"/>
+                </a:solidFill>
+                <a:effectLst/>
+                <a:latin typeface="+mn-lt"/>
+                <a:ea typeface="+mn-ea"/>
+                <a:cs typeface="+mn-cs"/>
+              </a:rPr>
+              <a:t>N</a:t>
+            </a:r>
+            <a:r>
+              <a:rPr lang="ru-RU" sz="1200" kern="1200" dirty="0" err="1" smtClean="0">
+                <a:solidFill>
+                  <a:schemeClr val="tx1"/>
+                </a:solidFill>
+                <a:effectLst/>
+                <a:latin typeface="+mn-lt"/>
+                <a:ea typeface="+mn-ea"/>
+                <a:cs typeface="+mn-cs"/>
+              </a:rPr>
+              <a:t>ое</a:t>
+            </a:r>
+            <a:r>
+              <a:rPr lang="ru-RU" sz="1200" kern="1200" baseline="0" dirty="0" smtClean="0">
+                <a:solidFill>
+                  <a:schemeClr val="tx1"/>
+                </a:solidFill>
+                <a:effectLst/>
+                <a:latin typeface="+mn-lt"/>
+                <a:ea typeface="+mn-ea"/>
+                <a:cs typeface="+mn-cs"/>
+              </a:rPr>
+              <a:t> количество</a:t>
+            </a:r>
+            <a:r>
+              <a:rPr lang="ru-RU" sz="1200" kern="1200" dirty="0" smtClean="0">
+                <a:solidFill>
+                  <a:schemeClr val="tx1"/>
+                </a:solidFill>
+                <a:effectLst/>
+                <a:latin typeface="+mn-lt"/>
+                <a:ea typeface="+mn-ea"/>
+                <a:cs typeface="+mn-cs"/>
+              </a:rPr>
+              <a:t> </a:t>
+            </a:r>
+            <a:r>
+              <a:rPr lang="ru-RU" sz="1200" kern="1200" dirty="0" smtClean="0">
+                <a:solidFill>
+                  <a:schemeClr val="tx1"/>
+                </a:solidFill>
+                <a:effectLst/>
+                <a:latin typeface="+mn-lt"/>
+                <a:ea typeface="+mn-ea"/>
+                <a:cs typeface="+mn-cs"/>
+              </a:rPr>
+              <a:t>клиентов делает обращения к сервису посредством </a:t>
+            </a:r>
+            <a:r>
+              <a:rPr lang="en-US" sz="1200" kern="1200" dirty="0" smtClean="0">
+                <a:solidFill>
+                  <a:schemeClr val="tx1"/>
+                </a:solidFill>
+                <a:effectLst/>
+                <a:latin typeface="+mn-lt"/>
+                <a:ea typeface="+mn-ea"/>
+                <a:cs typeface="+mn-cs"/>
+              </a:rPr>
+              <a:t>HTTP </a:t>
+            </a:r>
+            <a:r>
+              <a:rPr lang="ru-RU" sz="1200" kern="1200" dirty="0" smtClean="0">
+                <a:solidFill>
+                  <a:schemeClr val="tx1"/>
+                </a:solidFill>
+                <a:effectLst/>
+                <a:latin typeface="+mn-lt"/>
+                <a:ea typeface="+mn-ea"/>
+                <a:cs typeface="+mn-cs"/>
+              </a:rPr>
+              <a:t>запросов, сервис </a:t>
+            </a:r>
+            <a:r>
+              <a:rPr lang="ru-RU" sz="1200" kern="1200" dirty="0" smtClean="0">
+                <a:solidFill>
+                  <a:schemeClr val="tx1"/>
+                </a:solidFill>
+                <a:effectLst/>
+                <a:latin typeface="+mn-lt"/>
+                <a:ea typeface="+mn-ea"/>
+                <a:cs typeface="+mn-cs"/>
+              </a:rPr>
+              <a:t>в свою очередь</a:t>
+            </a:r>
+            <a:r>
+              <a:rPr lang="ru-RU" sz="1200" kern="1200" baseline="0" dirty="0" smtClean="0">
+                <a:solidFill>
+                  <a:schemeClr val="tx1"/>
+                </a:solidFill>
+                <a:effectLst/>
+                <a:latin typeface="+mn-lt"/>
+                <a:ea typeface="+mn-ea"/>
+                <a:cs typeface="+mn-cs"/>
+              </a:rPr>
+              <a:t> </a:t>
+            </a:r>
+            <a:r>
+              <a:rPr lang="ru-RU" sz="1200" kern="1200" dirty="0" smtClean="0">
+                <a:solidFill>
+                  <a:schemeClr val="tx1"/>
+                </a:solidFill>
+                <a:effectLst/>
+                <a:latin typeface="+mn-lt"/>
+                <a:ea typeface="+mn-ea"/>
+                <a:cs typeface="+mn-cs"/>
+              </a:rPr>
+              <a:t>перенаправляет </a:t>
+            </a:r>
+            <a:r>
+              <a:rPr lang="ru-RU" sz="1200" kern="1200" dirty="0" smtClean="0">
+                <a:solidFill>
+                  <a:schemeClr val="tx1"/>
+                </a:solidFill>
+                <a:effectLst/>
+                <a:latin typeface="+mn-lt"/>
+                <a:ea typeface="+mn-ea"/>
+                <a:cs typeface="+mn-cs"/>
+              </a:rPr>
+              <a:t>запросы на соответствующие модули в зависимости от типа запроса.</a:t>
+            </a:r>
+            <a:endParaRPr lang="en-US" sz="1200" kern="1200" dirty="0" smtClean="0">
+              <a:solidFill>
+                <a:schemeClr val="tx1"/>
+              </a:solidFill>
+              <a:effectLst/>
+              <a:latin typeface="+mn-lt"/>
+              <a:ea typeface="+mn-ea"/>
+              <a:cs typeface="+mn-cs"/>
+            </a:endParaRPr>
+          </a:p>
+          <a:p>
+            <a:endParaRPr lang="en-US" dirty="0"/>
+          </a:p>
+        </p:txBody>
+      </p:sp>
+      <p:sp>
+        <p:nvSpPr>
+          <p:cNvPr id="4" name="Номер слайда 3"/>
+          <p:cNvSpPr>
+            <a:spLocks noGrp="1"/>
+          </p:cNvSpPr>
+          <p:nvPr>
+            <p:ph type="sldNum" sz="quarter" idx="10"/>
+          </p:nvPr>
+        </p:nvSpPr>
+        <p:spPr/>
+        <p:txBody>
+          <a:bodyPr/>
+          <a:lstStyle/>
+          <a:p>
+            <a:fld id="{608A3F3F-0F8E-4901-95F3-ECC8D9533356}" type="slidenum">
+              <a:rPr lang="en-US" smtClean="0"/>
+              <a:t>7</a:t>
+            </a:fld>
+            <a:endParaRPr lang="en-US" dirty="0"/>
+          </a:p>
+        </p:txBody>
+      </p:sp>
+    </p:spTree>
+    <p:extLst>
+      <p:ext uri="{BB962C8B-B14F-4D97-AF65-F5344CB8AC3E}">
+        <p14:creationId xmlns:p14="http://schemas.microsoft.com/office/powerpoint/2010/main" val="2357873287"/>
+      </p:ext>
+    </p:extLst>
+  </p:cSld>
+  <p:clrMapOvr>
+    <a:masterClrMapping/>
+  </p:clrMapOvr>
+</p:notes>
+</file>
+
+<file path=ppt/notesSlides/notesSlide8.xml><?xml version="1.0" encoding="utf-8"?>
+<p:notes xmlns:a="http://schemas.openxmlformats.org/drawingml/2006/main" xmlns:r="http://schemas.openxmlformats.org/officeDocument/2006/relationships" xmlns:p="http://schemas.openxmlformats.org/presentationml/2006/main">
+  <p:cSld>
+    <p:spTree>
+      <p:nvGrpSpPr>
+        <p:cNvPr id="1" name=""/>
+        <p:cNvGrpSpPr/>
+        <p:nvPr/>
+      </p:nvGrpSpPr>
+      <p:grpSpPr>
+        <a:xfrm>
+          <a:off x="0" y="0"/>
+          <a:ext cx="0" cy="0"/>
+          <a:chOff x="0" y="0"/>
+          <a:chExt cx="0" cy="0"/>
+        </a:xfrm>
+      </p:grpSpPr>
+      <p:sp>
+        <p:nvSpPr>
+          <p:cNvPr id="2" name="Образ слайда 1"/>
+          <p:cNvSpPr>
+            <a:spLocks noGrp="1" noRot="1" noChangeAspect="1"/>
+          </p:cNvSpPr>
+          <p:nvPr>
+            <p:ph type="sldImg"/>
+          </p:nvPr>
+        </p:nvSpPr>
+        <p:spPr/>
+      </p:sp>
+      <p:sp>
+        <p:nvSpPr>
+          <p:cNvPr id="3" name="Заметки 2"/>
+          <p:cNvSpPr>
+            <a:spLocks noGrp="1"/>
+          </p:cNvSpPr>
+          <p:nvPr>
+            <p:ph type="body" idx="1"/>
+          </p:nvPr>
+        </p:nvSpPr>
+        <p:spPr/>
+        <p:txBody>
+          <a:bodyPr/>
+          <a:lstStyle/>
+          <a:p>
+            <a:pPr marL="0" marR="0" indent="0" algn="l" defTabSz="914400" rtl="0" eaLnBrk="1" fontAlgn="auto" latinLnBrk="0" hangingPunct="1">
+              <a:lnSpc>
+                <a:spcPct val="100000"/>
+              </a:lnSpc>
+              <a:spcBef>
+                <a:spcPts val="0"/>
+              </a:spcBef>
+              <a:spcAft>
+                <a:spcPts val="0"/>
+              </a:spcAft>
+              <a:buClrTx/>
+              <a:buSzTx/>
+              <a:buFontTx/>
+              <a:buNone/>
+              <a:tabLst/>
+              <a:defRPr/>
+            </a:pPr>
+            <a:r>
+              <a:rPr lang="ru-RU" sz="1200" kern="1200" dirty="0" smtClean="0">
+                <a:solidFill>
+                  <a:schemeClr val="tx1"/>
+                </a:solidFill>
+                <a:effectLst/>
+                <a:latin typeface="+mn-lt"/>
+                <a:ea typeface="+mn-ea"/>
+                <a:cs typeface="+mn-cs"/>
+              </a:rPr>
+              <a:t>На слайде №8 приведена </a:t>
+            </a:r>
+            <a:r>
+              <a:rPr lang="en-US" sz="1200" kern="1200" dirty="0" smtClean="0">
+                <a:solidFill>
+                  <a:schemeClr val="tx1"/>
+                </a:solidFill>
+                <a:effectLst/>
+                <a:latin typeface="+mn-lt"/>
+                <a:ea typeface="+mn-ea"/>
+                <a:cs typeface="+mn-cs"/>
+              </a:rPr>
+              <a:t>IDEF</a:t>
+            </a:r>
+            <a:r>
+              <a:rPr lang="ru-RU" sz="1200" kern="1200" dirty="0" smtClean="0">
+                <a:solidFill>
+                  <a:schemeClr val="tx1"/>
+                </a:solidFill>
+                <a:effectLst/>
+                <a:latin typeface="+mn-lt"/>
+                <a:ea typeface="+mn-ea"/>
+                <a:cs typeface="+mn-cs"/>
+              </a:rPr>
+              <a:t>0 диаграмма обработки таких </a:t>
+            </a:r>
+            <a:r>
+              <a:rPr lang="en-US" sz="1200" kern="1200" dirty="0" smtClean="0">
+                <a:solidFill>
+                  <a:schemeClr val="tx1"/>
+                </a:solidFill>
+                <a:effectLst/>
+                <a:latin typeface="+mn-lt"/>
+                <a:ea typeface="+mn-ea"/>
+                <a:cs typeface="+mn-cs"/>
+              </a:rPr>
+              <a:t>HTTP </a:t>
+            </a:r>
+            <a:r>
+              <a:rPr lang="ru-RU" sz="1200" kern="1200" dirty="0" smtClean="0">
+                <a:solidFill>
+                  <a:schemeClr val="tx1"/>
+                </a:solidFill>
+                <a:effectLst/>
+                <a:latin typeface="+mn-lt"/>
+                <a:ea typeface="+mn-ea"/>
+                <a:cs typeface="+mn-cs"/>
+              </a:rPr>
+              <a:t>запросов</a:t>
+            </a:r>
+            <a:r>
+              <a:rPr lang="ru-RU" sz="1200" kern="1200" dirty="0" smtClean="0">
+                <a:solidFill>
+                  <a:schemeClr val="tx1"/>
+                </a:solidFill>
+                <a:effectLst/>
+                <a:latin typeface="+mn-lt"/>
+                <a:ea typeface="+mn-ea"/>
+                <a:cs typeface="+mn-cs"/>
+              </a:rPr>
+              <a:t>, где модель</a:t>
+            </a:r>
+            <a:r>
+              <a:rPr lang="ru-RU" sz="1200" kern="1200" baseline="0" dirty="0" smtClean="0">
+                <a:solidFill>
+                  <a:schemeClr val="tx1"/>
+                </a:solidFill>
+                <a:effectLst/>
+                <a:latin typeface="+mn-lt"/>
+                <a:ea typeface="+mn-ea"/>
+                <a:cs typeface="+mn-cs"/>
+              </a:rPr>
+              <a:t> раскрыта более детально,</a:t>
+            </a:r>
+            <a:r>
+              <a:rPr lang="ru-RU" sz="1200" kern="1200" dirty="0" smtClean="0">
+                <a:solidFill>
+                  <a:schemeClr val="tx1"/>
+                </a:solidFill>
+                <a:effectLst/>
+                <a:latin typeface="+mn-lt"/>
+                <a:ea typeface="+mn-ea"/>
+                <a:cs typeface="+mn-cs"/>
+              </a:rPr>
+              <a:t> </a:t>
+            </a:r>
+            <a:r>
+              <a:rPr lang="ru-RU" sz="1200" kern="1200" dirty="0" smtClean="0">
+                <a:solidFill>
+                  <a:schemeClr val="tx1"/>
+                </a:solidFill>
+                <a:effectLst/>
+                <a:latin typeface="+mn-lt"/>
+                <a:ea typeface="+mn-ea"/>
+                <a:cs typeface="+mn-cs"/>
+              </a:rPr>
+              <a:t>по ней видно, что после предварительной обработки запроса в целях</a:t>
+            </a:r>
+            <a:r>
+              <a:rPr lang="ru-RU" sz="1200" kern="1200" baseline="0" dirty="0" smtClean="0">
+                <a:solidFill>
+                  <a:schemeClr val="tx1"/>
+                </a:solidFill>
+                <a:effectLst/>
+                <a:latin typeface="+mn-lt"/>
+                <a:ea typeface="+mn-ea"/>
+                <a:cs typeface="+mn-cs"/>
+              </a:rPr>
+              <a:t> определения его типа,</a:t>
+            </a:r>
+            <a:r>
+              <a:rPr lang="ru-RU" sz="1200" kern="1200" dirty="0" smtClean="0">
+                <a:solidFill>
+                  <a:schemeClr val="tx1"/>
+                </a:solidFill>
+                <a:effectLst/>
+                <a:latin typeface="+mn-lt"/>
+                <a:ea typeface="+mn-ea"/>
+                <a:cs typeface="+mn-cs"/>
+              </a:rPr>
+              <a:t> веб-сервис перенаправляет его на соответствующую подсистему для осуществления  дальнейшей обработки. Тип запроса, например,</a:t>
+            </a:r>
+            <a:r>
+              <a:rPr lang="ru-RU" sz="1200" kern="1200" baseline="0" dirty="0" smtClean="0">
+                <a:solidFill>
+                  <a:schemeClr val="tx1"/>
+                </a:solidFill>
+                <a:effectLst/>
+                <a:latin typeface="+mn-lt"/>
+                <a:ea typeface="+mn-ea"/>
+                <a:cs typeface="+mn-cs"/>
+              </a:rPr>
+              <a:t> </a:t>
+            </a:r>
+            <a:r>
+              <a:rPr lang="ru-RU" sz="1200" kern="1200" dirty="0" smtClean="0">
+                <a:solidFill>
+                  <a:schemeClr val="tx1"/>
+                </a:solidFill>
+                <a:effectLst/>
+                <a:latin typeface="+mn-lt"/>
+                <a:ea typeface="+mn-ea"/>
+                <a:cs typeface="+mn-cs"/>
+              </a:rPr>
+              <a:t>может быть на построение документа или же на обновление шаблона в хранилище.</a:t>
+            </a:r>
+            <a:endParaRPr lang="en-US" sz="1200" kern="1200" dirty="0" smtClean="0">
+              <a:solidFill>
+                <a:schemeClr val="tx1"/>
+              </a:solidFill>
+              <a:effectLst/>
+              <a:latin typeface="+mn-lt"/>
+              <a:ea typeface="+mn-ea"/>
+              <a:cs typeface="+mn-cs"/>
+            </a:endParaRPr>
+          </a:p>
+          <a:p>
+            <a:endParaRPr lang="en-US" dirty="0"/>
+          </a:p>
+        </p:txBody>
+      </p:sp>
+      <p:sp>
+        <p:nvSpPr>
+          <p:cNvPr id="4" name="Номер слайда 3"/>
+          <p:cNvSpPr>
+            <a:spLocks noGrp="1"/>
+          </p:cNvSpPr>
+          <p:nvPr>
+            <p:ph type="sldNum" sz="quarter" idx="10"/>
+          </p:nvPr>
+        </p:nvSpPr>
+        <p:spPr/>
+        <p:txBody>
+          <a:bodyPr/>
+          <a:lstStyle/>
+          <a:p>
+            <a:fld id="{608A3F3F-0F8E-4901-95F3-ECC8D9533356}" type="slidenum">
+              <a:rPr lang="en-US" smtClean="0"/>
+              <a:t>8</a:t>
+            </a:fld>
+            <a:endParaRPr lang="en-US" dirty="0"/>
+          </a:p>
+        </p:txBody>
+      </p:sp>
+    </p:spTree>
+    <p:extLst>
+      <p:ext uri="{BB962C8B-B14F-4D97-AF65-F5344CB8AC3E}">
+        <p14:creationId xmlns:p14="http://schemas.microsoft.com/office/powerpoint/2010/main" val="1187688169"/>
+      </p:ext>
+    </p:extLst>
+  </p:cSld>
+  <p:clrMapOvr>
+    <a:masterClrMapping/>
+  </p:clrMapOvr>
+</p:notes>
+</file>
+
+<file path=ppt/notesSlides/notesSlide9.xml><?xml version="1.0" encoding="utf-8"?>
+<p:notes xmlns:a="http://schemas.openxmlformats.org/drawingml/2006/main" xmlns:r="http://schemas.openxmlformats.org/officeDocument/2006/relationships" xmlns:p="http://schemas.openxmlformats.org/presentationml/2006/main">
+  <p:cSld>
+    <p:spTree>
+      <p:nvGrpSpPr>
+        <p:cNvPr id="1" name=""/>
+        <p:cNvGrpSpPr/>
+        <p:nvPr/>
+      </p:nvGrpSpPr>
+      <p:grpSpPr>
+        <a:xfrm>
+          <a:off x="0" y="0"/>
+          <a:ext cx="0" cy="0"/>
+          <a:chOff x="0" y="0"/>
+          <a:chExt cx="0" cy="0"/>
+        </a:xfrm>
+      </p:grpSpPr>
+      <p:sp>
+        <p:nvSpPr>
+          <p:cNvPr id="2" name="Образ слайда 1"/>
+          <p:cNvSpPr>
+            <a:spLocks noGrp="1" noRot="1" noChangeAspect="1"/>
+          </p:cNvSpPr>
+          <p:nvPr>
+            <p:ph type="sldImg"/>
+          </p:nvPr>
+        </p:nvSpPr>
+        <p:spPr/>
+      </p:sp>
+      <p:sp>
+        <p:nvSpPr>
+          <p:cNvPr id="3" name="Заметки 2"/>
+          <p:cNvSpPr>
+            <a:spLocks noGrp="1"/>
+          </p:cNvSpPr>
+          <p:nvPr>
+            <p:ph type="body" idx="1"/>
+          </p:nvPr>
+        </p:nvSpPr>
+        <p:spPr/>
+        <p:txBody>
+          <a:bodyPr/>
+          <a:lstStyle/>
+          <a:p>
+            <a:r>
+              <a:rPr lang="ru-RU" sz="1200" kern="1200" dirty="0" smtClean="0">
+                <a:solidFill>
+                  <a:schemeClr val="tx1"/>
+                </a:solidFill>
+                <a:effectLst/>
+                <a:latin typeface="+mn-lt"/>
+                <a:ea typeface="+mn-ea"/>
+                <a:cs typeface="+mn-cs"/>
+              </a:rPr>
+              <a:t>Для реализации ранее описанного веб-сервиса построения веб-документов были использованы следующие технологии:</a:t>
+            </a:r>
+            <a:endParaRPr lang="en-US" sz="1200" kern="1200" dirty="0" smtClean="0">
+              <a:solidFill>
+                <a:schemeClr val="tx1"/>
+              </a:solidFill>
+              <a:effectLst/>
+              <a:latin typeface="+mn-lt"/>
+              <a:ea typeface="+mn-ea"/>
+              <a:cs typeface="+mn-cs"/>
+            </a:endParaRPr>
+          </a:p>
+          <a:p>
+            <a:r>
+              <a:rPr lang="ru-RU" sz="1200" kern="1200" dirty="0" smtClean="0">
+                <a:solidFill>
+                  <a:schemeClr val="tx1"/>
+                </a:solidFill>
+                <a:effectLst/>
+                <a:latin typeface="+mn-lt"/>
+                <a:ea typeface="+mn-ea"/>
+                <a:cs typeface="+mn-cs"/>
+              </a:rPr>
+              <a:t>Серверная часть была написана на языке программирования </a:t>
+            </a:r>
+            <a:r>
+              <a:rPr lang="en-US" sz="1200" kern="1200" dirty="0" smtClean="0">
+                <a:solidFill>
+                  <a:schemeClr val="tx1"/>
+                </a:solidFill>
+                <a:effectLst/>
+                <a:latin typeface="+mn-lt"/>
+                <a:ea typeface="+mn-ea"/>
+                <a:cs typeface="+mn-cs"/>
+              </a:rPr>
+              <a:t>Rust</a:t>
+            </a:r>
+            <a:r>
+              <a:rPr lang="ru-RU" sz="1200" kern="1200" dirty="0" smtClean="0">
+                <a:solidFill>
+                  <a:schemeClr val="tx1"/>
+                </a:solidFill>
+                <a:effectLst/>
+                <a:latin typeface="+mn-lt"/>
+                <a:ea typeface="+mn-ea"/>
+                <a:cs typeface="+mn-cs"/>
+              </a:rPr>
+              <a:t> (компилируемый язык, без сборки мусора и с повышенными гарантиями на безопасность выполнения). Для поддержки многопоточного и асинхронного исполнения была использована библиотека </a:t>
+            </a:r>
+            <a:r>
+              <a:rPr lang="en-US" sz="1200" kern="1200" dirty="0" err="1" smtClean="0">
+                <a:solidFill>
+                  <a:schemeClr val="tx1"/>
+                </a:solidFill>
+                <a:effectLst/>
+                <a:latin typeface="+mn-lt"/>
+                <a:ea typeface="+mn-ea"/>
+                <a:cs typeface="+mn-cs"/>
+              </a:rPr>
+              <a:t>tokio</a:t>
+            </a:r>
+            <a:r>
+              <a:rPr lang="ru-RU" sz="1200" kern="1200" dirty="0" smtClean="0">
+                <a:solidFill>
+                  <a:schemeClr val="tx1"/>
+                </a:solidFill>
+                <a:effectLst/>
+                <a:latin typeface="+mn-lt"/>
+                <a:ea typeface="+mn-ea"/>
+                <a:cs typeface="+mn-cs"/>
+              </a:rPr>
+              <a:t>. А для непосредственно самой шаблонизации в веб-сервис был интегрирован шаблонизатор </a:t>
+            </a:r>
+            <a:r>
+              <a:rPr lang="en-US" sz="1200" kern="1200" dirty="0" err="1" smtClean="0">
+                <a:solidFill>
+                  <a:schemeClr val="tx1"/>
+                </a:solidFill>
+                <a:effectLst/>
+                <a:latin typeface="+mn-lt"/>
+                <a:ea typeface="+mn-ea"/>
+                <a:cs typeface="+mn-cs"/>
+              </a:rPr>
+              <a:t>tera</a:t>
+            </a:r>
+            <a:r>
+              <a:rPr lang="ru-RU" sz="1200" kern="1200" dirty="0" smtClean="0">
+                <a:solidFill>
+                  <a:schemeClr val="tx1"/>
+                </a:solidFill>
+                <a:effectLst/>
+                <a:latin typeface="+mn-lt"/>
+                <a:ea typeface="+mn-ea"/>
+                <a:cs typeface="+mn-cs"/>
+              </a:rPr>
+              <a:t>.</a:t>
+            </a:r>
+            <a:endParaRPr lang="en-US" sz="1200" kern="1200" dirty="0" smtClean="0">
+              <a:solidFill>
+                <a:schemeClr val="tx1"/>
+              </a:solidFill>
+              <a:effectLst/>
+              <a:latin typeface="+mn-lt"/>
+              <a:ea typeface="+mn-ea"/>
+              <a:cs typeface="+mn-cs"/>
+            </a:endParaRPr>
+          </a:p>
+          <a:p>
+            <a:r>
+              <a:rPr lang="ru-RU" sz="1200" kern="1200" dirty="0" smtClean="0">
+                <a:solidFill>
+                  <a:schemeClr val="tx1"/>
+                </a:solidFill>
+                <a:effectLst/>
+                <a:latin typeface="+mn-lt"/>
+                <a:ea typeface="+mn-ea"/>
+                <a:cs typeface="+mn-cs"/>
+              </a:rPr>
+              <a:t>Пользовательский веб-интерфейс был написан с применением </a:t>
+            </a:r>
+            <a:r>
+              <a:rPr lang="ru-RU" sz="1200" kern="1200" dirty="0" err="1" smtClean="0">
+                <a:solidFill>
+                  <a:schemeClr val="tx1"/>
+                </a:solidFill>
+                <a:effectLst/>
+                <a:latin typeface="+mn-lt"/>
+                <a:ea typeface="+mn-ea"/>
+                <a:cs typeface="+mn-cs"/>
+              </a:rPr>
+              <a:t>javascript</a:t>
+            </a:r>
+            <a:r>
+              <a:rPr lang="ru-RU" sz="1200" kern="1200" dirty="0" smtClean="0">
+                <a:solidFill>
+                  <a:schemeClr val="tx1"/>
+                </a:solidFill>
+                <a:effectLst/>
+                <a:latin typeface="+mn-lt"/>
+                <a:ea typeface="+mn-ea"/>
+                <a:cs typeface="+mn-cs"/>
+              </a:rPr>
+              <a:t>-фреймворка </a:t>
+            </a:r>
+            <a:r>
+              <a:rPr lang="en-US" sz="1200" kern="1200" dirty="0" err="1" smtClean="0">
+                <a:solidFill>
+                  <a:schemeClr val="tx1"/>
+                </a:solidFill>
+                <a:effectLst/>
+                <a:latin typeface="+mn-lt"/>
+                <a:ea typeface="+mn-ea"/>
+                <a:cs typeface="+mn-cs"/>
+              </a:rPr>
+              <a:t>vuejs</a:t>
+            </a:r>
+            <a:r>
+              <a:rPr lang="ru-RU" sz="1200" kern="1200" dirty="0" smtClean="0">
+                <a:solidFill>
+                  <a:schemeClr val="tx1"/>
+                </a:solidFill>
+                <a:effectLst/>
+                <a:latin typeface="+mn-lt"/>
+                <a:ea typeface="+mn-ea"/>
+                <a:cs typeface="+mn-cs"/>
+              </a:rPr>
+              <a:t> и использованием стандартных </a:t>
+            </a:r>
+            <a:r>
+              <a:rPr lang="en-US" sz="1200" kern="1200" dirty="0" smtClean="0">
+                <a:solidFill>
+                  <a:schemeClr val="tx1"/>
+                </a:solidFill>
+                <a:effectLst/>
+                <a:latin typeface="+mn-lt"/>
+                <a:ea typeface="+mn-ea"/>
+                <a:cs typeface="+mn-cs"/>
+              </a:rPr>
+              <a:t>html </a:t>
+            </a:r>
+            <a:r>
+              <a:rPr lang="ru-RU" sz="1200" kern="1200" dirty="0" smtClean="0">
+                <a:solidFill>
+                  <a:schemeClr val="tx1"/>
+                </a:solidFill>
+                <a:effectLst/>
+                <a:latin typeface="+mn-lt"/>
+                <a:ea typeface="+mn-ea"/>
+                <a:cs typeface="+mn-cs"/>
+              </a:rPr>
+              <a:t>и </a:t>
+            </a:r>
+            <a:r>
+              <a:rPr lang="en-US" sz="1200" kern="1200" dirty="0" err="1" smtClean="0">
+                <a:solidFill>
+                  <a:schemeClr val="tx1"/>
+                </a:solidFill>
+                <a:effectLst/>
+                <a:latin typeface="+mn-lt"/>
+                <a:ea typeface="+mn-ea"/>
+                <a:cs typeface="+mn-cs"/>
+              </a:rPr>
+              <a:t>css</a:t>
+            </a:r>
+            <a:r>
+              <a:rPr lang="ru-RU" sz="1200" kern="1200" dirty="0" smtClean="0">
+                <a:solidFill>
+                  <a:schemeClr val="tx1"/>
+                </a:solidFill>
+                <a:effectLst/>
+                <a:latin typeface="+mn-lt"/>
+                <a:ea typeface="+mn-ea"/>
+                <a:cs typeface="+mn-cs"/>
+              </a:rPr>
+              <a:t>.</a:t>
+            </a:r>
+          </a:p>
+          <a:p>
+            <a:pPr marL="0" marR="0" indent="0" algn="l" defTabSz="914400" rtl="0" eaLnBrk="1" fontAlgn="auto" latinLnBrk="0" hangingPunct="1">
+              <a:lnSpc>
+                <a:spcPct val="100000"/>
+              </a:lnSpc>
+              <a:spcBef>
+                <a:spcPts val="0"/>
+              </a:spcBef>
+              <a:spcAft>
+                <a:spcPts val="0"/>
+              </a:spcAft>
+              <a:buClrTx/>
+              <a:buSzTx/>
+              <a:buFontTx/>
+              <a:buNone/>
+              <a:tabLst/>
+              <a:defRPr/>
+            </a:pPr>
+            <a:r>
+              <a:rPr lang="ru-RU" sz="1200" kern="1200" dirty="0" smtClean="0">
+                <a:solidFill>
+                  <a:schemeClr val="tx1"/>
+                </a:solidFill>
+                <a:effectLst/>
+                <a:latin typeface="+mn-lt"/>
+                <a:ea typeface="+mn-ea"/>
+                <a:cs typeface="+mn-cs"/>
+              </a:rPr>
+              <a:t>Также стоит упомянуть, что в силу клиент-серверной архитектуры, клиентом может выступать любая сущность, поддерживающая </a:t>
+            </a:r>
+            <a:r>
+              <a:rPr lang="en-US" sz="1200" kern="1200" dirty="0" smtClean="0">
+                <a:solidFill>
+                  <a:schemeClr val="tx1"/>
+                </a:solidFill>
+                <a:effectLst/>
+                <a:latin typeface="+mn-lt"/>
+                <a:ea typeface="+mn-ea"/>
+                <a:cs typeface="+mn-cs"/>
+              </a:rPr>
+              <a:t>HTTP </a:t>
+            </a:r>
+            <a:r>
+              <a:rPr lang="ru-RU" sz="1200" kern="1200" dirty="0" smtClean="0">
+                <a:solidFill>
+                  <a:schemeClr val="tx1"/>
+                </a:solidFill>
+                <a:effectLst/>
+                <a:latin typeface="+mn-lt"/>
+                <a:ea typeface="+mn-ea"/>
+                <a:cs typeface="+mn-cs"/>
+              </a:rPr>
+              <a:t>протокол обмена данными.</a:t>
+            </a:r>
+          </a:p>
+          <a:p>
+            <a:r>
+              <a:rPr lang="ru-RU" sz="1200" kern="1200" dirty="0" smtClean="0">
+                <a:solidFill>
+                  <a:schemeClr val="tx1"/>
+                </a:solidFill>
+                <a:effectLst/>
+                <a:latin typeface="+mn-lt"/>
+                <a:ea typeface="+mn-ea"/>
+                <a:cs typeface="+mn-cs"/>
+              </a:rPr>
+              <a:t>Основания для выбора той или технологии приведены в </a:t>
+            </a:r>
+            <a:r>
+              <a:rPr lang="ru-RU" sz="1200" kern="1200" dirty="0" smtClean="0">
+                <a:solidFill>
+                  <a:schemeClr val="tx1"/>
+                </a:solidFill>
+                <a:effectLst/>
+                <a:latin typeface="+mn-lt"/>
+                <a:ea typeface="+mn-ea"/>
+                <a:cs typeface="+mn-cs"/>
+              </a:rPr>
+              <a:t>расчётно-пояснительной </a:t>
+            </a:r>
+            <a:r>
+              <a:rPr lang="ru-RU" sz="1200" kern="1200" dirty="0" smtClean="0">
+                <a:solidFill>
+                  <a:schemeClr val="tx1"/>
+                </a:solidFill>
+                <a:effectLst/>
+                <a:latin typeface="+mn-lt"/>
+                <a:ea typeface="+mn-ea"/>
+                <a:cs typeface="+mn-cs"/>
+              </a:rPr>
+              <a:t>записке.</a:t>
+            </a:r>
+            <a:endParaRPr lang="en-US" sz="1200" kern="1200" dirty="0" smtClean="0">
+              <a:solidFill>
+                <a:schemeClr val="tx1"/>
+              </a:solidFill>
+              <a:effectLst/>
+              <a:latin typeface="+mn-lt"/>
+              <a:ea typeface="+mn-ea"/>
+              <a:cs typeface="+mn-cs"/>
+            </a:endParaRPr>
+          </a:p>
+          <a:p>
+            <a:endParaRPr lang="en-US" dirty="0"/>
+          </a:p>
+        </p:txBody>
+      </p:sp>
+      <p:sp>
+        <p:nvSpPr>
+          <p:cNvPr id="4" name="Номер слайда 3"/>
+          <p:cNvSpPr>
+            <a:spLocks noGrp="1"/>
+          </p:cNvSpPr>
+          <p:nvPr>
+            <p:ph type="sldNum" sz="quarter" idx="10"/>
+          </p:nvPr>
+        </p:nvSpPr>
+        <p:spPr/>
+        <p:txBody>
+          <a:bodyPr/>
+          <a:lstStyle/>
+          <a:p>
+            <a:fld id="{608A3F3F-0F8E-4901-95F3-ECC8D9533356}" type="slidenum">
+              <a:rPr lang="en-US" smtClean="0"/>
+              <a:t>9</a:t>
+            </a:fld>
+            <a:endParaRPr lang="en-US" dirty="0"/>
+          </a:p>
+        </p:txBody>
+      </p:sp>
+    </p:spTree>
+    <p:extLst>
+      <p:ext uri="{BB962C8B-B14F-4D97-AF65-F5344CB8AC3E}">
+        <p14:creationId xmlns:p14="http://schemas.microsoft.com/office/powerpoint/2010/main" val="2276227621"/>
+      </p:ext>
+    </p:extLst>
+  </p:cSld>
+  <p:clrMapOvr>
+    <a:masterClrMapping/>
+  </p:clrMapOvr>
+</p:notes>
+</file>
+
 <file path=ppt/slideLayouts/slideLayout1.xml><?xml version="1.0" encoding="utf-8"?>
 <p:sldLayout xmlns:a="http://schemas.openxmlformats.org/drawingml/2006/main" xmlns:r="http://schemas.openxmlformats.org/officeDocument/2006/relationships" xmlns:p="http://schemas.openxmlformats.org/presentationml/2006/main" type="title" preserve="1">
   <p:cSld name="Титульный слайд">
@@ -6750,7 +10008,7 @@
           <a:p>
             <a:fld id="{8A5229FB-8832-4A27-994F-F3EDC38C3527}" type="datetimeFigureOut">
               <a:rPr lang="en-US" smtClean="0"/>
-              <a:t>6/18/2020</a:t>
+              <a:t>6/19/2020</a:t>
             </a:fld>
             <a:endParaRPr lang="en-US" dirty="0"/>
           </a:p>
@@ -6920,7 +10178,7 @@
           <a:p>
             <a:fld id="{8A5229FB-8832-4A27-994F-F3EDC38C3527}" type="datetimeFigureOut">
               <a:rPr lang="en-US" smtClean="0"/>
-              <a:t>6/18/2020</a:t>
+              <a:t>6/19/2020</a:t>
             </a:fld>
             <a:endParaRPr lang="en-US" dirty="0"/>
           </a:p>
@@ -7100,7 +10358,7 @@
           <a:p>
             <a:fld id="{8A5229FB-8832-4A27-994F-F3EDC38C3527}" type="datetimeFigureOut">
               <a:rPr lang="en-US" smtClean="0"/>
-              <a:t>6/18/2020</a:t>
+              <a:t>6/19/2020</a:t>
             </a:fld>
             <a:endParaRPr lang="en-US" dirty="0"/>
           </a:p>
@@ -7270,7 +10528,7 @@
           <a:p>
             <a:fld id="{8A5229FB-8832-4A27-994F-F3EDC38C3527}" type="datetimeFigureOut">
               <a:rPr lang="en-US" smtClean="0"/>
-              <a:t>6/18/2020</a:t>
+              <a:t>6/19/2020</a:t>
             </a:fld>
             <a:endParaRPr lang="en-US" dirty="0"/>
           </a:p>
@@ -7516,7 +10774,7 @@
           <a:p>
             <a:fld id="{8A5229FB-8832-4A27-994F-F3EDC38C3527}" type="datetimeFigureOut">
               <a:rPr lang="en-US" smtClean="0"/>
-              <a:t>6/18/2020</a:t>
+              <a:t>6/19/2020</a:t>
             </a:fld>
             <a:endParaRPr lang="en-US" dirty="0"/>
           </a:p>
@@ -7748,7 +11006,7 @@
           <a:p>
             <a:fld id="{8A5229FB-8832-4A27-994F-F3EDC38C3527}" type="datetimeFigureOut">
               <a:rPr lang="en-US" smtClean="0"/>
-              <a:t>6/18/2020</a:t>
+              <a:t>6/19/2020</a:t>
             </a:fld>
             <a:endParaRPr lang="en-US" dirty="0"/>
           </a:p>
@@ -8115,7 +11373,7 @@
           <a:p>
             <a:fld id="{8A5229FB-8832-4A27-994F-F3EDC38C3527}" type="datetimeFigureOut">
               <a:rPr lang="en-US" smtClean="0"/>
-              <a:t>6/18/2020</a:t>
+              <a:t>6/19/2020</a:t>
             </a:fld>
             <a:endParaRPr lang="en-US" dirty="0"/>
           </a:p>
@@ -8233,7 +11491,7 @@
           <a:p>
             <a:fld id="{8A5229FB-8832-4A27-994F-F3EDC38C3527}" type="datetimeFigureOut">
               <a:rPr lang="en-US" smtClean="0"/>
-              <a:t>6/18/2020</a:t>
+              <a:t>6/19/2020</a:t>
             </a:fld>
             <a:endParaRPr lang="en-US" dirty="0"/>
           </a:p>
@@ -8328,7 +11586,7 @@
           <a:p>
             <a:fld id="{8A5229FB-8832-4A27-994F-F3EDC38C3527}" type="datetimeFigureOut">
               <a:rPr lang="en-US" smtClean="0"/>
-              <a:t>6/18/2020</a:t>
+              <a:t>6/19/2020</a:t>
             </a:fld>
             <a:endParaRPr lang="en-US" dirty="0"/>
           </a:p>
@@ -8605,7 +11863,7 @@
           <a:p>
             <a:fld id="{8A5229FB-8832-4A27-994F-F3EDC38C3527}" type="datetimeFigureOut">
               <a:rPr lang="en-US" smtClean="0"/>
-              <a:t>6/18/2020</a:t>
+              <a:t>6/19/2020</a:t>
             </a:fld>
             <a:endParaRPr lang="en-US" dirty="0"/>
           </a:p>
@@ -8858,7 +12116,7 @@
           <a:p>
             <a:fld id="{8A5229FB-8832-4A27-994F-F3EDC38C3527}" type="datetimeFigureOut">
               <a:rPr lang="en-US" smtClean="0"/>
-              <a:t>6/18/2020</a:t>
+              <a:t>6/19/2020</a:t>
             </a:fld>
             <a:endParaRPr lang="en-US" dirty="0"/>
           </a:p>
@@ -9071,7 +12329,7 @@
           <a:p>
             <a:fld id="{8A5229FB-8832-4A27-994F-F3EDC38C3527}" type="datetimeFigureOut">
               <a:rPr lang="en-US" smtClean="0"/>
-              <a:t>6/18/2020</a:t>
+              <a:t>6/19/2020</a:t>
             </a:fld>
             <a:endParaRPr lang="en-US" dirty="0"/>
           </a:p>
@@ -10129,7 +13387,7 @@
           <p:nvPr/>
         </p:nvPicPr>
         <p:blipFill>
-          <a:blip r:embed="rId2">
+          <a:blip r:embed="rId3">
             <a:extLst>
               <a:ext uri="{28A0092B-C50C-407E-A947-70E740481C1C}">
                 <a14:useLocalDpi xmlns:a14="http://schemas.microsoft.com/office/drawing/2010/main" val="0"/>
@@ -10263,7 +13521,7 @@
           <p:nvPr/>
         </p:nvPicPr>
         <p:blipFill>
-          <a:blip r:embed="rId2">
+          <a:blip r:embed="rId3">
             <a:extLst>
               <a:ext uri="{28A0092B-C50C-407E-A947-70E740481C1C}">
                 <a14:useLocalDpi xmlns:a14="http://schemas.microsoft.com/office/drawing/2010/main" val="0"/>
@@ -10492,7 +13750,7 @@
           <p:nvPr/>
         </p:nvPicPr>
         <p:blipFill>
-          <a:blip r:embed="rId2">
+          <a:blip r:embed="rId3">
             <a:extLst>
               <a:ext uri="{28A0092B-C50C-407E-A947-70E740481C1C}">
                 <a14:useLocalDpi xmlns:a14="http://schemas.microsoft.com/office/drawing/2010/main" val="0"/>
@@ -11191,10 +14449,6 @@
               </a:rPr>
               <a:t>основные принципы функционирования систем веб-шаблонов</a:t>
             </a:r>
-            <a:endParaRPr lang="ru-RU" sz="2000" dirty="0">
-              <a:latin typeface="Courier New" panose="02070309020205020404" pitchFamily="49" charset="0"/>
-              <a:cs typeface="Courier New" panose="02070309020205020404" pitchFamily="49" charset="0"/>
-            </a:endParaRPr>
           </a:p>
           <a:p>
             <a:pPr marL="342900" indent="-342900">
@@ -11630,7 +14884,7 @@
           </p:xfrm>
           <a:graphic>
             <a:graphicData uri="http://schemas.openxmlformats.org/drawingml/2006/diagram">
-              <dgm:relIds xmlns:dgm="http://schemas.openxmlformats.org/drawingml/2006/diagram" xmlns:r="http://schemas.openxmlformats.org/officeDocument/2006/relationships" r:dm="rId2" r:lo="rId3" r:qs="rId4" r:cs="rId5"/>
+              <dgm:relIds xmlns:dgm="http://schemas.openxmlformats.org/drawingml/2006/diagram" xmlns:r="http://schemas.openxmlformats.org/officeDocument/2006/relationships" r:dm="rId3" r:lo="rId4" r:qs="rId5" r:cs="rId6"/>
             </a:graphicData>
           </a:graphic>
         </p:graphicFrame>
@@ -11652,7 +14906,7 @@
           </p:xfrm>
           <a:graphic>
             <a:graphicData uri="http://schemas.openxmlformats.org/drawingml/2006/diagram">
-              <dgm:relIds xmlns:dgm="http://schemas.openxmlformats.org/drawingml/2006/diagram" xmlns:r="http://schemas.openxmlformats.org/officeDocument/2006/relationships" r:dm="rId7" r:lo="rId8" r:qs="rId9" r:cs="rId10"/>
+              <dgm:relIds xmlns:dgm="http://schemas.openxmlformats.org/drawingml/2006/diagram" xmlns:r="http://schemas.openxmlformats.org/officeDocument/2006/relationships" r:dm="rId8" r:lo="rId9" r:qs="rId10" r:cs="rId11"/>
             </a:graphicData>
           </a:graphic>
         </p:graphicFrame>
@@ -11725,7 +14979,7 @@
             <p:nvPr/>
           </p:nvPicPr>
           <p:blipFill>
-            <a:blip r:embed="rId12" cstate="print">
+            <a:blip r:embed="rId13" cstate="print">
               <a:extLst>
                 <a:ext uri="{28A0092B-C50C-407E-A947-70E740481C1C}">
                   <a14:useLocalDpi xmlns:a14="http://schemas.microsoft.com/office/drawing/2010/main" val="0"/>
@@ -12054,14 +15308,7 @@
                 <a:latin typeface="Courier New" panose="02070309020205020404" pitchFamily="49" charset="0"/>
                 <a:cs typeface="Courier New" panose="02070309020205020404" pitchFamily="49" charset="0"/>
               </a:rPr>
-              <a:t>Использование </a:t>
-            </a:r>
-            <a:r>
-              <a:rPr lang="ru-RU" sz="2400" dirty="0" smtClean="0">
-                <a:latin typeface="Courier New" panose="02070309020205020404" pitchFamily="49" charset="0"/>
-                <a:cs typeface="Courier New" panose="02070309020205020404" pitchFamily="49" charset="0"/>
-              </a:rPr>
-              <a:t>идиомы </a:t>
+              <a:t>Использование идиомы </a:t>
             </a:r>
             <a:r>
               <a:rPr lang="en-US" sz="2400" b="1" dirty="0" smtClean="0">
@@ -12121,10 +15368,6 @@
               </a:rPr>
               <a:t>LFU</a:t>
             </a:r>
-            <a:endParaRPr lang="en-US" sz="2400" b="1" dirty="0" smtClean="0">
-              <a:latin typeface="Courier New" panose="02070309020205020404" pitchFamily="49" charset="0"/>
-              <a:cs typeface="Courier New" panose="02070309020205020404" pitchFamily="49" charset="0"/>
-            </a:endParaRPr>
           </a:p>
           <a:p>
             <a:pPr marL="457200" indent="-457200">
@@ -12295,7 +15538,7 @@
             <p:nvPr/>
           </p:nvPicPr>
           <p:blipFill>
-            <a:blip r:embed="rId2" cstate="print">
+            <a:blip r:embed="rId3" cstate="print">
               <a:extLst>
                 <a:ext uri="{28A0092B-C50C-407E-A947-70E740481C1C}">
                   <a14:useLocalDpi xmlns:a14="http://schemas.microsoft.com/office/drawing/2010/main" val="0"/>
@@ -12325,7 +15568,7 @@
             <p:nvPr/>
           </p:nvPicPr>
           <p:blipFill>
-            <a:blip r:embed="rId2" cstate="print">
+            <a:blip r:embed="rId3" cstate="print">
               <a:extLst>
                 <a:ext uri="{28A0092B-C50C-407E-A947-70E740481C1C}">
                   <a14:useLocalDpi xmlns:a14="http://schemas.microsoft.com/office/drawing/2010/main" val="0"/>
@@ -12355,7 +15598,7 @@
             <p:nvPr/>
           </p:nvPicPr>
           <p:blipFill>
-            <a:blip r:embed="rId2" cstate="print">
+            <a:blip r:embed="rId3" cstate="print">
               <a:extLst>
                 <a:ext uri="{28A0092B-C50C-407E-A947-70E740481C1C}">
                   <a14:useLocalDpi xmlns:a14="http://schemas.microsoft.com/office/drawing/2010/main" val="0"/>
@@ -12385,7 +15628,7 @@
             <p:nvPr/>
           </p:nvPicPr>
           <p:blipFill>
-            <a:blip r:embed="rId2" cstate="print">
+            <a:blip r:embed="rId3" cstate="print">
               <a:extLst>
                 <a:ext uri="{28A0092B-C50C-407E-A947-70E740481C1C}">
                   <a14:useLocalDpi xmlns:a14="http://schemas.microsoft.com/office/drawing/2010/main" val="0"/>
@@ -12573,7 +15816,7 @@
             <p:nvPr/>
           </p:nvPicPr>
           <p:blipFill>
-            <a:blip r:embed="rId3" cstate="print">
+            <a:blip r:embed="rId4" cstate="print">
               <a:extLst>
                 <a:ext uri="{28A0092B-C50C-407E-A947-70E740481C1C}">
                   <a14:useLocalDpi xmlns:a14="http://schemas.microsoft.com/office/drawing/2010/main" val="0"/>
@@ -12871,7 +16114,7 @@
             <p:nvPr/>
           </p:nvPicPr>
           <p:blipFill>
-            <a:blip r:embed="rId4" cstate="print">
+            <a:blip r:embed="rId5" cstate="print">
               <a:extLst>
                 <a:ext uri="{28A0092B-C50C-407E-A947-70E740481C1C}">
                   <a14:useLocalDpi xmlns:a14="http://schemas.microsoft.com/office/drawing/2010/main" val="0"/>
@@ -12941,7 +16184,7 @@
             <p:nvPr/>
           </p:nvPicPr>
           <p:blipFill>
-            <a:blip r:embed="rId5" cstate="print">
+            <a:blip r:embed="rId6" cstate="print">
               <a:extLst>
                 <a:ext uri="{28A0092B-C50C-407E-A947-70E740481C1C}">
                   <a14:useLocalDpi xmlns:a14="http://schemas.microsoft.com/office/drawing/2010/main" val="0"/>
@@ -12971,7 +16214,7 @@
             <p:nvPr/>
           </p:nvPicPr>
           <p:blipFill>
-            <a:blip r:embed="rId6" cstate="print">
+            <a:blip r:embed="rId7" cstate="print">
               <a:extLst>
                 <a:ext uri="{28A0092B-C50C-407E-A947-70E740481C1C}">
                   <a14:useLocalDpi xmlns:a14="http://schemas.microsoft.com/office/drawing/2010/main" val="0"/>
@@ -13370,7 +16613,7 @@
           <p:nvPr/>
         </p:nvPicPr>
         <p:blipFill>
-          <a:blip r:embed="rId2">
+          <a:blip r:embed="rId3">
             <a:extLst>
               <a:ext uri="{28A0092B-C50C-407E-A947-70E740481C1C}">
                 <a14:useLocalDpi xmlns:a14="http://schemas.microsoft.com/office/drawing/2010/main" val="0"/>

</xml_diff>

<commit_message>
Synced the speesh with the presentation
</commit_message>
<xml_diff>
--- a/docs/Презентация ВКР.pptx
+++ b/docs/Презентация ВКР.pptx
@@ -6351,7 +6351,7 @@
           <a:p>
             <a:fld id="{866795EF-B5F3-41B8-8955-C946C1B25F38}" type="datetimeFigureOut">
               <a:rPr lang="en-US" smtClean="0"/>
-              <a:t>6/19/2020</a:t>
+              <a:t>6/21/2020</a:t>
             </a:fld>
             <a:endParaRPr lang="en-US" dirty="0"/>
           </a:p>
@@ -6838,7 +6838,55 @@
                 <a:ea typeface="+mn-ea"/>
                 <a:cs typeface="+mn-cs"/>
               </a:rPr>
-              <a:t>На данном слайде приведён пример пользовательского веб-интерфейса разработанного сервиса. А также по указанной ссылке можно ознакомиться с демонстративной версией разработанной системы.</a:t>
+              <a:t>На данном слайде приведён пример пользовательского веб-интерфейса разработанного </a:t>
+            </a:r>
+            <a:r>
+              <a:rPr lang="ru-RU" sz="1200" kern="1200" dirty="0" smtClean="0">
+                <a:solidFill>
+                  <a:schemeClr val="tx1"/>
+                </a:solidFill>
+                <a:effectLst/>
+                <a:latin typeface="+mn-lt"/>
+                <a:ea typeface="+mn-ea"/>
+                <a:cs typeface="+mn-cs"/>
+              </a:rPr>
+              <a:t>сервиса, здесь</a:t>
+            </a:r>
+            <a:r>
+              <a:rPr lang="ru-RU" sz="1200" kern="1200" baseline="0" dirty="0" smtClean="0">
+                <a:solidFill>
+                  <a:schemeClr val="tx1"/>
+                </a:solidFill>
+                <a:effectLst/>
+                <a:latin typeface="+mn-lt"/>
+                <a:ea typeface="+mn-ea"/>
+                <a:cs typeface="+mn-cs"/>
+              </a:rPr>
+              <a:t> изображён сгенерированный веб-документ на основе введённых пользователем данных и заранее подготовленного шаблона</a:t>
+            </a:r>
+            <a:r>
+              <a:rPr lang="ru-RU" sz="1200" kern="1200" dirty="0" smtClean="0">
+                <a:solidFill>
+                  <a:schemeClr val="tx1"/>
+                </a:solidFill>
+                <a:effectLst/>
+                <a:latin typeface="+mn-lt"/>
+                <a:ea typeface="+mn-ea"/>
+                <a:cs typeface="+mn-cs"/>
+              </a:rPr>
+              <a:t>. </a:t>
+            </a:r>
+            <a:r>
+              <a:rPr lang="ru-RU" sz="1200" kern="1200" dirty="0" smtClean="0">
+                <a:solidFill>
+                  <a:schemeClr val="tx1"/>
+                </a:solidFill>
+                <a:effectLst/>
+                <a:latin typeface="+mn-lt"/>
+                <a:ea typeface="+mn-ea"/>
+                <a:cs typeface="+mn-cs"/>
+              </a:rPr>
+              <a:t>А также по указанной ссылке можно ознакомиться с демонстративной версией разработанной системы.</a:t>
             </a:r>
             <a:endParaRPr lang="en-US" sz="1200" kern="1200" dirty="0" smtClean="0">
               <a:solidFill>
@@ -7187,43 +7235,7 @@
                 <a:ea typeface="+mn-ea"/>
                 <a:cs typeface="+mn-cs"/>
               </a:rPr>
-              <a:t>Нагрузка, которая фиксировалась на сервере во время проведения теста показана на слайде №12. По нему видно, что оба ядра процессора нагружены только на 50%, т.е., не смотря на большое количество одновременных запросов, </a:t>
-            </a:r>
-            <a:r>
-              <a:rPr lang="ru-RU" sz="1200" kern="1200" dirty="0" smtClean="0">
-                <a:solidFill>
-                  <a:schemeClr val="tx1"/>
-                </a:solidFill>
-                <a:effectLst/>
-                <a:latin typeface="+mn-lt"/>
-                <a:ea typeface="+mn-ea"/>
-                <a:cs typeface="+mn-cs"/>
-              </a:rPr>
-              <a:t>такая рода </a:t>
-            </a:r>
-            <a:r>
-              <a:rPr lang="ru-RU" sz="1200" kern="1200" dirty="0" smtClean="0">
-                <a:solidFill>
-                  <a:schemeClr val="tx1"/>
-                </a:solidFill>
-                <a:effectLst/>
-                <a:latin typeface="+mn-lt"/>
-                <a:ea typeface="+mn-ea"/>
-                <a:cs typeface="+mn-cs"/>
-              </a:rPr>
-              <a:t>нагрузка находится в допустимых пределах для разработанной системы веб-шаблонов</a:t>
-            </a:r>
-            <a:r>
-              <a:rPr lang="ru-RU" sz="1200" kern="1200" dirty="0" smtClean="0">
-                <a:solidFill>
-                  <a:schemeClr val="tx1"/>
-                </a:solidFill>
-                <a:effectLst/>
-                <a:latin typeface="+mn-lt"/>
-                <a:ea typeface="+mn-ea"/>
-                <a:cs typeface="+mn-cs"/>
-              </a:rPr>
-              <a:t>.</a:t>
+              <a:t>Нагрузка, которая фиксировалась на сервере во время проведения теста показана на слайде №12. По нему видно, что оба ядра процессора нагружены только на 50%, т.е., не смотря на большое количество одновременных запросов, такая рода нагрузка находится в допустимых пределах для разработанной системы веб-шаблонов.</a:t>
             </a:r>
             <a:endParaRPr lang="en-US" sz="1200" kern="1200" dirty="0" smtClean="0">
               <a:solidFill>
@@ -7347,19 +7359,7 @@
                 <a:ea typeface="+mn-ea"/>
                 <a:cs typeface="+mn-cs"/>
               </a:rPr>
-              <a:t>В заключении можно сказать что все поставленные цели были достигнуты: были проанализированы проблемы низкой производительности веб-шаблонов, предложены способы устранения данных проблем, после чего разработана высокопроизводительная и удобная в использовании система веб-шаблонов. </a:t>
-            </a:r>
-            <a:r>
-              <a:rPr lang="ru-RU" sz="1200" kern="1200" dirty="0" smtClean="0">
-                <a:solidFill>
-                  <a:schemeClr val="tx1"/>
-                </a:solidFill>
-                <a:effectLst/>
-                <a:latin typeface="+mn-lt"/>
-                <a:ea typeface="+mn-ea"/>
-                <a:cs typeface="+mn-cs"/>
-              </a:rPr>
-              <a:t> </a:t>
+              <a:t>В заключении можно сказать что все поставленные цели были достигнуты: были проанализированы проблемы низкой производительности веб-шаблонов, предложены способы устранения данных проблем, после чего разработана высокопроизводительная и удобная в использовании система веб-шаблонов.  </a:t>
             </a:r>
           </a:p>
           <a:p>
@@ -7550,7 +7550,19 @@
                 <a:ea typeface="+mn-ea"/>
                 <a:cs typeface="+mn-cs"/>
               </a:rPr>
-              <a:t> предназначены для использования в составе более крупных веб-фреймворков, </a:t>
+              <a:t> предназначены для использования в составе более крупных веб-фреймворков, что</a:t>
+            </a:r>
+            <a:r>
+              <a:rPr lang="en-US" sz="1200" kern="1200" dirty="0" smtClean="0">
+                <a:solidFill>
+                  <a:schemeClr val="tx1"/>
+                </a:solidFill>
+                <a:effectLst/>
+                <a:latin typeface="+mn-lt"/>
+                <a:ea typeface="+mn-ea"/>
+                <a:cs typeface="+mn-cs"/>
+              </a:rPr>
+              <a:t> </a:t>
             </a:r>
             <a:r>
               <a:rPr lang="ru-RU" sz="1200" kern="1200" dirty="0" smtClean="0">
@@ -7562,30 +7574,6 @@
                 <a:ea typeface="+mn-ea"/>
                 <a:cs typeface="+mn-cs"/>
               </a:rPr>
-              <a:t>что</a:t>
-            </a:r>
-            <a:r>
-              <a:rPr lang="en-US" sz="1200" kern="1200" dirty="0" smtClean="0">
-                <a:solidFill>
-                  <a:schemeClr val="tx1"/>
-                </a:solidFill>
-                <a:effectLst/>
-                <a:latin typeface="+mn-lt"/>
-                <a:ea typeface="+mn-ea"/>
-                <a:cs typeface="+mn-cs"/>
-              </a:rPr>
-              <a:t> </a:t>
-            </a:r>
-            <a:r>
-              <a:rPr lang="ru-RU" sz="1200" kern="1200" dirty="0" smtClean="0">
-                <a:solidFill>
-                  <a:schemeClr val="tx1"/>
-                </a:solidFill>
-                <a:effectLst/>
-                <a:latin typeface="+mn-lt"/>
-                <a:ea typeface="+mn-ea"/>
-                <a:cs typeface="+mn-cs"/>
-              </a:rPr>
               <a:t>в</a:t>
             </a:r>
             <a:r>
@@ -7601,7 +7589,7 @@
               <a:t> свою </a:t>
             </a:r>
             <a:r>
-              <a:rPr lang="ru-RU" sz="1200" kern="1200" baseline="0" dirty="0" err="1" smtClean="0">
+              <a:rPr lang="ru-RU" sz="1200" kern="1200" baseline="0" dirty="0" smtClean="0">
                 <a:solidFill>
                   <a:schemeClr val="tx1"/>
                 </a:solidFill>
@@ -7610,7 +7598,7 @@
                 <a:ea typeface="+mn-ea"/>
                 <a:cs typeface="+mn-cs"/>
               </a:rPr>
-              <a:t>очердь</a:t>
+              <a:t>очередь</a:t>
             </a:r>
             <a:r>
               <a:rPr lang="ru-RU" sz="1200" kern="1200" dirty="0" smtClean="0">
@@ -7782,31 +7770,7 @@
                 <a:ea typeface="+mn-ea"/>
                 <a:cs typeface="+mn-cs"/>
               </a:rPr>
-              <a:t>Цель, объект, предмет и задачи исследования представлены на слайде №3. Основной целью работы был анализ основных факторов негативно сказывающихся на производительности систем веб-шаблонов, поиск способов их устранения и </a:t>
-            </a:r>
-            <a:r>
-              <a:rPr lang="ru-RU" sz="1200" kern="1200" dirty="0" smtClean="0">
-                <a:solidFill>
-                  <a:schemeClr val="tx1"/>
-                </a:solidFill>
-                <a:effectLst/>
-                <a:latin typeface="+mn-lt"/>
-                <a:ea typeface="+mn-ea"/>
-                <a:cs typeface="+mn-cs"/>
-              </a:rPr>
-              <a:t>дальнейшая разработка </a:t>
-            </a:r>
-            <a:r>
-              <a:rPr lang="ru-RU" sz="1200" kern="1200" dirty="0" smtClean="0">
-                <a:solidFill>
-                  <a:schemeClr val="tx1"/>
-                </a:solidFill>
-                <a:effectLst/>
-                <a:latin typeface="+mn-lt"/>
-                <a:ea typeface="+mn-ea"/>
-                <a:cs typeface="+mn-cs"/>
-              </a:rPr>
-              <a:t>высокопроизводительной системы веб-шаблонов с применение данных подходов. Основные проблемы производительности выявленные в ходе исследования показаны на следующем слайде. </a:t>
+              <a:t>Цель, объект, предмет и задачи исследования представлены на слайде №3. Основной целью работы был анализ основных факторов негативно сказывающихся на производительности систем веб-шаблонов, поиск способов их устранения и дальнейшая разработка высокопроизводительной системы веб-шаблонов с применение данных подходов. Основные проблемы производительности выявленные в ходе исследования показаны на следующем слайде. </a:t>
             </a:r>
             <a:endParaRPr lang="en-US" sz="1200" kern="1200" dirty="0" smtClean="0">
               <a:solidFill>
@@ -7938,19 +7902,7 @@
                 <a:ea typeface="+mn-ea"/>
                 <a:cs typeface="+mn-cs"/>
               </a:rPr>
-              <a:t>Подавляющее </a:t>
-            </a:r>
-            <a:r>
-              <a:rPr lang="ru-RU" sz="1200" kern="1200" dirty="0" smtClean="0">
-                <a:solidFill>
-                  <a:schemeClr val="tx1"/>
-                </a:solidFill>
-                <a:effectLst/>
-                <a:latin typeface="+mn-lt"/>
-                <a:ea typeface="+mn-ea"/>
-                <a:cs typeface="+mn-cs"/>
-              </a:rPr>
-              <a:t>большинство существующих решений написаны на интерпретируемых языках (</a:t>
+              <a:t>Подавляющее большинство существующих решений написаны на интерпретируемых языках (</a:t>
             </a:r>
             <a:r>
               <a:rPr lang="en-US" sz="1200" kern="1200" dirty="0" smtClean="0">
@@ -8082,19 +8034,7 @@
                 <a:ea typeface="+mn-ea"/>
                 <a:cs typeface="+mn-cs"/>
               </a:rPr>
-              <a:t>2. Присутствие </a:t>
-            </a:r>
-            <a:r>
-              <a:rPr lang="ru-RU" sz="1200" kern="1200" dirty="0" smtClean="0">
-                <a:solidFill>
-                  <a:schemeClr val="tx1"/>
-                </a:solidFill>
-                <a:effectLst/>
-                <a:latin typeface="+mn-lt"/>
-                <a:ea typeface="+mn-ea"/>
-                <a:cs typeface="+mn-cs"/>
-              </a:rPr>
-              <a:t>механизм автоматического управления памятью, также известного как сборщик мусора,</a:t>
+              <a:t>2. Присутствие механизм автоматического управления памятью, также известного как сборщик мусора,</a:t>
             </a:r>
             <a:r>
               <a:rPr lang="ru-RU" sz="1200" kern="1200" baseline="0" dirty="0" smtClean="0">
@@ -8130,31 +8070,7 @@
                 <a:ea typeface="+mn-ea"/>
                 <a:cs typeface="+mn-cs"/>
               </a:rPr>
-              <a:t>3. Не </a:t>
-            </a:r>
-            <a:r>
-              <a:rPr lang="ru-RU" sz="1200" kern="1200" dirty="0" smtClean="0">
-                <a:solidFill>
-                  <a:schemeClr val="tx1"/>
-                </a:solidFill>
-                <a:effectLst/>
-                <a:latin typeface="+mn-lt"/>
-                <a:ea typeface="+mn-ea"/>
-                <a:cs typeface="+mn-cs"/>
-              </a:rPr>
-              <a:t>всегда присутствует кеширования обработанных шаблонов, что приводит к необходимости повторной </a:t>
-            </a:r>
-            <a:r>
-              <a:rPr lang="ru-RU" sz="1200" kern="1200" dirty="0" smtClean="0">
-                <a:solidFill>
-                  <a:schemeClr val="tx1"/>
-                </a:solidFill>
-                <a:effectLst/>
-                <a:latin typeface="+mn-lt"/>
-                <a:ea typeface="+mn-ea"/>
-                <a:cs typeface="+mn-cs"/>
-              </a:rPr>
-              <a:t>обработки</a:t>
+              <a:t>3. Не всегда присутствует кеширования обработанных шаблонов, что приводит к необходимости повторной обработки</a:t>
             </a:r>
             <a:r>
               <a:rPr lang="ru-RU" sz="1200" kern="1200" baseline="0" dirty="0" smtClean="0">
@@ -8190,43 +8106,7 @@
                 <a:ea typeface="+mn-ea"/>
                 <a:cs typeface="+mn-cs"/>
               </a:rPr>
-              <a:t>4. Вычислительные </a:t>
-            </a:r>
-            <a:r>
-              <a:rPr lang="ru-RU" sz="1200" kern="1200" dirty="0" smtClean="0">
-                <a:solidFill>
-                  <a:schemeClr val="tx1"/>
-                </a:solidFill>
-                <a:effectLst/>
-                <a:latin typeface="+mn-lt"/>
-                <a:ea typeface="+mn-ea"/>
-                <a:cs typeface="+mn-cs"/>
-              </a:rPr>
-              <a:t>ресурсы не используются полностью, это является следствием того, что исполнение программы происходит в одном </a:t>
-            </a:r>
-            <a:r>
-              <a:rPr lang="ru-RU" sz="1200" kern="1200" dirty="0" smtClean="0">
-                <a:solidFill>
-                  <a:schemeClr val="tx1"/>
-                </a:solidFill>
-                <a:effectLst/>
-                <a:latin typeface="+mn-lt"/>
-                <a:ea typeface="+mn-ea"/>
-                <a:cs typeface="+mn-cs"/>
-              </a:rPr>
-              <a:t>логическом потоке</a:t>
-            </a:r>
-            <a:r>
-              <a:rPr lang="ru-RU" sz="1200" kern="1200" dirty="0" smtClean="0">
-                <a:solidFill>
-                  <a:schemeClr val="tx1"/>
-                </a:solidFill>
-                <a:effectLst/>
-                <a:latin typeface="+mn-lt"/>
-                <a:ea typeface="+mn-ea"/>
-                <a:cs typeface="+mn-cs"/>
-              </a:rPr>
-              <a:t>, а</a:t>
+              <a:t>4. Вычислительные ресурсы не используются полностью, это является следствием того, что исполнение программы происходит в одном логическом потоке, а</a:t>
             </a:r>
             <a:r>
               <a:rPr lang="ru-RU" sz="1200" kern="1200" baseline="0" dirty="0" smtClean="0">
@@ -8427,31 +8307,7 @@
                 <a:ea typeface="+mn-ea"/>
                 <a:cs typeface="+mn-cs"/>
               </a:rPr>
-              <a:t> интерпретации обработка исходного кода происходит построчно, и результатом такого процесса является промежуточный код некой виртуальной машины, так же известной как байт-код. Далее байт-код подвергается процессу трансляции в машинный код </a:t>
-            </a:r>
-            <a:r>
-              <a:rPr lang="ru-RU" sz="1200" kern="1200" dirty="0" smtClean="0">
-                <a:solidFill>
-                  <a:schemeClr val="tx1"/>
-                </a:solidFill>
-                <a:effectLst/>
-                <a:latin typeface="+mn-lt"/>
-                <a:ea typeface="+mn-ea"/>
-                <a:cs typeface="+mn-cs"/>
-              </a:rPr>
-              <a:t>уже целевой </a:t>
-            </a:r>
-            <a:r>
-              <a:rPr lang="ru-RU" sz="1200" kern="1200" dirty="0" smtClean="0">
-                <a:solidFill>
-                  <a:schemeClr val="tx1"/>
-                </a:solidFill>
-                <a:effectLst/>
-                <a:latin typeface="+mn-lt"/>
-                <a:ea typeface="+mn-ea"/>
-                <a:cs typeface="+mn-cs"/>
-              </a:rPr>
-              <a:t>архитектуры. </a:t>
+              <a:t> интерпретации обработка исходного кода происходит построчно, и результатом такого процесса является промежуточный код некой виртуальной машины, так же известной как байт-код. Далее байт-код подвергается процессу трансляции в машинный код уже целевой архитектуры. </a:t>
             </a:r>
             <a:endParaRPr lang="en-US" sz="1200" kern="1200" dirty="0" smtClean="0">
               <a:solidFill>
@@ -8629,19 +8485,7 @@
                 <a:ea typeface="+mn-ea"/>
                 <a:cs typeface="+mn-cs"/>
               </a:rPr>
-              <a:t>Использование </a:t>
-            </a:r>
-            <a:r>
-              <a:rPr lang="ru-RU" sz="1200" kern="1200" dirty="0" smtClean="0">
-                <a:solidFill>
-                  <a:schemeClr val="tx1"/>
-                </a:solidFill>
-                <a:effectLst/>
-                <a:latin typeface="+mn-lt"/>
-                <a:ea typeface="+mn-ea"/>
-                <a:cs typeface="+mn-cs"/>
-              </a:rPr>
-              <a:t>компилируемых языков программирования вместо интерпретируемых.</a:t>
+              <a:t>Использование компилируемых языков программирования вместо интерпретируемых.</a:t>
             </a:r>
             <a:endParaRPr lang="en-US" sz="1200" kern="1200" dirty="0" smtClean="0">
               <a:solidFill>
@@ -8737,19 +8581,7 @@
                 <a:ea typeface="+mn-ea"/>
                 <a:cs typeface="+mn-cs"/>
               </a:rPr>
-              <a:t>Реализация кеширования шаблонов с применением вытесняющих </a:t>
-            </a:r>
-            <a:r>
-              <a:rPr lang="ru-RU" sz="1200" kern="1200" dirty="0" smtClean="0">
-                <a:solidFill>
-                  <a:schemeClr val="tx1"/>
-                </a:solidFill>
-                <a:effectLst/>
-                <a:latin typeface="+mn-lt"/>
-                <a:ea typeface="+mn-ea"/>
-                <a:cs typeface="+mn-cs"/>
-              </a:rPr>
-              <a:t>алгоритмов, таких</a:t>
+              <a:t>Реализация кеширования шаблонов с применением вытесняющих алгоритмов, таких</a:t>
             </a:r>
             <a:r>
               <a:rPr lang="ru-RU" sz="1200" kern="1200" baseline="0" dirty="0" smtClean="0">
@@ -9058,7 +8890,19 @@
                 <a:ea typeface="+mn-ea"/>
                 <a:cs typeface="+mn-cs"/>
               </a:rPr>
-              <a:t> </a:t>
+              <a:t> клиентов делает обращения к сервису посредством </a:t>
+            </a:r>
+            <a:r>
+              <a:rPr lang="en-US" sz="1200" kern="1200" dirty="0" smtClean="0">
+                <a:solidFill>
+                  <a:schemeClr val="tx1"/>
+                </a:solidFill>
+                <a:effectLst/>
+                <a:latin typeface="+mn-lt"/>
+                <a:ea typeface="+mn-ea"/>
+                <a:cs typeface="+mn-cs"/>
+              </a:rPr>
+              <a:t>HTTP </a:t>
             </a:r>
             <a:r>
               <a:rPr lang="ru-RU" sz="1200" kern="1200" dirty="0" smtClean="0">
@@ -9070,10 +8914,10 @@
                 <a:ea typeface="+mn-ea"/>
                 <a:cs typeface="+mn-cs"/>
               </a:rPr>
-              <a:t>клиентов делает обращения к сервису посредством </a:t>
-            </a:r>
-            <a:r>
-              <a:rPr lang="en-US" sz="1200" kern="1200" dirty="0" smtClean="0">
+              <a:t>запросов, сервис в свою очередь</a:t>
+            </a:r>
+            <a:r>
+              <a:rPr lang="ru-RU" sz="1200" kern="1200" baseline="0" dirty="0" smtClean="0">
                 <a:solidFill>
                   <a:schemeClr val="tx1"/>
                 </a:solidFill>
@@ -9082,7 +8926,7 @@
                 <a:ea typeface="+mn-ea"/>
                 <a:cs typeface="+mn-cs"/>
               </a:rPr>
-              <a:t>HTTP </a:t>
+              <a:t> </a:t>
             </a:r>
             <a:r>
               <a:rPr lang="ru-RU" sz="1200" kern="1200" dirty="0" smtClean="0">
@@ -9094,55 +8938,7 @@
                 <a:ea typeface="+mn-ea"/>
                 <a:cs typeface="+mn-cs"/>
               </a:rPr>
-              <a:t>запросов, сервис </a:t>
-            </a:r>
-            <a:r>
-              <a:rPr lang="ru-RU" sz="1200" kern="1200" dirty="0" smtClean="0">
-                <a:solidFill>
-                  <a:schemeClr val="tx1"/>
-                </a:solidFill>
-                <a:effectLst/>
-                <a:latin typeface="+mn-lt"/>
-                <a:ea typeface="+mn-ea"/>
-                <a:cs typeface="+mn-cs"/>
-              </a:rPr>
-              <a:t>в свою очередь</a:t>
-            </a:r>
-            <a:r>
-              <a:rPr lang="ru-RU" sz="1200" kern="1200" baseline="0" dirty="0" smtClean="0">
-                <a:solidFill>
-                  <a:schemeClr val="tx1"/>
-                </a:solidFill>
-                <a:effectLst/>
-                <a:latin typeface="+mn-lt"/>
-                <a:ea typeface="+mn-ea"/>
-                <a:cs typeface="+mn-cs"/>
-              </a:rPr>
-              <a:t> </a:t>
-            </a:r>
-            <a:r>
-              <a:rPr lang="ru-RU" sz="1200" kern="1200" dirty="0" smtClean="0">
-                <a:solidFill>
-                  <a:schemeClr val="tx1"/>
-                </a:solidFill>
-                <a:effectLst/>
-                <a:latin typeface="+mn-lt"/>
-                <a:ea typeface="+mn-ea"/>
-                <a:cs typeface="+mn-cs"/>
-              </a:rPr>
-              <a:t>перенаправляет </a:t>
-            </a:r>
-            <a:r>
-              <a:rPr lang="ru-RU" sz="1200" kern="1200" dirty="0" smtClean="0">
-                <a:solidFill>
-                  <a:schemeClr val="tx1"/>
-                </a:solidFill>
-                <a:effectLst/>
-                <a:latin typeface="+mn-lt"/>
-                <a:ea typeface="+mn-ea"/>
-                <a:cs typeface="+mn-cs"/>
-              </a:rPr>
-              <a:t>запросы на соответствующие модули в зависимости от типа запроса.</a:t>
+              <a:t>перенаправляет запросы на соответствующие модули в зависимости от типа запроса.</a:t>
             </a:r>
             <a:endParaRPr lang="en-US" sz="1200" kern="1200" dirty="0" smtClean="0">
               <a:solidFill>
@@ -9314,7 +9110,19 @@
                 <a:ea typeface="+mn-ea"/>
                 <a:cs typeface="+mn-cs"/>
               </a:rPr>
-              <a:t>запросов</a:t>
+              <a:t>запросов, где модель</a:t>
+            </a:r>
+            <a:r>
+              <a:rPr lang="ru-RU" sz="1200" kern="1200" baseline="0" dirty="0" smtClean="0">
+                <a:solidFill>
+                  <a:schemeClr val="tx1"/>
+                </a:solidFill>
+                <a:effectLst/>
+                <a:latin typeface="+mn-lt"/>
+                <a:ea typeface="+mn-ea"/>
+                <a:cs typeface="+mn-cs"/>
+              </a:rPr>
+              <a:t> раскрыта более детально,</a:t>
             </a:r>
             <a:r>
               <a:rPr lang="ru-RU" sz="1200" kern="1200" dirty="0" smtClean="0">
@@ -9326,43 +9134,7 @@
                 <a:ea typeface="+mn-ea"/>
                 <a:cs typeface="+mn-cs"/>
               </a:rPr>
-              <a:t>, где модель</a:t>
-            </a:r>
-            <a:r>
-              <a:rPr lang="ru-RU" sz="1200" kern="1200" baseline="0" dirty="0" smtClean="0">
-                <a:solidFill>
-                  <a:schemeClr val="tx1"/>
-                </a:solidFill>
-                <a:effectLst/>
-                <a:latin typeface="+mn-lt"/>
-                <a:ea typeface="+mn-ea"/>
-                <a:cs typeface="+mn-cs"/>
-              </a:rPr>
-              <a:t> раскрыта более детально,</a:t>
-            </a:r>
-            <a:r>
-              <a:rPr lang="ru-RU" sz="1200" kern="1200" dirty="0" smtClean="0">
-                <a:solidFill>
-                  <a:schemeClr val="tx1"/>
-                </a:solidFill>
-                <a:effectLst/>
-                <a:latin typeface="+mn-lt"/>
-                <a:ea typeface="+mn-ea"/>
-                <a:cs typeface="+mn-cs"/>
-              </a:rPr>
-              <a:t> </a:t>
-            </a:r>
-            <a:r>
-              <a:rPr lang="ru-RU" sz="1200" kern="1200" dirty="0" smtClean="0">
-                <a:solidFill>
-                  <a:schemeClr val="tx1"/>
-                </a:solidFill>
-                <a:effectLst/>
-                <a:latin typeface="+mn-lt"/>
-                <a:ea typeface="+mn-ea"/>
-                <a:cs typeface="+mn-cs"/>
-              </a:rPr>
-              <a:t>по ней видно, что после предварительной обработки запроса в целях</a:t>
+              <a:t> по ней видно, что после предварительной обработки запроса в целях</a:t>
             </a:r>
             <a:r>
               <a:rPr lang="ru-RU" sz="1200" kern="1200" baseline="0" dirty="0" smtClean="0">
@@ -9800,31 +9572,7 @@
                 <a:ea typeface="+mn-ea"/>
                 <a:cs typeface="+mn-cs"/>
               </a:rPr>
-              <a:t>Основания для выбора той или технологии приведены в </a:t>
-            </a:r>
-            <a:r>
-              <a:rPr lang="ru-RU" sz="1200" kern="1200" dirty="0" smtClean="0">
-                <a:solidFill>
-                  <a:schemeClr val="tx1"/>
-                </a:solidFill>
-                <a:effectLst/>
-                <a:latin typeface="+mn-lt"/>
-                <a:ea typeface="+mn-ea"/>
-                <a:cs typeface="+mn-cs"/>
-              </a:rPr>
-              <a:t>расчётно-пояснительной </a:t>
-            </a:r>
-            <a:r>
-              <a:rPr lang="ru-RU" sz="1200" kern="1200" dirty="0" smtClean="0">
-                <a:solidFill>
-                  <a:schemeClr val="tx1"/>
-                </a:solidFill>
-                <a:effectLst/>
-                <a:latin typeface="+mn-lt"/>
-                <a:ea typeface="+mn-ea"/>
-                <a:cs typeface="+mn-cs"/>
-              </a:rPr>
-              <a:t>записке.</a:t>
+              <a:t>Основания для выбора той или технологии приведены в расчётно-пояснительной записке.</a:t>
             </a:r>
             <a:endParaRPr lang="en-US" sz="1200" kern="1200" dirty="0" smtClean="0">
               <a:solidFill>
@@ -10008,7 +9756,7 @@
           <a:p>
             <a:fld id="{8A5229FB-8832-4A27-994F-F3EDC38C3527}" type="datetimeFigureOut">
               <a:rPr lang="en-US" smtClean="0"/>
-              <a:t>6/19/2020</a:t>
+              <a:t>6/21/2020</a:t>
             </a:fld>
             <a:endParaRPr lang="en-US" dirty="0"/>
           </a:p>
@@ -10178,7 +9926,7 @@
           <a:p>
             <a:fld id="{8A5229FB-8832-4A27-994F-F3EDC38C3527}" type="datetimeFigureOut">
               <a:rPr lang="en-US" smtClean="0"/>
-              <a:t>6/19/2020</a:t>
+              <a:t>6/21/2020</a:t>
             </a:fld>
             <a:endParaRPr lang="en-US" dirty="0"/>
           </a:p>
@@ -10358,7 +10106,7 @@
           <a:p>
             <a:fld id="{8A5229FB-8832-4A27-994F-F3EDC38C3527}" type="datetimeFigureOut">
               <a:rPr lang="en-US" smtClean="0"/>
-              <a:t>6/19/2020</a:t>
+              <a:t>6/21/2020</a:t>
             </a:fld>
             <a:endParaRPr lang="en-US" dirty="0"/>
           </a:p>
@@ -10528,7 +10276,7 @@
           <a:p>
             <a:fld id="{8A5229FB-8832-4A27-994F-F3EDC38C3527}" type="datetimeFigureOut">
               <a:rPr lang="en-US" smtClean="0"/>
-              <a:t>6/19/2020</a:t>
+              <a:t>6/21/2020</a:t>
             </a:fld>
             <a:endParaRPr lang="en-US" dirty="0"/>
           </a:p>
@@ -10774,7 +10522,7 @@
           <a:p>
             <a:fld id="{8A5229FB-8832-4A27-994F-F3EDC38C3527}" type="datetimeFigureOut">
               <a:rPr lang="en-US" smtClean="0"/>
-              <a:t>6/19/2020</a:t>
+              <a:t>6/21/2020</a:t>
             </a:fld>
             <a:endParaRPr lang="en-US" dirty="0"/>
           </a:p>
@@ -11006,7 +10754,7 @@
           <a:p>
             <a:fld id="{8A5229FB-8832-4A27-994F-F3EDC38C3527}" type="datetimeFigureOut">
               <a:rPr lang="en-US" smtClean="0"/>
-              <a:t>6/19/2020</a:t>
+              <a:t>6/21/2020</a:t>
             </a:fld>
             <a:endParaRPr lang="en-US" dirty="0"/>
           </a:p>
@@ -11373,7 +11121,7 @@
           <a:p>
             <a:fld id="{8A5229FB-8832-4A27-994F-F3EDC38C3527}" type="datetimeFigureOut">
               <a:rPr lang="en-US" smtClean="0"/>
-              <a:t>6/19/2020</a:t>
+              <a:t>6/21/2020</a:t>
             </a:fld>
             <a:endParaRPr lang="en-US" dirty="0"/>
           </a:p>
@@ -11491,7 +11239,7 @@
           <a:p>
             <a:fld id="{8A5229FB-8832-4A27-994F-F3EDC38C3527}" type="datetimeFigureOut">
               <a:rPr lang="en-US" smtClean="0"/>
-              <a:t>6/19/2020</a:t>
+              <a:t>6/21/2020</a:t>
             </a:fld>
             <a:endParaRPr lang="en-US" dirty="0"/>
           </a:p>
@@ -11586,7 +11334,7 @@
           <a:p>
             <a:fld id="{8A5229FB-8832-4A27-994F-F3EDC38C3527}" type="datetimeFigureOut">
               <a:rPr lang="en-US" smtClean="0"/>
-              <a:t>6/19/2020</a:t>
+              <a:t>6/21/2020</a:t>
             </a:fld>
             <a:endParaRPr lang="en-US" dirty="0"/>
           </a:p>
@@ -11863,7 +11611,7 @@
           <a:p>
             <a:fld id="{8A5229FB-8832-4A27-994F-F3EDC38C3527}" type="datetimeFigureOut">
               <a:rPr lang="en-US" smtClean="0"/>
-              <a:t>6/19/2020</a:t>
+              <a:t>6/21/2020</a:t>
             </a:fld>
             <a:endParaRPr lang="en-US" dirty="0"/>
           </a:p>
@@ -12116,7 +11864,7 @@
           <a:p>
             <a:fld id="{8A5229FB-8832-4A27-994F-F3EDC38C3527}" type="datetimeFigureOut">
               <a:rPr lang="en-US" smtClean="0"/>
-              <a:t>6/19/2020</a:t>
+              <a:t>6/21/2020</a:t>
             </a:fld>
             <a:endParaRPr lang="en-US" dirty="0"/>
           </a:p>
@@ -12329,7 +12077,7 @@
           <a:p>
             <a:fld id="{8A5229FB-8832-4A27-994F-F3EDC38C3527}" type="datetimeFigureOut">
               <a:rPr lang="en-US" smtClean="0"/>
-              <a:t>6/19/2020</a:t>
+              <a:t>6/21/2020</a:t>
             </a:fld>
             <a:endParaRPr lang="en-US" dirty="0"/>
           </a:p>

</xml_diff>